<commit_message>
modularised all components so far edited module example PPT training and started namespace convention
</commit_message>
<xml_diff>
--- a/BHF_Dashboards/BHF_DSC_TRE_External_Dashboard/Dev/Modules Example.pptx
+++ b/BHF_Dashboards/BHF_DSC_TRE_External_Dashboard/Dev/Modules Example.pptx
@@ -5,13 +5,14 @@
     <p:sldMasterId id="2147483648" r:id="rId1"/>
   </p:sldMasterIdLst>
   <p:notesMasterIdLst>
-    <p:notesMasterId r:id="rId6"/>
+    <p:notesMasterId r:id="rId7"/>
   </p:notesMasterIdLst>
   <p:sldIdLst>
     <p:sldId id="256" r:id="rId2"/>
     <p:sldId id="257" r:id="rId3"/>
     <p:sldId id="258" r:id="rId4"/>
     <p:sldId id="259" r:id="rId5"/>
+    <p:sldId id="260" r:id="rId6"/>
   </p:sldIdLst>
   <p:sldSz cx="12192000" cy="6858000"/>
   <p:notesSz cx="6858000" cy="9144000"/>
@@ -110,6 +111,11 @@
       </a:defRPr>
     </a:lvl9pPr>
   </p:defaultTextStyle>
+  <p:extLst>
+    <p:ext uri="{EFAFB233-063F-42B5-8137-9DF3F51BA10A}">
+      <p15:sldGuideLst xmlns:p15="http://schemas.microsoft.com/office/powerpoint/2012/main"/>
+    </p:ext>
+  </p:extLst>
 </p:presentation>
 </file>
 
@@ -5290,7 +5296,7 @@
                   <a:schemeClr val="bg1"/>
                 </a:solidFill>
               </a:rPr>
-              <a:t>module_ui</a:t>
+              <a:t>moduleDemoUI</a:t>
             </a:r>
             <a:r>
               <a:rPr lang="en-US" dirty="0">
@@ -5388,7 +5394,7 @@
                   <a:schemeClr val="bg1"/>
                 </a:solidFill>
               </a:rPr>
-              <a:t>module_server</a:t>
+              <a:t>moduleDemoServer</a:t>
             </a:r>
             <a:r>
               <a:rPr lang="en-US" dirty="0">
@@ -5396,7 +5402,7 @@
                   <a:schemeClr val="bg1"/>
                 </a:solidFill>
               </a:rPr>
-              <a:t> &lt;- function(id){</a:t>
+              <a:t>&lt;- function(id){</a:t>
             </a:r>
           </a:p>
           <a:p>
@@ -5553,10 +5559,20 @@
                 <a:effectLst/>
                 <a:latin typeface="Lato" panose="020F0502020204030204" pitchFamily="34" charset="0"/>
               </a:rPr>
-              <a:t>All input and output IDs that appear in the function body needs to be wrapped in a call to </a:t>
-            </a:r>
-            <a:r>
-              <a:rPr lang="en-GB" dirty="0"/>
+              <a:t>All input and output IDs that appear in the function body </a:t>
+            </a:r>
+            <a:r>
+              <a:rPr lang="en-GB" b="1" i="0" u="none" strike="noStrike" dirty="0">
+                <a:solidFill>
+                  <a:srgbClr val="333333"/>
+                </a:solidFill>
+                <a:effectLst/>
+                <a:latin typeface="Lato" panose="020F0502020204030204" pitchFamily="34" charset="0"/>
+              </a:rPr>
+              <a:t>needs to be wrapped in a call to </a:t>
+            </a:r>
+            <a:r>
+              <a:rPr lang="en-GB" b="1" dirty="0"/>
               <a:t>ns()</a:t>
             </a:r>
           </a:p>
@@ -5757,7 +5773,7 @@
         <p:spPr>
           <a:xfrm>
             <a:off x="635000" y="2141488"/>
-            <a:ext cx="4635500" cy="3416320"/>
+            <a:ext cx="4635500" cy="3970318"/>
           </a:xfrm>
           <a:prstGeom prst="rect">
             <a:avLst/>
@@ -5825,7 +5841,7 @@
                   <a:schemeClr val="bg1"/>
                 </a:solidFill>
               </a:rPr>
-              <a:t>module_ui</a:t>
+              <a:t>moduleDemoUI</a:t>
             </a:r>
             <a:r>
               <a:rPr lang="en-US" dirty="0">
@@ -5915,7 +5931,7 @@
                   <a:schemeClr val="bg1"/>
                 </a:solidFill>
               </a:rPr>
-              <a:t>module_server</a:t>
+              <a:t>moduleDemoServer</a:t>
             </a:r>
             <a:r>
               <a:rPr lang="en-US" dirty="0">
@@ -5958,6 +5974,42 @@
               </a:rPr>
               <a:t>  }</a:t>
             </a:r>
+          </a:p>
+        </p:txBody>
+      </p:sp>
+      <p:sp>
+        <p:nvSpPr>
+          <p:cNvPr id="2" name="TextBox 1">
+            <a:extLst>
+              <a:ext uri="{FF2B5EF4-FFF2-40B4-BE49-F238E27FC236}">
+                <a16:creationId xmlns:a16="http://schemas.microsoft.com/office/drawing/2014/main" id="{BBBA70C5-7F35-6120-CF92-C0712FA540AC}"/>
+              </a:ext>
+            </a:extLst>
+          </p:cNvPr>
+          <p:cNvSpPr txBox="1"/>
+          <p:nvPr/>
+        </p:nvSpPr>
+        <p:spPr>
+          <a:xfrm>
+            <a:off x="6477000" y="1893490"/>
+            <a:ext cx="4737100" cy="369332"/>
+          </a:xfrm>
+          <a:prstGeom prst="rect">
+            <a:avLst/>
+          </a:prstGeom>
+          <a:noFill/>
+        </p:spPr>
+        <p:txBody>
+          <a:bodyPr wrap="square" rtlCol="0">
+            <a:spAutoFit/>
+          </a:bodyPr>
+          <a:lstStyle/>
+          <a:p>
+            <a:r>
+              <a:rPr lang="en-GB" dirty="0"/>
+              <a:t>IDs</a:t>
+            </a:r>
+            <a:endParaRPr lang="en-US" dirty="0"/>
           </a:p>
         </p:txBody>
       </p:sp>
@@ -6090,6 +6142,347 @@
     <p:extLst>
       <p:ext uri="{BB962C8B-B14F-4D97-AF65-F5344CB8AC3E}">
         <p14:creationId xmlns:p14="http://schemas.microsoft.com/office/powerpoint/2010/main" val="1027512068"/>
+      </p:ext>
+    </p:extLst>
+  </p:cSld>
+  <p:clrMapOvr>
+    <a:masterClrMapping/>
+  </p:clrMapOvr>
+</p:sld>
+</file>
+
+<file path=ppt/slides/slide5.xml><?xml version="1.0" encoding="utf-8"?>
+<p:sld xmlns:a="http://schemas.openxmlformats.org/drawingml/2006/main" xmlns:r="http://schemas.openxmlformats.org/officeDocument/2006/relationships" xmlns:p="http://schemas.openxmlformats.org/presentationml/2006/main">
+  <p:cSld>
+    <p:spTree>
+      <p:nvGrpSpPr>
+        <p:cNvPr id="1" name=""/>
+        <p:cNvGrpSpPr/>
+        <p:nvPr/>
+      </p:nvGrpSpPr>
+      <p:grpSpPr>
+        <a:xfrm>
+          <a:off x="0" y="0"/>
+          <a:ext cx="0" cy="0"/>
+          <a:chOff x="0" y="0"/>
+          <a:chExt cx="0" cy="0"/>
+        </a:xfrm>
+      </p:grpSpPr>
+      <p:sp>
+        <p:nvSpPr>
+          <p:cNvPr id="4" name="TextBox 3">
+            <a:extLst>
+              <a:ext uri="{FF2B5EF4-FFF2-40B4-BE49-F238E27FC236}">
+                <a16:creationId xmlns:a16="http://schemas.microsoft.com/office/drawing/2014/main" id="{A93241D4-7963-235F-057F-6414464A6727}"/>
+              </a:ext>
+            </a:extLst>
+          </p:cNvPr>
+          <p:cNvSpPr txBox="1"/>
+          <p:nvPr/>
+        </p:nvSpPr>
+        <p:spPr>
+          <a:xfrm>
+            <a:off x="381000" y="444500"/>
+            <a:ext cx="4889500" cy="369332"/>
+          </a:xfrm>
+          <a:prstGeom prst="rect">
+            <a:avLst/>
+          </a:prstGeom>
+          <a:noFill/>
+        </p:spPr>
+        <p:txBody>
+          <a:bodyPr wrap="square" rtlCol="0">
+            <a:spAutoFit/>
+          </a:bodyPr>
+          <a:lstStyle/>
+          <a:p>
+            <a:r>
+              <a:rPr lang="en-US" b="1" dirty="0">
+                <a:solidFill>
+                  <a:srgbClr val="C00000"/>
+                </a:solidFill>
+              </a:rPr>
+              <a:t>Naming Conventions</a:t>
+            </a:r>
+          </a:p>
+        </p:txBody>
+      </p:sp>
+      <p:sp>
+        <p:nvSpPr>
+          <p:cNvPr id="5" name="TextBox 4">
+            <a:extLst>
+              <a:ext uri="{FF2B5EF4-FFF2-40B4-BE49-F238E27FC236}">
+                <a16:creationId xmlns:a16="http://schemas.microsoft.com/office/drawing/2014/main" id="{EFA94A6A-DFAA-642B-5B41-F5D89C00EDF3}"/>
+              </a:ext>
+            </a:extLst>
+          </p:cNvPr>
+          <p:cNvSpPr txBox="1"/>
+          <p:nvPr/>
+        </p:nvSpPr>
+        <p:spPr>
+          <a:xfrm>
+            <a:off x="381000" y="1003300"/>
+            <a:ext cx="11290300" cy="5078313"/>
+          </a:xfrm>
+          <a:prstGeom prst="rect">
+            <a:avLst/>
+          </a:prstGeom>
+          <a:noFill/>
+        </p:spPr>
+        <p:txBody>
+          <a:bodyPr wrap="square" rtlCol="0">
+            <a:spAutoFit/>
+          </a:bodyPr>
+          <a:lstStyle/>
+          <a:p>
+            <a:r>
+              <a:rPr lang="en-US" b="1" dirty="0"/>
+              <a:t>Source</a:t>
+            </a:r>
+          </a:p>
+          <a:p>
+            <a:endParaRPr lang="en-US" b="1" dirty="0"/>
+          </a:p>
+          <a:p>
+            <a:r>
+              <a:rPr lang="en-US" dirty="0"/>
+              <a:t>Modules should be saved as independent R scripts and sourced in the main </a:t>
+            </a:r>
+            <a:r>
+              <a:rPr lang="en-US" dirty="0" err="1"/>
+              <a:t>app.R</a:t>
+            </a:r>
+            <a:r>
+              <a:rPr lang="en-US" dirty="0"/>
+              <a:t>. The naming convention for these module scripts should be </a:t>
+            </a:r>
+            <a:r>
+              <a:rPr lang="en-US" dirty="0" err="1"/>
+              <a:t>module_navbartab_section</a:t>
+            </a:r>
+            <a:r>
+              <a:rPr lang="en-US" dirty="0"/>
+              <a:t> e.g. for the module with reference to the Data Coverage section under the Summary tab, </a:t>
+            </a:r>
+            <a:r>
+              <a:rPr lang="en-US" dirty="0" err="1"/>
+              <a:t>module_summary_data_coverage</a:t>
+            </a:r>
+            <a:r>
+              <a:rPr lang="en-US" dirty="0"/>
+              <a:t>.</a:t>
+            </a:r>
+          </a:p>
+          <a:p>
+            <a:endParaRPr lang="en-US" dirty="0"/>
+          </a:p>
+          <a:p>
+            <a:r>
+              <a:rPr lang="en-US" b="1" dirty="0"/>
+              <a:t>Module Components</a:t>
+            </a:r>
+          </a:p>
+          <a:p>
+            <a:endParaRPr lang="en-US" dirty="0"/>
+          </a:p>
+          <a:p>
+            <a:r>
+              <a:rPr lang="en-US" dirty="0"/>
+              <a:t>Using the above example:</a:t>
+            </a:r>
+          </a:p>
+          <a:p>
+            <a:endParaRPr lang="en-US" dirty="0"/>
+          </a:p>
+          <a:p>
+            <a:pPr algn="l">
+              <a:buFont typeface="Arial" panose="020B0604020202020204" pitchFamily="34" charset="0"/>
+              <a:buChar char="•"/>
+            </a:pPr>
+            <a:r>
+              <a:rPr lang="en-GB" dirty="0">
+                <a:solidFill>
+                  <a:srgbClr val="212529"/>
+                </a:solidFill>
+                <a:latin typeface="-apple-system"/>
+              </a:rPr>
+              <a:t> If the module UI contains input and output: name the module UI such as </a:t>
+            </a:r>
+            <a:r>
+              <a:rPr lang="en-GB" b="0" i="0" u="none" strike="noStrike" dirty="0" err="1">
+                <a:solidFill>
+                  <a:srgbClr val="212529"/>
+                </a:solidFill>
+                <a:effectLst/>
+                <a:latin typeface="-apple-system"/>
+              </a:rPr>
+              <a:t>dataCoverageUI</a:t>
+            </a:r>
+            <a:r>
+              <a:rPr lang="en-GB" b="0" i="0" u="none" strike="noStrike" dirty="0">
+                <a:solidFill>
+                  <a:srgbClr val="212529"/>
+                </a:solidFill>
+                <a:effectLst/>
+                <a:latin typeface="-apple-system"/>
+              </a:rPr>
+              <a:t>() </a:t>
+            </a:r>
+          </a:p>
+          <a:p>
+            <a:pPr algn="l">
+              <a:buFont typeface="Arial" panose="020B0604020202020204" pitchFamily="34" charset="0"/>
+              <a:buChar char="•"/>
+            </a:pPr>
+            <a:r>
+              <a:rPr lang="en-GB" dirty="0">
+                <a:solidFill>
+                  <a:srgbClr val="212529"/>
+                </a:solidFill>
+                <a:latin typeface="-apple-system"/>
+              </a:rPr>
+              <a:t> </a:t>
+            </a:r>
+            <a:r>
+              <a:rPr lang="en-GB" b="0" i="0" u="none" strike="noStrike" dirty="0">
+                <a:solidFill>
+                  <a:srgbClr val="212529"/>
+                </a:solidFill>
+                <a:effectLst/>
+                <a:latin typeface="-apple-system"/>
+              </a:rPr>
+              <a:t>If the module is primarily for input or output then use </a:t>
+            </a:r>
+            <a:r>
+              <a:rPr lang="en-GB" b="0" i="0" u="none" strike="noStrike" dirty="0" err="1">
+                <a:solidFill>
+                  <a:srgbClr val="212529"/>
+                </a:solidFill>
+                <a:effectLst/>
+                <a:latin typeface="-apple-system"/>
+              </a:rPr>
+              <a:t>dataCoverageInput</a:t>
+            </a:r>
+            <a:r>
+              <a:rPr lang="en-GB" b="0" i="0" u="none" strike="noStrike" dirty="0">
+                <a:solidFill>
+                  <a:srgbClr val="212529"/>
+                </a:solidFill>
+                <a:effectLst/>
+                <a:latin typeface="-apple-system"/>
+              </a:rPr>
+              <a:t>() or </a:t>
+            </a:r>
+            <a:r>
+              <a:rPr lang="en-GB" b="0" i="0" u="none" strike="noStrike" dirty="0" err="1">
+                <a:solidFill>
+                  <a:srgbClr val="212529"/>
+                </a:solidFill>
+                <a:effectLst/>
+                <a:latin typeface="-apple-system"/>
+              </a:rPr>
+              <a:t>dataCoverageOuput</a:t>
+            </a:r>
+            <a:r>
+              <a:rPr lang="en-GB" b="0" i="0" u="none" strike="noStrike" dirty="0">
+                <a:solidFill>
+                  <a:srgbClr val="212529"/>
+                </a:solidFill>
+                <a:effectLst/>
+                <a:latin typeface="-apple-system"/>
+              </a:rPr>
+              <a:t>() instead</a:t>
+            </a:r>
+          </a:p>
+          <a:p>
+            <a:pPr algn="l">
+              <a:buFont typeface="Arial" panose="020B0604020202020204" pitchFamily="34" charset="0"/>
+              <a:buChar char="•"/>
+            </a:pPr>
+            <a:r>
+              <a:rPr lang="en-GB" b="0" i="0" u="none" strike="noStrike" dirty="0">
+                <a:solidFill>
+                  <a:srgbClr val="212529"/>
+                </a:solidFill>
+                <a:effectLst/>
+                <a:latin typeface="-apple-system"/>
+              </a:rPr>
+              <a:t> </a:t>
+            </a:r>
+            <a:r>
+              <a:rPr lang="en-GB" b="0" i="0" u="none" strike="noStrike" dirty="0" err="1">
+                <a:solidFill>
+                  <a:srgbClr val="212529"/>
+                </a:solidFill>
+                <a:effectLst/>
+                <a:latin typeface="-apple-system"/>
+              </a:rPr>
+              <a:t>dataCoverageServer</a:t>
+            </a:r>
+            <a:r>
+              <a:rPr lang="en-GB" b="0" i="0" u="none" strike="noStrike" dirty="0">
+                <a:solidFill>
+                  <a:srgbClr val="212529"/>
+                </a:solidFill>
+                <a:effectLst/>
+                <a:latin typeface="-apple-system"/>
+              </a:rPr>
+              <a:t>() is the module server</a:t>
+            </a:r>
+          </a:p>
+          <a:p>
+            <a:pPr algn="l">
+              <a:buFont typeface="Arial" panose="020B0604020202020204" pitchFamily="34" charset="0"/>
+              <a:buChar char="•"/>
+            </a:pPr>
+            <a:endParaRPr lang="en-GB" dirty="0">
+              <a:solidFill>
+                <a:srgbClr val="212529"/>
+              </a:solidFill>
+              <a:latin typeface="-apple-system"/>
+            </a:endParaRPr>
+          </a:p>
+          <a:p>
+            <a:pPr algn="l"/>
+            <a:r>
+              <a:rPr lang="en-GB" b="1" dirty="0">
+                <a:solidFill>
+                  <a:srgbClr val="212529"/>
+                </a:solidFill>
+                <a:latin typeface="-apple-system"/>
+              </a:rPr>
+              <a:t>Module IDs</a:t>
+            </a:r>
+          </a:p>
+          <a:p>
+            <a:pPr algn="l"/>
+            <a:endParaRPr lang="en-GB" b="0" i="0" u="none" strike="noStrike" dirty="0">
+              <a:solidFill>
+                <a:srgbClr val="212529"/>
+              </a:solidFill>
+              <a:effectLst/>
+              <a:latin typeface="-apple-system"/>
+            </a:endParaRPr>
+          </a:p>
+          <a:p>
+            <a:pPr algn="l"/>
+            <a:endParaRPr lang="en-GB" b="0" i="0" u="none" strike="noStrike" dirty="0">
+              <a:solidFill>
+                <a:srgbClr val="212529"/>
+              </a:solidFill>
+              <a:effectLst/>
+              <a:latin typeface="-apple-system"/>
+            </a:endParaRPr>
+          </a:p>
+          <a:p>
+            <a:endParaRPr lang="en-US" dirty="0"/>
+          </a:p>
+        </p:txBody>
+      </p:sp>
+    </p:spTree>
+    <p:extLst>
+      <p:ext uri="{BB962C8B-B14F-4D97-AF65-F5344CB8AC3E}">
+        <p14:creationId xmlns:p14="http://schemas.microsoft.com/office/powerpoint/2010/main" val="373535562"/>
       </p:ext>
     </p:extLst>
   </p:cSld>

</xml_diff>

<commit_message>
fixed data source file path edited module training files annotated data coverage plot
</commit_message>
<xml_diff>
--- a/BHF_Dashboards/BHF_DSC_TRE_External_Dashboard/Dev/Modules Example.pptx
+++ b/BHF_Dashboards/BHF_DSC_TRE_External_Dashboard/Dev/Modules Example.pptx
@@ -201,7 +201,7 @@
           <a:p>
             <a:fld id="{BE7BC243-463F-4F42-AD26-AB947A3A3B57}" type="datetimeFigureOut">
               <a:rPr lang="en-US" smtClean="0"/>
-              <a:t>10/24/22</a:t>
+              <a:t>10/26/22</a:t>
             </a:fld>
             <a:endParaRPr lang="en-US"/>
           </a:p>
@@ -700,7 +700,26 @@
           <a:bodyPr/>
           <a:lstStyle/>
           <a:p>
-            <a:endParaRPr lang="en-US" dirty="0"/>
+            <a:r>
+              <a:rPr lang="en-US" dirty="0"/>
+              <a:t>It is unlikely we will reuse modules in this app noting that if we do then likely other variables will be fed into the </a:t>
+            </a:r>
+            <a:r>
+              <a:rPr lang="en-US" dirty="0" err="1"/>
+              <a:t>moduleServerUI</a:t>
+            </a:r>
+            <a:r>
+              <a:rPr lang="en-US" dirty="0"/>
+              <a:t> to distinguish between the difference instances and their uses. For example each instance may use a different dataset in which case a dataset input argument would be fed into the </a:t>
+            </a:r>
+            <a:r>
+              <a:rPr lang="en-US" dirty="0" err="1"/>
+              <a:t>moduleDemoServer</a:t>
+            </a:r>
+            <a:r>
+              <a:rPr lang="en-US" dirty="0"/>
+              <a:t>.</a:t>
+            </a:r>
           </a:p>
         </p:txBody>
       </p:sp>
@@ -973,7 +992,7 @@
           <a:p>
             <a:fld id="{FF5D30FB-034D-5246-8EB2-7100765C6A1C}" type="datetimeFigureOut">
               <a:rPr lang="en-US" smtClean="0"/>
-              <a:t>10/24/22</a:t>
+              <a:t>10/26/22</a:t>
             </a:fld>
             <a:endParaRPr lang="en-US"/>
           </a:p>
@@ -1173,7 +1192,7 @@
           <a:p>
             <a:fld id="{FF5D30FB-034D-5246-8EB2-7100765C6A1C}" type="datetimeFigureOut">
               <a:rPr lang="en-US" smtClean="0"/>
-              <a:t>10/24/22</a:t>
+              <a:t>10/26/22</a:t>
             </a:fld>
             <a:endParaRPr lang="en-US"/>
           </a:p>
@@ -1383,7 +1402,7 @@
           <a:p>
             <a:fld id="{FF5D30FB-034D-5246-8EB2-7100765C6A1C}" type="datetimeFigureOut">
               <a:rPr lang="en-US" smtClean="0"/>
-              <a:t>10/24/22</a:t>
+              <a:t>10/26/22</a:t>
             </a:fld>
             <a:endParaRPr lang="en-US"/>
           </a:p>
@@ -1583,7 +1602,7 @@
           <a:p>
             <a:fld id="{FF5D30FB-034D-5246-8EB2-7100765C6A1C}" type="datetimeFigureOut">
               <a:rPr lang="en-US" smtClean="0"/>
-              <a:t>10/24/22</a:t>
+              <a:t>10/26/22</a:t>
             </a:fld>
             <a:endParaRPr lang="en-US"/>
           </a:p>
@@ -1859,7 +1878,7 @@
           <a:p>
             <a:fld id="{FF5D30FB-034D-5246-8EB2-7100765C6A1C}" type="datetimeFigureOut">
               <a:rPr lang="en-US" smtClean="0"/>
-              <a:t>10/24/22</a:t>
+              <a:t>10/26/22</a:t>
             </a:fld>
             <a:endParaRPr lang="en-US"/>
           </a:p>
@@ -2127,7 +2146,7 @@
           <a:p>
             <a:fld id="{FF5D30FB-034D-5246-8EB2-7100765C6A1C}" type="datetimeFigureOut">
               <a:rPr lang="en-US" smtClean="0"/>
-              <a:t>10/24/22</a:t>
+              <a:t>10/26/22</a:t>
             </a:fld>
             <a:endParaRPr lang="en-US"/>
           </a:p>
@@ -2542,7 +2561,7 @@
           <a:p>
             <a:fld id="{FF5D30FB-034D-5246-8EB2-7100765C6A1C}" type="datetimeFigureOut">
               <a:rPr lang="en-US" smtClean="0"/>
-              <a:t>10/24/22</a:t>
+              <a:t>10/26/22</a:t>
             </a:fld>
             <a:endParaRPr lang="en-US"/>
           </a:p>
@@ -2684,7 +2703,7 @@
           <a:p>
             <a:fld id="{FF5D30FB-034D-5246-8EB2-7100765C6A1C}" type="datetimeFigureOut">
               <a:rPr lang="en-US" smtClean="0"/>
-              <a:t>10/24/22</a:t>
+              <a:t>10/26/22</a:t>
             </a:fld>
             <a:endParaRPr lang="en-US"/>
           </a:p>
@@ -2797,7 +2816,7 @@
           <a:p>
             <a:fld id="{FF5D30FB-034D-5246-8EB2-7100765C6A1C}" type="datetimeFigureOut">
               <a:rPr lang="en-US" smtClean="0"/>
-              <a:t>10/24/22</a:t>
+              <a:t>10/26/22</a:t>
             </a:fld>
             <a:endParaRPr lang="en-US"/>
           </a:p>
@@ -3110,7 +3129,7 @@
           <a:p>
             <a:fld id="{FF5D30FB-034D-5246-8EB2-7100765C6A1C}" type="datetimeFigureOut">
               <a:rPr lang="en-US" smtClean="0"/>
-              <a:t>10/24/22</a:t>
+              <a:t>10/26/22</a:t>
             </a:fld>
             <a:endParaRPr lang="en-US"/>
           </a:p>
@@ -3399,7 +3418,7 @@
           <a:p>
             <a:fld id="{FF5D30FB-034D-5246-8EB2-7100765C6A1C}" type="datetimeFigureOut">
               <a:rPr lang="en-US" smtClean="0"/>
-              <a:t>10/24/22</a:t>
+              <a:t>10/26/22</a:t>
             </a:fld>
             <a:endParaRPr lang="en-US"/>
           </a:p>
@@ -3642,7 +3661,7 @@
           <a:p>
             <a:fld id="{FF5D30FB-034D-5246-8EB2-7100765C6A1C}" type="datetimeFigureOut">
               <a:rPr lang="en-US" smtClean="0"/>
-              <a:t>10/24/22</a:t>
+              <a:t>10/26/22</a:t>
             </a:fld>
             <a:endParaRPr lang="en-US"/>
           </a:p>
@@ -4236,7 +4255,23 @@
                   <a:schemeClr val="bg1"/>
                 </a:solidFill>
               </a:rPr>
-              <a:t>Main App</a:t>
+              <a:t>Main App (</a:t>
+            </a:r>
+            <a:r>
+              <a:rPr lang="en-US" dirty="0" err="1">
+                <a:solidFill>
+                  <a:schemeClr val="bg1"/>
+                </a:solidFill>
+              </a:rPr>
+              <a:t>app.R</a:t>
+            </a:r>
+            <a:r>
+              <a:rPr lang="en-US" dirty="0">
+                <a:solidFill>
+                  <a:schemeClr val="bg1"/>
+                </a:solidFill>
+              </a:rPr>
+              <a:t>)</a:t>
             </a:r>
           </a:p>
         </p:txBody>
@@ -4431,7 +4466,7 @@
                   <a:schemeClr val="bg1"/>
                 </a:solidFill>
               </a:rPr>
-              <a:t>Module 1</a:t>
+              <a:t>Module 1 (module1.R)</a:t>
             </a:r>
           </a:p>
         </p:txBody>
@@ -5276,8 +5311,8 @@
         </p:nvSpPr>
         <p:spPr>
           <a:xfrm>
-            <a:off x="787400" y="1578391"/>
-            <a:ext cx="4635500" cy="4524315"/>
+            <a:off x="787400" y="743089"/>
+            <a:ext cx="4635500" cy="5632311"/>
           </a:xfrm>
           <a:prstGeom prst="rect">
             <a:avLst/>
@@ -5290,90 +5325,6 @@
           </a:bodyPr>
           <a:lstStyle/>
           <a:p>
-            <a:r>
-              <a:rPr lang="en-US" dirty="0" err="1">
-                <a:solidFill>
-                  <a:schemeClr val="bg1"/>
-                </a:solidFill>
-              </a:rPr>
-              <a:t>moduleDemoUI</a:t>
-            </a:r>
-            <a:r>
-              <a:rPr lang="en-US" dirty="0">
-                <a:solidFill>
-                  <a:schemeClr val="bg1"/>
-                </a:solidFill>
-              </a:rPr>
-              <a:t> &lt;- function(id){</a:t>
-            </a:r>
-          </a:p>
-          <a:p>
-            <a:r>
-              <a:rPr lang="en-US" dirty="0">
-                <a:solidFill>
-                  <a:schemeClr val="bg1"/>
-                </a:solidFill>
-              </a:rPr>
-              <a:t>  ns &lt;- NS(id)</a:t>
-            </a:r>
-          </a:p>
-          <a:p>
-            <a:r>
-              <a:rPr lang="en-US" dirty="0">
-                <a:solidFill>
-                  <a:schemeClr val="bg1"/>
-                </a:solidFill>
-              </a:rPr>
-              <a:t>  </a:t>
-            </a:r>
-            <a:r>
-              <a:rPr lang="en-US" dirty="0" err="1">
-                <a:solidFill>
-                  <a:schemeClr val="bg1"/>
-                </a:solidFill>
-              </a:rPr>
-              <a:t>tagList</a:t>
-            </a:r>
-            <a:r>
-              <a:rPr lang="en-US" dirty="0">
-                <a:solidFill>
-                  <a:schemeClr val="bg1"/>
-                </a:solidFill>
-              </a:rPr>
-              <a:t>(</a:t>
-            </a:r>
-          </a:p>
-          <a:p>
-            <a:r>
-              <a:rPr lang="en-US" dirty="0">
-                <a:solidFill>
-                  <a:schemeClr val="bg1"/>
-                </a:solidFill>
-              </a:rPr>
-              <a:t>    # UI elements here</a:t>
-            </a:r>
-          </a:p>
-          <a:p>
-            <a:r>
-              <a:rPr lang="en-US" dirty="0">
-                <a:solidFill>
-                  <a:schemeClr val="bg1"/>
-                </a:solidFill>
-              </a:rPr>
-              <a:t>  )</a:t>
-            </a:r>
-          </a:p>
-          <a:p>
-            <a:r>
-              <a:rPr lang="en-US" dirty="0">
-                <a:solidFill>
-                  <a:schemeClr val="bg1"/>
-                </a:solidFill>
-              </a:rPr>
-              <a:t>}</a:t>
-            </a:r>
-          </a:p>
-          <a:p>
             <a:endParaRPr lang="en-US" dirty="0">
               <a:solidFill>
                 <a:schemeClr val="bg1"/>
@@ -5389,6 +5340,121 @@
           </a:p>
           <a:p>
             <a:r>
+              <a:rPr lang="en-US" dirty="0">
+                <a:solidFill>
+                  <a:schemeClr val="bg1"/>
+                </a:solidFill>
+              </a:rPr>
+              <a:t>(module1.R)</a:t>
+            </a:r>
+          </a:p>
+          <a:p>
+            <a:endParaRPr lang="en-US" dirty="0">
+              <a:solidFill>
+                <a:schemeClr val="bg1"/>
+              </a:solidFill>
+            </a:endParaRPr>
+          </a:p>
+          <a:p>
+            <a:r>
+              <a:rPr lang="en-US" dirty="0" err="1">
+                <a:solidFill>
+                  <a:schemeClr val="bg1"/>
+                </a:solidFill>
+              </a:rPr>
+              <a:t>moduleDemoUI</a:t>
+            </a:r>
+            <a:r>
+              <a:rPr lang="en-US" dirty="0">
+                <a:solidFill>
+                  <a:schemeClr val="bg1"/>
+                </a:solidFill>
+              </a:rPr>
+              <a:t> &lt;- function(id){</a:t>
+            </a:r>
+          </a:p>
+          <a:p>
+            <a:r>
+              <a:rPr lang="en-US" dirty="0">
+                <a:solidFill>
+                  <a:schemeClr val="bg1"/>
+                </a:solidFill>
+              </a:rPr>
+              <a:t>  ns &lt;- NS(id)</a:t>
+            </a:r>
+          </a:p>
+          <a:p>
+            <a:r>
+              <a:rPr lang="en-US" dirty="0">
+                <a:solidFill>
+                  <a:schemeClr val="bg1"/>
+                </a:solidFill>
+              </a:rPr>
+              <a:t>  </a:t>
+            </a:r>
+            <a:r>
+              <a:rPr lang="en-US" dirty="0" err="1">
+                <a:solidFill>
+                  <a:schemeClr val="bg1"/>
+                </a:solidFill>
+              </a:rPr>
+              <a:t>tagList</a:t>
+            </a:r>
+            <a:r>
+              <a:rPr lang="en-US" dirty="0">
+                <a:solidFill>
+                  <a:schemeClr val="bg1"/>
+                </a:solidFill>
+              </a:rPr>
+              <a:t>(</a:t>
+            </a:r>
+          </a:p>
+          <a:p>
+            <a:r>
+              <a:rPr lang="en-US" dirty="0">
+                <a:solidFill>
+                  <a:schemeClr val="bg1"/>
+                </a:solidFill>
+              </a:rPr>
+              <a:t>    # UI elements here</a:t>
+            </a:r>
+          </a:p>
+          <a:p>
+            <a:r>
+              <a:rPr lang="en-US" dirty="0">
+                <a:solidFill>
+                  <a:schemeClr val="bg1"/>
+                </a:solidFill>
+              </a:rPr>
+              <a:t>  )</a:t>
+            </a:r>
+          </a:p>
+          <a:p>
+            <a:r>
+              <a:rPr lang="en-US" dirty="0">
+                <a:solidFill>
+                  <a:schemeClr val="bg1"/>
+                </a:solidFill>
+              </a:rPr>
+              <a:t>}</a:t>
+            </a:r>
+          </a:p>
+          <a:p>
+            <a:endParaRPr lang="en-US" dirty="0">
+              <a:solidFill>
+                <a:schemeClr val="bg1"/>
+              </a:solidFill>
+            </a:endParaRPr>
+          </a:p>
+          <a:p>
+            <a:endParaRPr lang="en-US" dirty="0">
+              <a:solidFill>
+                <a:schemeClr val="bg1"/>
+              </a:solidFill>
+            </a:endParaRPr>
+          </a:p>
+          <a:p>
+            <a:r>
               <a:rPr lang="en-US" dirty="0" err="1">
                 <a:solidFill>
                   <a:schemeClr val="bg1"/>
@@ -5507,7 +5573,7 @@
         </p:nvSpPr>
         <p:spPr>
           <a:xfrm>
-            <a:off x="6477000" y="1893490"/>
+            <a:off x="6438900" y="1582340"/>
             <a:ext cx="4737100" cy="3693319"/>
           </a:xfrm>
           <a:prstGeom prst="rect">
@@ -5772,8 +5838,8 @@
         </p:nvSpPr>
         <p:spPr>
           <a:xfrm>
-            <a:off x="635000" y="2141488"/>
-            <a:ext cx="4635500" cy="3970318"/>
+            <a:off x="635000" y="1366788"/>
+            <a:ext cx="4635500" cy="5078313"/>
           </a:xfrm>
           <a:prstGeom prst="rect">
             <a:avLst/>
@@ -5787,12 +5853,20 @@
           <a:lstStyle/>
           <a:p>
             <a:r>
+              <a:rPr lang="en-US" dirty="0">
+                <a:solidFill>
+                  <a:schemeClr val="bg1"/>
+                </a:solidFill>
+              </a:rPr>
+              <a:t>(</a:t>
+            </a:r>
+            <a:r>
               <a:rPr lang="en-US" dirty="0" err="1">
                 <a:solidFill>
                   <a:schemeClr val="bg1"/>
                 </a:solidFill>
               </a:rPr>
-              <a:t>ui</a:t>
+              <a:t>app.R</a:t>
             </a:r>
             <a:r>
               <a:rPr lang="en-US" dirty="0">
@@ -5800,23 +5874,7 @@
                   <a:schemeClr val="bg1"/>
                 </a:solidFill>
               </a:rPr>
-              <a:t> = </a:t>
-            </a:r>
-            <a:r>
-              <a:rPr lang="en-US" dirty="0" err="1">
-                <a:solidFill>
-                  <a:schemeClr val="bg1"/>
-                </a:solidFill>
-              </a:rPr>
-              <a:t>fluidPage</a:t>
-            </a:r>
-            <a:r>
-              <a:rPr lang="en-US" dirty="0">
-                <a:solidFill>
-                  <a:schemeClr val="bg1"/>
-                </a:solidFill>
-              </a:rPr>
-              <a:t>(</a:t>
+              <a:t>)</a:t>
             </a:r>
           </a:p>
           <a:p>
@@ -5833,39 +5891,7 @@
                   <a:schemeClr val="bg1"/>
                 </a:solidFill>
               </a:rPr>
-              <a:t>  </a:t>
-            </a:r>
-            <a:r>
-              <a:rPr lang="en-US" dirty="0" err="1">
-                <a:solidFill>
-                  <a:schemeClr val="bg1"/>
-                </a:solidFill>
-              </a:rPr>
-              <a:t>moduleDemoUI</a:t>
-            </a:r>
-            <a:r>
-              <a:rPr lang="en-US" dirty="0">
-                <a:solidFill>
-                  <a:schemeClr val="bg1"/>
-                </a:solidFill>
-              </a:rPr>
-              <a:t>(id = "</a:t>
-            </a:r>
-            <a:r>
-              <a:rPr lang="en-US" dirty="0" err="1">
-                <a:solidFill>
-                  <a:schemeClr val="bg1"/>
-                </a:solidFill>
-              </a:rPr>
-              <a:t>data_coverage_module</a:t>
-            </a:r>
-            <a:r>
-              <a:rPr lang="en-US" dirty="0">
-                <a:solidFill>
-                  <a:schemeClr val="bg1"/>
-                </a:solidFill>
-              </a:rPr>
-              <a:t>")</a:t>
+              <a:t>source('module1.R')</a:t>
             </a:r>
           </a:p>
           <a:p>
@@ -5877,12 +5903,36 @@
           </a:p>
           <a:p>
             <a:r>
+              <a:rPr lang="en-US" dirty="0" err="1">
+                <a:solidFill>
+                  <a:schemeClr val="bg1"/>
+                </a:solidFill>
+              </a:rPr>
+              <a:t>ui</a:t>
+            </a:r>
+            <a:r>
               <a:rPr lang="en-US" dirty="0">
                 <a:solidFill>
                   <a:schemeClr val="bg1"/>
                 </a:solidFill>
               </a:rPr>
-              <a:t>  )</a:t>
+              <a:t> = </a:t>
+            </a:r>
+            <a:r>
+              <a:rPr lang="en-US" dirty="0" err="1">
+                <a:solidFill>
+                  <a:schemeClr val="bg1"/>
+                </a:solidFill>
+              </a:rPr>
+              <a:t>fluidPage</a:t>
+            </a:r>
+            <a:r>
+              <a:rPr lang="en-US" dirty="0">
+                <a:solidFill>
+                  <a:schemeClr val="bg1"/>
+                </a:solidFill>
+              </a:rPr>
+              <a:t>(</a:t>
             </a:r>
           </a:p>
           <a:p>
@@ -5893,6 +5943,48 @@
             </a:endParaRPr>
           </a:p>
           <a:p>
+            <a:r>
+              <a:rPr lang="en-US" dirty="0">
+                <a:solidFill>
+                  <a:schemeClr val="bg1"/>
+                </a:solidFill>
+              </a:rPr>
+              <a:t>  </a:t>
+            </a:r>
+            <a:r>
+              <a:rPr lang="en-US" dirty="0" err="1">
+                <a:solidFill>
+                  <a:schemeClr val="bg1"/>
+                </a:solidFill>
+              </a:rPr>
+              <a:t>moduleDemoUI</a:t>
+            </a:r>
+            <a:r>
+              <a:rPr lang="en-US" dirty="0">
+                <a:solidFill>
+                  <a:schemeClr val="bg1"/>
+                </a:solidFill>
+              </a:rPr>
+              <a:t>(id = "</a:t>
+            </a:r>
+            <a:r>
+              <a:rPr lang="en-US" dirty="0" err="1">
+                <a:solidFill>
+                  <a:schemeClr val="bg1"/>
+                </a:solidFill>
+              </a:rPr>
+              <a:t>data_coverage_module</a:t>
+            </a:r>
+            <a:r>
+              <a:rPr lang="en-US" dirty="0">
+                <a:solidFill>
+                  <a:schemeClr val="bg1"/>
+                </a:solidFill>
+              </a:rPr>
+              <a:t>")</a:t>
+            </a:r>
+          </a:p>
+          <a:p>
             <a:endParaRPr lang="en-US" dirty="0">
               <a:solidFill>
                 <a:schemeClr val="bg1"/>
@@ -5906,7 +5998,7 @@
                   <a:schemeClr val="bg1"/>
                 </a:solidFill>
               </a:rPr>
-              <a:t>server = function(input, output, session) {</a:t>
+              <a:t>  )</a:t>
             </a:r>
           </a:p>
           <a:p>
@@ -5917,48 +6009,6 @@
             </a:endParaRPr>
           </a:p>
           <a:p>
-            <a:r>
-              <a:rPr lang="en-US" dirty="0">
-                <a:solidFill>
-                  <a:schemeClr val="bg1"/>
-                </a:solidFill>
-              </a:rPr>
-              <a:t>  </a:t>
-            </a:r>
-            <a:r>
-              <a:rPr lang="en-US" dirty="0" err="1">
-                <a:solidFill>
-                  <a:schemeClr val="bg1"/>
-                </a:solidFill>
-              </a:rPr>
-              <a:t>moduleDemoServer</a:t>
-            </a:r>
-            <a:r>
-              <a:rPr lang="en-US" dirty="0">
-                <a:solidFill>
-                  <a:schemeClr val="bg1"/>
-                </a:solidFill>
-              </a:rPr>
-              <a:t>(id = "</a:t>
-            </a:r>
-            <a:r>
-              <a:rPr lang="en-US" dirty="0" err="1">
-                <a:solidFill>
-                  <a:schemeClr val="bg1"/>
-                </a:solidFill>
-              </a:rPr>
-              <a:t>data_coverage_module</a:t>
-            </a:r>
-            <a:r>
-              <a:rPr lang="en-US" dirty="0">
-                <a:solidFill>
-                  <a:schemeClr val="bg1"/>
-                </a:solidFill>
-              </a:rPr>
-              <a:t>")</a:t>
-            </a:r>
-          </a:p>
-          <a:p>
             <a:endParaRPr lang="en-US" dirty="0">
               <a:solidFill>
                 <a:schemeClr val="bg1"/>
@@ -5972,6 +6022,72 @@
                   <a:schemeClr val="bg1"/>
                 </a:solidFill>
               </a:rPr>
+              <a:t>server = function(input, output, session) {</a:t>
+            </a:r>
+          </a:p>
+          <a:p>
+            <a:endParaRPr lang="en-US" dirty="0">
+              <a:solidFill>
+                <a:schemeClr val="bg1"/>
+              </a:solidFill>
+            </a:endParaRPr>
+          </a:p>
+          <a:p>
+            <a:r>
+              <a:rPr lang="en-US" dirty="0">
+                <a:solidFill>
+                  <a:schemeClr val="bg1"/>
+                </a:solidFill>
+              </a:rPr>
+              <a:t>  </a:t>
+            </a:r>
+            <a:r>
+              <a:rPr lang="en-US" dirty="0" err="1">
+                <a:solidFill>
+                  <a:schemeClr val="bg1"/>
+                </a:solidFill>
+              </a:rPr>
+              <a:t>moduleDemoServer</a:t>
+            </a:r>
+            <a:r>
+              <a:rPr lang="en-US" dirty="0">
+                <a:solidFill>
+                  <a:schemeClr val="bg1"/>
+                </a:solidFill>
+              </a:rPr>
+              <a:t>(id = "</a:t>
+            </a:r>
+            <a:r>
+              <a:rPr lang="en-US" dirty="0" err="1">
+                <a:solidFill>
+                  <a:schemeClr val="bg1"/>
+                </a:solidFill>
+              </a:rPr>
+              <a:t>data_coverage_module</a:t>
+            </a:r>
+            <a:r>
+              <a:rPr lang="en-US" dirty="0">
+                <a:solidFill>
+                  <a:schemeClr val="bg1"/>
+                </a:solidFill>
+              </a:rPr>
+              <a:t>")</a:t>
+            </a:r>
+          </a:p>
+          <a:p>
+            <a:endParaRPr lang="en-US" dirty="0">
+              <a:solidFill>
+                <a:schemeClr val="bg1"/>
+              </a:solidFill>
+            </a:endParaRPr>
+          </a:p>
+          <a:p>
+            <a:r>
+              <a:rPr lang="en-US" dirty="0">
+                <a:solidFill>
+                  <a:schemeClr val="bg1"/>
+                </a:solidFill>
+              </a:rPr>
               <a:t>  }</a:t>
             </a:r>
           </a:p>
@@ -5991,8 +6107,8 @@
         </p:nvSpPr>
         <p:spPr>
           <a:xfrm>
-            <a:off x="6477000" y="1893490"/>
-            <a:ext cx="4737100" cy="369332"/>
+            <a:off x="6502400" y="1354088"/>
+            <a:ext cx="5219700" cy="5078313"/>
           </a:xfrm>
           <a:prstGeom prst="rect">
             <a:avLst/>
@@ -6006,9 +6122,103 @@
           <a:lstStyle/>
           <a:p>
             <a:r>
+              <a:rPr lang="en-GB" b="1" dirty="0">
+                <a:solidFill>
+                  <a:srgbClr val="2B2B2B"/>
+                </a:solidFill>
+              </a:rPr>
+              <a:t>Working together</a:t>
+            </a:r>
+          </a:p>
+          <a:p>
+            <a:endParaRPr lang="en-GB" dirty="0">
+              <a:solidFill>
+                <a:srgbClr val="2B2B2B"/>
+              </a:solidFill>
+            </a:endParaRPr>
+          </a:p>
+          <a:p>
+            <a:r>
+              <a:rPr lang="en-GB" b="0" i="0" u="none" strike="noStrike" dirty="0">
+                <a:solidFill>
+                  <a:srgbClr val="2B2B2B"/>
+                </a:solidFill>
+                <a:effectLst/>
+              </a:rPr>
+              <a:t>To make the module server aware of the namespace, you need to pass in the ID of the module UI you want that server module to work with.</a:t>
+            </a:r>
+          </a:p>
+          <a:p>
+            <a:endParaRPr lang="en-GB" dirty="0"/>
+          </a:p>
+          <a:p>
+            <a:r>
               <a:rPr lang="en-GB" dirty="0"/>
-              <a:t>IDs</a:t>
-            </a:r>
+              <a:t>Modules can be reused in the main app: </a:t>
+            </a:r>
+            <a:r>
+              <a:rPr lang="en-GB" b="0" i="0" u="none" strike="noStrike" dirty="0">
+                <a:effectLst/>
+              </a:rPr>
+              <a:t>simply give each instance its own ID. E.g. </a:t>
+            </a:r>
+          </a:p>
+          <a:p>
+            <a:endParaRPr lang="en-GB" dirty="0"/>
+          </a:p>
+          <a:p>
+            <a:r>
+              <a:rPr lang="en-US" dirty="0" err="1"/>
+              <a:t>moduleDemoUI</a:t>
+            </a:r>
+            <a:r>
+              <a:rPr lang="en-US" dirty="0"/>
+              <a:t>(id = "data_coverage_module1")</a:t>
+            </a:r>
+          </a:p>
+          <a:p>
+            <a:r>
+              <a:rPr lang="en-US" dirty="0" err="1"/>
+              <a:t>moduleDemoUI</a:t>
+            </a:r>
+            <a:r>
+              <a:rPr lang="en-US" dirty="0"/>
+              <a:t>(id = "data_coverage_module2")</a:t>
+            </a:r>
+          </a:p>
+          <a:p>
+            <a:endParaRPr lang="en-US" dirty="0"/>
+          </a:p>
+          <a:p>
+            <a:r>
+              <a:rPr lang="en-US" dirty="0" err="1"/>
+              <a:t>moduleDemoServer</a:t>
+            </a:r>
+            <a:r>
+              <a:rPr lang="en-US" dirty="0"/>
+              <a:t>(id = "data_coverage_module1")</a:t>
+            </a:r>
+          </a:p>
+          <a:p>
+            <a:r>
+              <a:rPr lang="en-US" dirty="0" err="1"/>
+              <a:t>moduleDemoServer</a:t>
+            </a:r>
+            <a:r>
+              <a:rPr lang="en-US" dirty="0"/>
+              <a:t>(id = "data_coverage_module2")</a:t>
+            </a:r>
+          </a:p>
+          <a:p>
+            <a:endParaRPr lang="en-US" dirty="0"/>
+          </a:p>
+          <a:p>
+            <a:endParaRPr lang="en-US" dirty="0"/>
+          </a:p>
+          <a:p>
+            <a:endParaRPr lang="en-US" dirty="0"/>
+          </a:p>
+          <a:p>
             <a:endParaRPr lang="en-US" dirty="0"/>
           </a:p>
         </p:txBody>
@@ -6077,7 +6287,7 @@
                   <a:srgbClr val="C00000"/>
                 </a:solidFill>
               </a:rPr>
-              <a:t>Using External input in Modules</a:t>
+              <a:t>Using External input in Modules – Global Input</a:t>
             </a:r>
           </a:p>
         </p:txBody>
@@ -6130,9 +6340,9 @@
           <a:lstStyle/>
           <a:p>
             <a:pPr algn="ctr"/>
-            <a:endParaRPr lang="en-US">
+            <a:endParaRPr lang="en-US" dirty="0">
               <a:solidFill>
-                <a:srgbClr val="C00000"/>
+                <a:schemeClr val="bg1"/>
               </a:solidFill>
             </a:endParaRPr>
           </a:p>

</xml_diff>

<commit_message>
updated slides on how to use the modules calling global input variables
</commit_message>
<xml_diff>
--- a/BHF_Dashboards/BHF_DSC_TRE_External_Dashboard/Dev/Modules Example.pptx
+++ b/BHF_Dashboards/BHF_DSC_TRE_External_Dashboard/Dev/Modules Example.pptx
@@ -201,7 +201,7 @@
           <a:p>
             <a:fld id="{BE7BC243-463F-4F42-AD26-AB947A3A3B57}" type="datetimeFigureOut">
               <a:rPr lang="en-US" smtClean="0"/>
-              <a:t>10/26/22</a:t>
+              <a:t>10/27/22</a:t>
             </a:fld>
             <a:endParaRPr lang="en-US"/>
           </a:p>
@@ -992,7 +992,7 @@
           <a:p>
             <a:fld id="{FF5D30FB-034D-5246-8EB2-7100765C6A1C}" type="datetimeFigureOut">
               <a:rPr lang="en-US" smtClean="0"/>
-              <a:t>10/26/22</a:t>
+              <a:t>10/27/22</a:t>
             </a:fld>
             <a:endParaRPr lang="en-US"/>
           </a:p>
@@ -1192,7 +1192,7 @@
           <a:p>
             <a:fld id="{FF5D30FB-034D-5246-8EB2-7100765C6A1C}" type="datetimeFigureOut">
               <a:rPr lang="en-US" smtClean="0"/>
-              <a:t>10/26/22</a:t>
+              <a:t>10/27/22</a:t>
             </a:fld>
             <a:endParaRPr lang="en-US"/>
           </a:p>
@@ -1402,7 +1402,7 @@
           <a:p>
             <a:fld id="{FF5D30FB-034D-5246-8EB2-7100765C6A1C}" type="datetimeFigureOut">
               <a:rPr lang="en-US" smtClean="0"/>
-              <a:t>10/26/22</a:t>
+              <a:t>10/27/22</a:t>
             </a:fld>
             <a:endParaRPr lang="en-US"/>
           </a:p>
@@ -1602,7 +1602,7 @@
           <a:p>
             <a:fld id="{FF5D30FB-034D-5246-8EB2-7100765C6A1C}" type="datetimeFigureOut">
               <a:rPr lang="en-US" smtClean="0"/>
-              <a:t>10/26/22</a:t>
+              <a:t>10/27/22</a:t>
             </a:fld>
             <a:endParaRPr lang="en-US"/>
           </a:p>
@@ -1878,7 +1878,7 @@
           <a:p>
             <a:fld id="{FF5D30FB-034D-5246-8EB2-7100765C6A1C}" type="datetimeFigureOut">
               <a:rPr lang="en-US" smtClean="0"/>
-              <a:t>10/26/22</a:t>
+              <a:t>10/27/22</a:t>
             </a:fld>
             <a:endParaRPr lang="en-US"/>
           </a:p>
@@ -2146,7 +2146,7 @@
           <a:p>
             <a:fld id="{FF5D30FB-034D-5246-8EB2-7100765C6A1C}" type="datetimeFigureOut">
               <a:rPr lang="en-US" smtClean="0"/>
-              <a:t>10/26/22</a:t>
+              <a:t>10/27/22</a:t>
             </a:fld>
             <a:endParaRPr lang="en-US"/>
           </a:p>
@@ -2561,7 +2561,7 @@
           <a:p>
             <a:fld id="{FF5D30FB-034D-5246-8EB2-7100765C6A1C}" type="datetimeFigureOut">
               <a:rPr lang="en-US" smtClean="0"/>
-              <a:t>10/26/22</a:t>
+              <a:t>10/27/22</a:t>
             </a:fld>
             <a:endParaRPr lang="en-US"/>
           </a:p>
@@ -2703,7 +2703,7 @@
           <a:p>
             <a:fld id="{FF5D30FB-034D-5246-8EB2-7100765C6A1C}" type="datetimeFigureOut">
               <a:rPr lang="en-US" smtClean="0"/>
-              <a:t>10/26/22</a:t>
+              <a:t>10/27/22</a:t>
             </a:fld>
             <a:endParaRPr lang="en-US"/>
           </a:p>
@@ -2816,7 +2816,7 @@
           <a:p>
             <a:fld id="{FF5D30FB-034D-5246-8EB2-7100765C6A1C}" type="datetimeFigureOut">
               <a:rPr lang="en-US" smtClean="0"/>
-              <a:t>10/26/22</a:t>
+              <a:t>10/27/22</a:t>
             </a:fld>
             <a:endParaRPr lang="en-US"/>
           </a:p>
@@ -3129,7 +3129,7 @@
           <a:p>
             <a:fld id="{FF5D30FB-034D-5246-8EB2-7100765C6A1C}" type="datetimeFigureOut">
               <a:rPr lang="en-US" smtClean="0"/>
-              <a:t>10/26/22</a:t>
+              <a:t>10/27/22</a:t>
             </a:fld>
             <a:endParaRPr lang="en-US"/>
           </a:p>
@@ -3418,7 +3418,7 @@
           <a:p>
             <a:fld id="{FF5D30FB-034D-5246-8EB2-7100765C6A1C}" type="datetimeFigureOut">
               <a:rPr lang="en-US" smtClean="0"/>
-              <a:t>10/26/22</a:t>
+              <a:t>10/27/22</a:t>
             </a:fld>
             <a:endParaRPr lang="en-US"/>
           </a:p>
@@ -3661,7 +3661,7 @@
           <a:p>
             <a:fld id="{FF5D30FB-034D-5246-8EB2-7100765C6A1C}" type="datetimeFigureOut">
               <a:rPr lang="en-US" smtClean="0"/>
-              <a:t>10/26/22</a:t>
+              <a:t>10/27/22</a:t>
             </a:fld>
             <a:endParaRPr lang="en-US"/>
           </a:p>
@@ -5260,7 +5260,7 @@
         <p:spPr>
           <a:xfrm>
             <a:off x="381000" y="1041400"/>
-            <a:ext cx="5041900" cy="5397500"/>
+            <a:ext cx="5143500" cy="5397500"/>
           </a:xfrm>
           <a:prstGeom prst="roundRect">
             <a:avLst/>
@@ -5312,7 +5312,7 @@
         <p:spPr>
           <a:xfrm>
             <a:off x="787400" y="743089"/>
-            <a:ext cx="4635500" cy="5632311"/>
+            <a:ext cx="4140200" cy="5632311"/>
           </a:xfrm>
           <a:prstGeom prst="rect">
             <a:avLst/>
@@ -5783,7 +5783,7 @@
         <p:spPr>
           <a:xfrm>
             <a:off x="381000" y="1041400"/>
-            <a:ext cx="5041900" cy="5397500"/>
+            <a:ext cx="5118100" cy="5397500"/>
           </a:xfrm>
           <a:prstGeom prst="roundRect">
             <a:avLst/>
@@ -6108,7 +6108,7 @@
         <p:spPr>
           <a:xfrm>
             <a:off x="6502400" y="1354088"/>
-            <a:ext cx="5219700" cy="5078313"/>
+            <a:ext cx="5219700" cy="5632311"/>
           </a:xfrm>
           <a:prstGeom prst="rect">
             <a:avLst/>
@@ -6207,6 +6207,15 @@
             <a:r>
               <a:rPr lang="en-US" dirty="0"/>
               <a:t>(id = "data_coverage_module2")</a:t>
+            </a:r>
+          </a:p>
+          <a:p>
+            <a:endParaRPr lang="en-US" dirty="0"/>
+          </a:p>
+          <a:p>
+            <a:r>
+              <a:rPr lang="en-US" dirty="0"/>
+              <a:t>Remember to source your module script!</a:t>
             </a:r>
           </a:p>
           <a:p>
@@ -6653,7 +6662,7 @@
         <p:spPr>
           <a:xfrm>
             <a:off x="381000" y="1041400"/>
-            <a:ext cx="5041900" cy="5397500"/>
+            <a:ext cx="5626100" cy="1447800"/>
           </a:xfrm>
           <a:prstGeom prst="roundRect">
             <a:avLst/>
@@ -6691,6 +6700,701 @@
                 <a:schemeClr val="bg1"/>
               </a:solidFill>
             </a:endParaRPr>
+          </a:p>
+        </p:txBody>
+      </p:sp>
+      <p:sp>
+        <p:nvSpPr>
+          <p:cNvPr id="2" name="TextBox 1">
+            <a:extLst>
+              <a:ext uri="{FF2B5EF4-FFF2-40B4-BE49-F238E27FC236}">
+                <a16:creationId xmlns:a16="http://schemas.microsoft.com/office/drawing/2014/main" id="{7437A0CD-55CC-1A6F-1EF8-4A93B210A561}"/>
+              </a:ext>
+            </a:extLst>
+          </p:cNvPr>
+          <p:cNvSpPr txBox="1"/>
+          <p:nvPr/>
+        </p:nvSpPr>
+        <p:spPr>
+          <a:xfrm>
+            <a:off x="6134100" y="1070054"/>
+            <a:ext cx="5219700" cy="1754326"/>
+          </a:xfrm>
+          <a:prstGeom prst="rect">
+            <a:avLst/>
+          </a:prstGeom>
+          <a:noFill/>
+        </p:spPr>
+        <p:txBody>
+          <a:bodyPr wrap="square" rtlCol="0">
+            <a:spAutoFit/>
+          </a:bodyPr>
+          <a:lstStyle/>
+          <a:p>
+            <a:r>
+              <a:rPr lang="en-GB" dirty="0">
+                <a:solidFill>
+                  <a:srgbClr val="2B2B2B"/>
+                </a:solidFill>
+              </a:rPr>
+              <a:t>The global input has been passed (as a reactive) to the server in the main app.</a:t>
+            </a:r>
+          </a:p>
+          <a:p>
+            <a:endParaRPr lang="en-US" dirty="0"/>
+          </a:p>
+          <a:p>
+            <a:endParaRPr lang="en-US" dirty="0"/>
+          </a:p>
+          <a:p>
+            <a:endParaRPr lang="en-US" dirty="0"/>
+          </a:p>
+          <a:p>
+            <a:endParaRPr lang="en-US" dirty="0"/>
+          </a:p>
+        </p:txBody>
+      </p:sp>
+      <p:sp>
+        <p:nvSpPr>
+          <p:cNvPr id="3" name="TextBox 2">
+            <a:extLst>
+              <a:ext uri="{FF2B5EF4-FFF2-40B4-BE49-F238E27FC236}">
+                <a16:creationId xmlns:a16="http://schemas.microsoft.com/office/drawing/2014/main" id="{102D577D-354B-F2F3-17E8-EF19A2EE86F6}"/>
+              </a:ext>
+            </a:extLst>
+          </p:cNvPr>
+          <p:cNvSpPr txBox="1"/>
+          <p:nvPr/>
+        </p:nvSpPr>
+        <p:spPr>
+          <a:xfrm>
+            <a:off x="6223000" y="2331470"/>
+            <a:ext cx="4965700" cy="2585323"/>
+          </a:xfrm>
+          <a:prstGeom prst="rect">
+            <a:avLst/>
+          </a:prstGeom>
+          <a:noFill/>
+        </p:spPr>
+        <p:txBody>
+          <a:bodyPr wrap="square" rtlCol="0">
+            <a:spAutoFit/>
+          </a:bodyPr>
+          <a:lstStyle/>
+          <a:p>
+            <a:endParaRPr lang="en-GB" dirty="0">
+              <a:solidFill>
+                <a:srgbClr val="2B2B2B"/>
+              </a:solidFill>
+            </a:endParaRPr>
+          </a:p>
+          <a:p>
+            <a:r>
+              <a:rPr lang="en-GB" dirty="0">
+                <a:solidFill>
+                  <a:srgbClr val="2B2B2B"/>
+                </a:solidFill>
+              </a:rPr>
+              <a:t>For you to use these global variables you need to pass these as arguments into your module server.</a:t>
+            </a:r>
+          </a:p>
+          <a:p>
+            <a:endParaRPr lang="en-GB" dirty="0">
+              <a:solidFill>
+                <a:srgbClr val="2B2B2B"/>
+              </a:solidFill>
+            </a:endParaRPr>
+          </a:p>
+          <a:p>
+            <a:r>
+              <a:rPr lang="en-GB" dirty="0">
+                <a:solidFill>
+                  <a:srgbClr val="2B2B2B"/>
+                </a:solidFill>
+              </a:rPr>
+              <a:t>To use this global input in your logic section call </a:t>
+            </a:r>
+            <a:r>
+              <a:rPr lang="en-GB" dirty="0" err="1">
+                <a:solidFill>
+                  <a:srgbClr val="2B2B2B"/>
+                </a:solidFill>
+              </a:rPr>
+              <a:t>dataset_summary</a:t>
+            </a:r>
+            <a:r>
+              <a:rPr lang="en-GB" dirty="0">
+                <a:solidFill>
+                  <a:srgbClr val="2B2B2B"/>
+                </a:solidFill>
+              </a:rPr>
+              <a:t>() – noting that you are calling a reactive and not calling the input in the usual way e.g. </a:t>
+            </a:r>
+            <a:r>
+              <a:rPr lang="en-GB" dirty="0" err="1">
+                <a:solidFill>
+                  <a:srgbClr val="2B2B2B"/>
+                </a:solidFill>
+              </a:rPr>
+              <a:t>input$global_summary</a:t>
+            </a:r>
+            <a:endParaRPr lang="en-US" dirty="0"/>
+          </a:p>
+          <a:p>
+            <a:endParaRPr lang="en-US" dirty="0"/>
+          </a:p>
+        </p:txBody>
+      </p:sp>
+      <p:sp>
+        <p:nvSpPr>
+          <p:cNvPr id="5" name="TextBox 4">
+            <a:extLst>
+              <a:ext uri="{FF2B5EF4-FFF2-40B4-BE49-F238E27FC236}">
+                <a16:creationId xmlns:a16="http://schemas.microsoft.com/office/drawing/2014/main" id="{D7528CEA-6E16-2F8B-94A0-74D84E9C5DC4}"/>
+              </a:ext>
+            </a:extLst>
+          </p:cNvPr>
+          <p:cNvSpPr txBox="1"/>
+          <p:nvPr/>
+        </p:nvSpPr>
+        <p:spPr>
+          <a:xfrm>
+            <a:off x="933450" y="1610320"/>
+            <a:ext cx="3784600" cy="646331"/>
+          </a:xfrm>
+          <a:prstGeom prst="rect">
+            <a:avLst/>
+          </a:prstGeom>
+          <a:noFill/>
+        </p:spPr>
+        <p:txBody>
+          <a:bodyPr wrap="square" rtlCol="0">
+            <a:spAutoFit/>
+          </a:bodyPr>
+          <a:lstStyle/>
+          <a:p>
+            <a:pPr algn="ctr"/>
+            <a:r>
+              <a:rPr lang="en-US" dirty="0" err="1">
+                <a:solidFill>
+                  <a:schemeClr val="bg1"/>
+                </a:solidFill>
+              </a:rPr>
+              <a:t>global_dataset_summary</a:t>
+            </a:r>
+            <a:r>
+              <a:rPr lang="en-US" dirty="0">
+                <a:solidFill>
+                  <a:schemeClr val="bg1"/>
+                </a:solidFill>
+              </a:rPr>
+              <a:t> &lt;- reactive(</a:t>
+            </a:r>
+            <a:r>
+              <a:rPr lang="en-US" dirty="0" err="1">
+                <a:solidFill>
+                  <a:schemeClr val="bg1"/>
+                </a:solidFill>
+              </a:rPr>
+              <a:t>input$dataset_summary</a:t>
+            </a:r>
+            <a:r>
+              <a:rPr lang="en-US" dirty="0">
+                <a:solidFill>
+                  <a:schemeClr val="bg1"/>
+                </a:solidFill>
+              </a:rPr>
+              <a:t>)</a:t>
+            </a:r>
+          </a:p>
+        </p:txBody>
+      </p:sp>
+      <p:sp>
+        <p:nvSpPr>
+          <p:cNvPr id="8" name="TextBox 7">
+            <a:extLst>
+              <a:ext uri="{FF2B5EF4-FFF2-40B4-BE49-F238E27FC236}">
+                <a16:creationId xmlns:a16="http://schemas.microsoft.com/office/drawing/2014/main" id="{ADA7A310-8FC4-16B6-F41B-BC9368EE46A5}"/>
+              </a:ext>
+            </a:extLst>
+          </p:cNvPr>
+          <p:cNvSpPr txBox="1"/>
+          <p:nvPr/>
+        </p:nvSpPr>
+        <p:spPr>
+          <a:xfrm>
+            <a:off x="546100" y="1141194"/>
+            <a:ext cx="4635500" cy="369332"/>
+          </a:xfrm>
+          <a:prstGeom prst="rect">
+            <a:avLst/>
+          </a:prstGeom>
+          <a:noFill/>
+        </p:spPr>
+        <p:txBody>
+          <a:bodyPr wrap="square">
+            <a:spAutoFit/>
+          </a:bodyPr>
+          <a:lstStyle/>
+          <a:p>
+            <a:r>
+              <a:rPr lang="en-US" dirty="0">
+                <a:solidFill>
+                  <a:schemeClr val="bg1"/>
+                </a:solidFill>
+              </a:rPr>
+              <a:t>(</a:t>
+            </a:r>
+            <a:r>
+              <a:rPr lang="en-US" dirty="0" err="1">
+                <a:solidFill>
+                  <a:schemeClr val="bg1"/>
+                </a:solidFill>
+              </a:rPr>
+              <a:t>app.R</a:t>
+            </a:r>
+            <a:r>
+              <a:rPr lang="en-US" dirty="0">
+                <a:solidFill>
+                  <a:schemeClr val="bg1"/>
+                </a:solidFill>
+              </a:rPr>
+              <a:t> Server)</a:t>
+            </a:r>
+          </a:p>
+        </p:txBody>
+      </p:sp>
+      <p:sp>
+        <p:nvSpPr>
+          <p:cNvPr id="9" name="Rounded Rectangle 8">
+            <a:extLst>
+              <a:ext uri="{FF2B5EF4-FFF2-40B4-BE49-F238E27FC236}">
+                <a16:creationId xmlns:a16="http://schemas.microsoft.com/office/drawing/2014/main" id="{473904C0-D68B-2568-FE57-BC222EC74194}"/>
+              </a:ext>
+            </a:extLst>
+          </p:cNvPr>
+          <p:cNvSpPr/>
+          <p:nvPr/>
+        </p:nvSpPr>
+        <p:spPr>
+          <a:xfrm>
+            <a:off x="381000" y="2501900"/>
+            <a:ext cx="5626100" cy="2745780"/>
+          </a:xfrm>
+          <a:prstGeom prst="roundRect">
+            <a:avLst/>
+          </a:prstGeom>
+          <a:solidFill>
+            <a:srgbClr val="FF2600"/>
+          </a:solidFill>
+          <a:ln>
+            <a:noFill/>
+          </a:ln>
+        </p:spPr>
+        <p:style>
+          <a:lnRef idx="2">
+            <a:schemeClr val="accent1">
+              <a:shade val="50000"/>
+            </a:schemeClr>
+          </a:lnRef>
+          <a:fillRef idx="1">
+            <a:schemeClr val="accent1"/>
+          </a:fillRef>
+          <a:effectRef idx="0">
+            <a:schemeClr val="accent1"/>
+          </a:effectRef>
+          <a:fontRef idx="minor">
+            <a:schemeClr val="lt1"/>
+          </a:fontRef>
+        </p:style>
+        <p:txBody>
+          <a:bodyPr rtlCol="0" anchor="ctr"/>
+          <a:lstStyle/>
+          <a:p>
+            <a:pPr algn="ctr"/>
+            <a:endParaRPr lang="en-US"/>
+          </a:p>
+        </p:txBody>
+      </p:sp>
+      <p:sp>
+        <p:nvSpPr>
+          <p:cNvPr id="10" name="TextBox 9">
+            <a:extLst>
+              <a:ext uri="{FF2B5EF4-FFF2-40B4-BE49-F238E27FC236}">
+                <a16:creationId xmlns:a16="http://schemas.microsoft.com/office/drawing/2014/main" id="{A51CBCCB-7141-67F1-C272-AF669F9BC71C}"/>
+              </a:ext>
+            </a:extLst>
+          </p:cNvPr>
+          <p:cNvSpPr txBox="1"/>
+          <p:nvPr/>
+        </p:nvSpPr>
+        <p:spPr>
+          <a:xfrm>
+            <a:off x="469900" y="2678192"/>
+            <a:ext cx="5626100" cy="2308324"/>
+          </a:xfrm>
+          <a:prstGeom prst="rect">
+            <a:avLst/>
+          </a:prstGeom>
+          <a:noFill/>
+        </p:spPr>
+        <p:txBody>
+          <a:bodyPr wrap="square" rtlCol="0">
+            <a:spAutoFit/>
+          </a:bodyPr>
+          <a:lstStyle/>
+          <a:p>
+            <a:r>
+              <a:rPr lang="en-US" dirty="0">
+                <a:solidFill>
+                  <a:schemeClr val="bg1"/>
+                </a:solidFill>
+              </a:rPr>
+              <a:t>(module1.R)</a:t>
+            </a:r>
+          </a:p>
+          <a:p>
+            <a:endParaRPr lang="en-US" dirty="0">
+              <a:solidFill>
+                <a:schemeClr val="bg1"/>
+              </a:solidFill>
+            </a:endParaRPr>
+          </a:p>
+          <a:p>
+            <a:r>
+              <a:rPr lang="en-US" dirty="0" err="1">
+                <a:solidFill>
+                  <a:schemeClr val="bg1"/>
+                </a:solidFill>
+              </a:rPr>
+              <a:t>moduleDemoServer</a:t>
+            </a:r>
+            <a:r>
+              <a:rPr lang="en-US" dirty="0">
+                <a:solidFill>
+                  <a:schemeClr val="bg1"/>
+                </a:solidFill>
+              </a:rPr>
+              <a:t>&lt;- function(id, </a:t>
+            </a:r>
+            <a:r>
+              <a:rPr lang="en-US" dirty="0" err="1">
+                <a:solidFill>
+                  <a:schemeClr val="bg1"/>
+                </a:solidFill>
+              </a:rPr>
+              <a:t>dataset_summary</a:t>
+            </a:r>
+            <a:r>
+              <a:rPr lang="en-US" dirty="0">
+                <a:solidFill>
+                  <a:schemeClr val="bg1"/>
+                </a:solidFill>
+              </a:rPr>
+              <a:t>){</a:t>
+            </a:r>
+          </a:p>
+          <a:p>
+            <a:r>
+              <a:rPr lang="en-US" dirty="0">
+                <a:solidFill>
+                  <a:schemeClr val="bg1"/>
+                </a:solidFill>
+              </a:rPr>
+              <a:t>  </a:t>
+            </a:r>
+            <a:r>
+              <a:rPr lang="en-US" dirty="0" err="1">
+                <a:solidFill>
+                  <a:schemeClr val="bg1"/>
+                </a:solidFill>
+              </a:rPr>
+              <a:t>moduleServer</a:t>
+            </a:r>
+            <a:r>
+              <a:rPr lang="en-US" dirty="0">
+                <a:solidFill>
+                  <a:schemeClr val="bg1"/>
+                </a:solidFill>
+              </a:rPr>
+              <a:t>(</a:t>
+            </a:r>
+          </a:p>
+          <a:p>
+            <a:r>
+              <a:rPr lang="en-US" dirty="0">
+                <a:solidFill>
+                  <a:schemeClr val="bg1"/>
+                </a:solidFill>
+              </a:rPr>
+              <a:t>    id,</a:t>
+            </a:r>
+          </a:p>
+          <a:p>
+            <a:r>
+              <a:rPr lang="en-US" dirty="0">
+                <a:solidFill>
+                  <a:schemeClr val="bg1"/>
+                </a:solidFill>
+              </a:rPr>
+              <a:t>    function(input, output, session){</a:t>
+            </a:r>
+          </a:p>
+          <a:p>
+            <a:r>
+              <a:rPr lang="en-US" dirty="0">
+                <a:solidFill>
+                  <a:schemeClr val="bg1"/>
+                </a:solidFill>
+              </a:rPr>
+              <a:t>      # logic here</a:t>
+            </a:r>
+          </a:p>
+          <a:p>
+            <a:r>
+              <a:rPr lang="en-US" dirty="0">
+                <a:solidFill>
+                  <a:schemeClr val="bg1"/>
+                </a:solidFill>
+              </a:rPr>
+              <a:t>    }</a:t>
+            </a:r>
+          </a:p>
+        </p:txBody>
+      </p:sp>
+      <p:sp>
+        <p:nvSpPr>
+          <p:cNvPr id="11" name="Rounded Rectangle 10">
+            <a:extLst>
+              <a:ext uri="{FF2B5EF4-FFF2-40B4-BE49-F238E27FC236}">
+                <a16:creationId xmlns:a16="http://schemas.microsoft.com/office/drawing/2014/main" id="{8FCCC83D-4B11-7205-AA74-73C9DE0919E6}"/>
+              </a:ext>
+            </a:extLst>
+          </p:cNvPr>
+          <p:cNvSpPr/>
+          <p:nvPr/>
+        </p:nvSpPr>
+        <p:spPr>
+          <a:xfrm>
+            <a:off x="381000" y="5270500"/>
+            <a:ext cx="5626100" cy="1397000"/>
+          </a:xfrm>
+          <a:prstGeom prst="roundRect">
+            <a:avLst/>
+          </a:prstGeom>
+          <a:solidFill>
+            <a:srgbClr val="FF7E79"/>
+          </a:solidFill>
+          <a:ln>
+            <a:noFill/>
+          </a:ln>
+        </p:spPr>
+        <p:style>
+          <a:lnRef idx="2">
+            <a:schemeClr val="accent1">
+              <a:shade val="50000"/>
+            </a:schemeClr>
+          </a:lnRef>
+          <a:fillRef idx="1">
+            <a:schemeClr val="accent1"/>
+          </a:fillRef>
+          <a:effectRef idx="0">
+            <a:schemeClr val="accent1"/>
+          </a:effectRef>
+          <a:fontRef idx="minor">
+            <a:schemeClr val="lt1"/>
+          </a:fontRef>
+        </p:style>
+        <p:txBody>
+          <a:bodyPr rtlCol="0" anchor="ctr"/>
+          <a:lstStyle/>
+          <a:p>
+            <a:pPr algn="ctr"/>
+            <a:endParaRPr lang="en-US">
+              <a:solidFill>
+                <a:srgbClr val="FF7E79"/>
+              </a:solidFill>
+            </a:endParaRPr>
+          </a:p>
+        </p:txBody>
+      </p:sp>
+      <p:sp>
+        <p:nvSpPr>
+          <p:cNvPr id="13" name="TextBox 12">
+            <a:extLst>
+              <a:ext uri="{FF2B5EF4-FFF2-40B4-BE49-F238E27FC236}">
+                <a16:creationId xmlns:a16="http://schemas.microsoft.com/office/drawing/2014/main" id="{CB7B6733-4DEE-6918-217C-A09AC4339578}"/>
+              </a:ext>
+            </a:extLst>
+          </p:cNvPr>
+          <p:cNvSpPr txBox="1"/>
+          <p:nvPr/>
+        </p:nvSpPr>
+        <p:spPr>
+          <a:xfrm>
+            <a:off x="476250" y="5354935"/>
+            <a:ext cx="6096000" cy="1200329"/>
+          </a:xfrm>
+          <a:prstGeom prst="rect">
+            <a:avLst/>
+          </a:prstGeom>
+          <a:noFill/>
+        </p:spPr>
+        <p:txBody>
+          <a:bodyPr wrap="square">
+            <a:spAutoFit/>
+          </a:bodyPr>
+          <a:lstStyle/>
+          <a:p>
+            <a:r>
+              <a:rPr lang="en-US" dirty="0">
+                <a:solidFill>
+                  <a:schemeClr val="bg1"/>
+                </a:solidFill>
+              </a:rPr>
+              <a:t>(</a:t>
+            </a:r>
+            <a:r>
+              <a:rPr lang="en-US" dirty="0" err="1">
+                <a:solidFill>
+                  <a:schemeClr val="bg1"/>
+                </a:solidFill>
+              </a:rPr>
+              <a:t>app.R</a:t>
+            </a:r>
+            <a:r>
+              <a:rPr lang="en-US" dirty="0">
+                <a:solidFill>
+                  <a:schemeClr val="bg1"/>
+                </a:solidFill>
+              </a:rPr>
+              <a:t> Server)</a:t>
+            </a:r>
+          </a:p>
+          <a:p>
+            <a:endParaRPr lang="en-US" dirty="0">
+              <a:solidFill>
+                <a:schemeClr val="bg1"/>
+              </a:solidFill>
+            </a:endParaRPr>
+          </a:p>
+          <a:p>
+            <a:r>
+              <a:rPr lang="en-US" dirty="0" err="1">
+                <a:solidFill>
+                  <a:schemeClr val="bg1"/>
+                </a:solidFill>
+              </a:rPr>
+              <a:t>moduleDemoServer</a:t>
+            </a:r>
+            <a:r>
+              <a:rPr lang="en-US" dirty="0">
+                <a:solidFill>
+                  <a:schemeClr val="bg1"/>
+                </a:solidFill>
+              </a:rPr>
+              <a:t>(id = "</a:t>
+            </a:r>
+            <a:r>
+              <a:rPr lang="en-US" dirty="0" err="1">
+                <a:solidFill>
+                  <a:schemeClr val="bg1"/>
+                </a:solidFill>
+              </a:rPr>
+              <a:t>data_coverage_module</a:t>
+            </a:r>
+            <a:r>
+              <a:rPr lang="en-US" dirty="0">
+                <a:solidFill>
+                  <a:schemeClr val="bg1"/>
+                </a:solidFill>
+              </a:rPr>
+              <a:t>”,</a:t>
+            </a:r>
+          </a:p>
+          <a:p>
+            <a:r>
+              <a:rPr lang="en-US" dirty="0" err="1">
+                <a:solidFill>
+                  <a:schemeClr val="bg1"/>
+                </a:solidFill>
+              </a:rPr>
+              <a:t>dataset_summary</a:t>
+            </a:r>
+            <a:r>
+              <a:rPr lang="en-US" dirty="0">
+                <a:solidFill>
+                  <a:schemeClr val="bg1"/>
+                </a:solidFill>
+              </a:rPr>
+              <a:t>=</a:t>
+            </a:r>
+            <a:r>
+              <a:rPr lang="en-US" dirty="0" err="1">
+                <a:solidFill>
+                  <a:schemeClr val="bg1"/>
+                </a:solidFill>
+              </a:rPr>
+              <a:t>global_dataset_summary</a:t>
+            </a:r>
+            <a:r>
+              <a:rPr lang="en-US" dirty="0">
+                <a:solidFill>
+                  <a:schemeClr val="bg1"/>
+                </a:solidFill>
+              </a:rPr>
+              <a:t>)</a:t>
+            </a:r>
+          </a:p>
+        </p:txBody>
+      </p:sp>
+      <p:sp>
+        <p:nvSpPr>
+          <p:cNvPr id="14" name="TextBox 13">
+            <a:extLst>
+              <a:ext uri="{FF2B5EF4-FFF2-40B4-BE49-F238E27FC236}">
+                <a16:creationId xmlns:a16="http://schemas.microsoft.com/office/drawing/2014/main" id="{C3504550-54D5-9AC8-BB68-244AB7ECAD96}"/>
+              </a:ext>
+            </a:extLst>
+          </p:cNvPr>
+          <p:cNvSpPr txBox="1"/>
+          <p:nvPr/>
+        </p:nvSpPr>
+        <p:spPr>
+          <a:xfrm>
+            <a:off x="6191250" y="4986516"/>
+            <a:ext cx="4965700" cy="1200329"/>
+          </a:xfrm>
+          <a:prstGeom prst="rect">
+            <a:avLst/>
+          </a:prstGeom>
+          <a:noFill/>
+        </p:spPr>
+        <p:txBody>
+          <a:bodyPr wrap="square" rtlCol="0">
+            <a:spAutoFit/>
+          </a:bodyPr>
+          <a:lstStyle/>
+          <a:p>
+            <a:endParaRPr lang="en-GB" dirty="0">
+              <a:solidFill>
+                <a:srgbClr val="2B2B2B"/>
+              </a:solidFill>
+            </a:endParaRPr>
+          </a:p>
+          <a:p>
+            <a:r>
+              <a:rPr lang="en-GB" dirty="0">
+                <a:solidFill>
+                  <a:srgbClr val="2B2B2B"/>
+                </a:solidFill>
+              </a:rPr>
+              <a:t>For you to use these global variables you need to pass these as arguments into your module server.</a:t>
+            </a:r>
+            <a:endParaRPr lang="en-US" dirty="0"/>
+          </a:p>
+          <a:p>
+            <a:endParaRPr lang="en-US" dirty="0"/>
           </a:p>
         </p:txBody>
       </p:sp>

</xml_diff>

<commit_message>
commiting to pull main
</commit_message>
<xml_diff>
--- a/BHF_Dashboards/BHF_DSC_TRE_External_Dashboard/Dev/Modules Example.pptx
+++ b/BHF_Dashboards/BHF_DSC_TRE_External_Dashboard/Dev/Modules Example.pptx
@@ -201,7 +201,7 @@
           <a:p>
             <a:fld id="{BE7BC243-463F-4F42-AD26-AB947A3A3B57}" type="datetimeFigureOut">
               <a:rPr lang="en-US" smtClean="0"/>
-              <a:t>10/26/22</a:t>
+              <a:t>10/27/22</a:t>
             </a:fld>
             <a:endParaRPr lang="en-US"/>
           </a:p>
@@ -992,7 +992,7 @@
           <a:p>
             <a:fld id="{FF5D30FB-034D-5246-8EB2-7100765C6A1C}" type="datetimeFigureOut">
               <a:rPr lang="en-US" smtClean="0"/>
-              <a:t>10/26/22</a:t>
+              <a:t>10/27/22</a:t>
             </a:fld>
             <a:endParaRPr lang="en-US"/>
           </a:p>
@@ -1192,7 +1192,7 @@
           <a:p>
             <a:fld id="{FF5D30FB-034D-5246-8EB2-7100765C6A1C}" type="datetimeFigureOut">
               <a:rPr lang="en-US" smtClean="0"/>
-              <a:t>10/26/22</a:t>
+              <a:t>10/27/22</a:t>
             </a:fld>
             <a:endParaRPr lang="en-US"/>
           </a:p>
@@ -1402,7 +1402,7 @@
           <a:p>
             <a:fld id="{FF5D30FB-034D-5246-8EB2-7100765C6A1C}" type="datetimeFigureOut">
               <a:rPr lang="en-US" smtClean="0"/>
-              <a:t>10/26/22</a:t>
+              <a:t>10/27/22</a:t>
             </a:fld>
             <a:endParaRPr lang="en-US"/>
           </a:p>
@@ -1602,7 +1602,7 @@
           <a:p>
             <a:fld id="{FF5D30FB-034D-5246-8EB2-7100765C6A1C}" type="datetimeFigureOut">
               <a:rPr lang="en-US" smtClean="0"/>
-              <a:t>10/26/22</a:t>
+              <a:t>10/27/22</a:t>
             </a:fld>
             <a:endParaRPr lang="en-US"/>
           </a:p>
@@ -1878,7 +1878,7 @@
           <a:p>
             <a:fld id="{FF5D30FB-034D-5246-8EB2-7100765C6A1C}" type="datetimeFigureOut">
               <a:rPr lang="en-US" smtClean="0"/>
-              <a:t>10/26/22</a:t>
+              <a:t>10/27/22</a:t>
             </a:fld>
             <a:endParaRPr lang="en-US"/>
           </a:p>
@@ -2146,7 +2146,7 @@
           <a:p>
             <a:fld id="{FF5D30FB-034D-5246-8EB2-7100765C6A1C}" type="datetimeFigureOut">
               <a:rPr lang="en-US" smtClean="0"/>
-              <a:t>10/26/22</a:t>
+              <a:t>10/27/22</a:t>
             </a:fld>
             <a:endParaRPr lang="en-US"/>
           </a:p>
@@ -2561,7 +2561,7 @@
           <a:p>
             <a:fld id="{FF5D30FB-034D-5246-8EB2-7100765C6A1C}" type="datetimeFigureOut">
               <a:rPr lang="en-US" smtClean="0"/>
-              <a:t>10/26/22</a:t>
+              <a:t>10/27/22</a:t>
             </a:fld>
             <a:endParaRPr lang="en-US"/>
           </a:p>
@@ -2703,7 +2703,7 @@
           <a:p>
             <a:fld id="{FF5D30FB-034D-5246-8EB2-7100765C6A1C}" type="datetimeFigureOut">
               <a:rPr lang="en-US" smtClean="0"/>
-              <a:t>10/26/22</a:t>
+              <a:t>10/27/22</a:t>
             </a:fld>
             <a:endParaRPr lang="en-US"/>
           </a:p>
@@ -2816,7 +2816,7 @@
           <a:p>
             <a:fld id="{FF5D30FB-034D-5246-8EB2-7100765C6A1C}" type="datetimeFigureOut">
               <a:rPr lang="en-US" smtClean="0"/>
-              <a:t>10/26/22</a:t>
+              <a:t>10/27/22</a:t>
             </a:fld>
             <a:endParaRPr lang="en-US"/>
           </a:p>
@@ -3129,7 +3129,7 @@
           <a:p>
             <a:fld id="{FF5D30FB-034D-5246-8EB2-7100765C6A1C}" type="datetimeFigureOut">
               <a:rPr lang="en-US" smtClean="0"/>
-              <a:t>10/26/22</a:t>
+              <a:t>10/27/22</a:t>
             </a:fld>
             <a:endParaRPr lang="en-US"/>
           </a:p>
@@ -3418,7 +3418,7 @@
           <a:p>
             <a:fld id="{FF5D30FB-034D-5246-8EB2-7100765C6A1C}" type="datetimeFigureOut">
               <a:rPr lang="en-US" smtClean="0"/>
-              <a:t>10/26/22</a:t>
+              <a:t>10/27/22</a:t>
             </a:fld>
             <a:endParaRPr lang="en-US"/>
           </a:p>
@@ -3661,7 +3661,7 @@
           <a:p>
             <a:fld id="{FF5D30FB-034D-5246-8EB2-7100765C6A1C}" type="datetimeFigureOut">
               <a:rPr lang="en-US" smtClean="0"/>
-              <a:t>10/26/22</a:t>
+              <a:t>10/27/22</a:t>
             </a:fld>
             <a:endParaRPr lang="en-US"/>
           </a:p>
@@ -5260,7 +5260,7 @@
         <p:spPr>
           <a:xfrm>
             <a:off x="381000" y="1041400"/>
-            <a:ext cx="5041900" cy="5397500"/>
+            <a:ext cx="5143500" cy="5397500"/>
           </a:xfrm>
           <a:prstGeom prst="roundRect">
             <a:avLst/>
@@ -5312,7 +5312,7 @@
         <p:spPr>
           <a:xfrm>
             <a:off x="787400" y="743089"/>
-            <a:ext cx="4635500" cy="5632311"/>
+            <a:ext cx="4140200" cy="5632311"/>
           </a:xfrm>
           <a:prstGeom prst="rect">
             <a:avLst/>
@@ -5783,7 +5783,7 @@
         <p:spPr>
           <a:xfrm>
             <a:off x="381000" y="1041400"/>
-            <a:ext cx="5041900" cy="5397500"/>
+            <a:ext cx="5118100" cy="5397500"/>
           </a:xfrm>
           <a:prstGeom prst="roundRect">
             <a:avLst/>
@@ -6108,7 +6108,7 @@
         <p:spPr>
           <a:xfrm>
             <a:off x="6502400" y="1354088"/>
-            <a:ext cx="5219700" cy="5078313"/>
+            <a:ext cx="5219700" cy="5632311"/>
           </a:xfrm>
           <a:prstGeom prst="rect">
             <a:avLst/>
@@ -6207,6 +6207,15 @@
             <a:r>
               <a:rPr lang="en-US" dirty="0"/>
               <a:t>(id = "data_coverage_module2")</a:t>
+            </a:r>
+          </a:p>
+          <a:p>
+            <a:endParaRPr lang="en-US" dirty="0"/>
+          </a:p>
+          <a:p>
+            <a:r>
+              <a:rPr lang="en-US" dirty="0"/>
+              <a:t>Remember to source your module script!</a:t>
             </a:r>
           </a:p>
           <a:p>
@@ -6653,7 +6662,7 @@
         <p:spPr>
           <a:xfrm>
             <a:off x="381000" y="1041400"/>
-            <a:ext cx="5041900" cy="5397500"/>
+            <a:ext cx="5626100" cy="1447800"/>
           </a:xfrm>
           <a:prstGeom prst="roundRect">
             <a:avLst/>
@@ -6691,6 +6700,701 @@
                 <a:schemeClr val="bg1"/>
               </a:solidFill>
             </a:endParaRPr>
+          </a:p>
+        </p:txBody>
+      </p:sp>
+      <p:sp>
+        <p:nvSpPr>
+          <p:cNvPr id="2" name="TextBox 1">
+            <a:extLst>
+              <a:ext uri="{FF2B5EF4-FFF2-40B4-BE49-F238E27FC236}">
+                <a16:creationId xmlns:a16="http://schemas.microsoft.com/office/drawing/2014/main" id="{7437A0CD-55CC-1A6F-1EF8-4A93B210A561}"/>
+              </a:ext>
+            </a:extLst>
+          </p:cNvPr>
+          <p:cNvSpPr txBox="1"/>
+          <p:nvPr/>
+        </p:nvSpPr>
+        <p:spPr>
+          <a:xfrm>
+            <a:off x="6134100" y="1070054"/>
+            <a:ext cx="5219700" cy="1754326"/>
+          </a:xfrm>
+          <a:prstGeom prst="rect">
+            <a:avLst/>
+          </a:prstGeom>
+          <a:noFill/>
+        </p:spPr>
+        <p:txBody>
+          <a:bodyPr wrap="square" rtlCol="0">
+            <a:spAutoFit/>
+          </a:bodyPr>
+          <a:lstStyle/>
+          <a:p>
+            <a:r>
+              <a:rPr lang="en-GB" dirty="0">
+                <a:solidFill>
+                  <a:srgbClr val="2B2B2B"/>
+                </a:solidFill>
+              </a:rPr>
+              <a:t>The global input has been passed (as a reactive) to the server in the main app.</a:t>
+            </a:r>
+          </a:p>
+          <a:p>
+            <a:endParaRPr lang="en-US" dirty="0"/>
+          </a:p>
+          <a:p>
+            <a:endParaRPr lang="en-US" dirty="0"/>
+          </a:p>
+          <a:p>
+            <a:endParaRPr lang="en-US" dirty="0"/>
+          </a:p>
+          <a:p>
+            <a:endParaRPr lang="en-US" dirty="0"/>
+          </a:p>
+        </p:txBody>
+      </p:sp>
+      <p:sp>
+        <p:nvSpPr>
+          <p:cNvPr id="3" name="TextBox 2">
+            <a:extLst>
+              <a:ext uri="{FF2B5EF4-FFF2-40B4-BE49-F238E27FC236}">
+                <a16:creationId xmlns:a16="http://schemas.microsoft.com/office/drawing/2014/main" id="{102D577D-354B-F2F3-17E8-EF19A2EE86F6}"/>
+              </a:ext>
+            </a:extLst>
+          </p:cNvPr>
+          <p:cNvSpPr txBox="1"/>
+          <p:nvPr/>
+        </p:nvSpPr>
+        <p:spPr>
+          <a:xfrm>
+            <a:off x="6223000" y="2331470"/>
+            <a:ext cx="4965700" cy="2585323"/>
+          </a:xfrm>
+          <a:prstGeom prst="rect">
+            <a:avLst/>
+          </a:prstGeom>
+          <a:noFill/>
+        </p:spPr>
+        <p:txBody>
+          <a:bodyPr wrap="square" rtlCol="0">
+            <a:spAutoFit/>
+          </a:bodyPr>
+          <a:lstStyle/>
+          <a:p>
+            <a:endParaRPr lang="en-GB" dirty="0">
+              <a:solidFill>
+                <a:srgbClr val="2B2B2B"/>
+              </a:solidFill>
+            </a:endParaRPr>
+          </a:p>
+          <a:p>
+            <a:r>
+              <a:rPr lang="en-GB" dirty="0">
+                <a:solidFill>
+                  <a:srgbClr val="2B2B2B"/>
+                </a:solidFill>
+              </a:rPr>
+              <a:t>For you to use these global variables you need to pass these as arguments into your module server.</a:t>
+            </a:r>
+          </a:p>
+          <a:p>
+            <a:endParaRPr lang="en-GB" dirty="0">
+              <a:solidFill>
+                <a:srgbClr val="2B2B2B"/>
+              </a:solidFill>
+            </a:endParaRPr>
+          </a:p>
+          <a:p>
+            <a:r>
+              <a:rPr lang="en-GB" dirty="0">
+                <a:solidFill>
+                  <a:srgbClr val="2B2B2B"/>
+                </a:solidFill>
+              </a:rPr>
+              <a:t>To use this global input in your logic section call </a:t>
+            </a:r>
+            <a:r>
+              <a:rPr lang="en-GB" dirty="0" err="1">
+                <a:solidFill>
+                  <a:srgbClr val="2B2B2B"/>
+                </a:solidFill>
+              </a:rPr>
+              <a:t>dataset_summary</a:t>
+            </a:r>
+            <a:r>
+              <a:rPr lang="en-GB" dirty="0">
+                <a:solidFill>
+                  <a:srgbClr val="2B2B2B"/>
+                </a:solidFill>
+              </a:rPr>
+              <a:t>() – noting that you are calling a reactive and not calling the input in the usual way e.g. </a:t>
+            </a:r>
+            <a:r>
+              <a:rPr lang="en-GB" dirty="0" err="1">
+                <a:solidFill>
+                  <a:srgbClr val="2B2B2B"/>
+                </a:solidFill>
+              </a:rPr>
+              <a:t>input$global_summary</a:t>
+            </a:r>
+            <a:endParaRPr lang="en-US" dirty="0"/>
+          </a:p>
+          <a:p>
+            <a:endParaRPr lang="en-US" dirty="0"/>
+          </a:p>
+        </p:txBody>
+      </p:sp>
+      <p:sp>
+        <p:nvSpPr>
+          <p:cNvPr id="5" name="TextBox 4">
+            <a:extLst>
+              <a:ext uri="{FF2B5EF4-FFF2-40B4-BE49-F238E27FC236}">
+                <a16:creationId xmlns:a16="http://schemas.microsoft.com/office/drawing/2014/main" id="{D7528CEA-6E16-2F8B-94A0-74D84E9C5DC4}"/>
+              </a:ext>
+            </a:extLst>
+          </p:cNvPr>
+          <p:cNvSpPr txBox="1"/>
+          <p:nvPr/>
+        </p:nvSpPr>
+        <p:spPr>
+          <a:xfrm>
+            <a:off x="933450" y="1610320"/>
+            <a:ext cx="3784600" cy="646331"/>
+          </a:xfrm>
+          <a:prstGeom prst="rect">
+            <a:avLst/>
+          </a:prstGeom>
+          <a:noFill/>
+        </p:spPr>
+        <p:txBody>
+          <a:bodyPr wrap="square" rtlCol="0">
+            <a:spAutoFit/>
+          </a:bodyPr>
+          <a:lstStyle/>
+          <a:p>
+            <a:pPr algn="ctr"/>
+            <a:r>
+              <a:rPr lang="en-US" dirty="0" err="1">
+                <a:solidFill>
+                  <a:schemeClr val="bg1"/>
+                </a:solidFill>
+              </a:rPr>
+              <a:t>global_dataset_summary</a:t>
+            </a:r>
+            <a:r>
+              <a:rPr lang="en-US" dirty="0">
+                <a:solidFill>
+                  <a:schemeClr val="bg1"/>
+                </a:solidFill>
+              </a:rPr>
+              <a:t> &lt;- reactive(</a:t>
+            </a:r>
+            <a:r>
+              <a:rPr lang="en-US" dirty="0" err="1">
+                <a:solidFill>
+                  <a:schemeClr val="bg1"/>
+                </a:solidFill>
+              </a:rPr>
+              <a:t>input$dataset_summary</a:t>
+            </a:r>
+            <a:r>
+              <a:rPr lang="en-US" dirty="0">
+                <a:solidFill>
+                  <a:schemeClr val="bg1"/>
+                </a:solidFill>
+              </a:rPr>
+              <a:t>)</a:t>
+            </a:r>
+          </a:p>
+        </p:txBody>
+      </p:sp>
+      <p:sp>
+        <p:nvSpPr>
+          <p:cNvPr id="8" name="TextBox 7">
+            <a:extLst>
+              <a:ext uri="{FF2B5EF4-FFF2-40B4-BE49-F238E27FC236}">
+                <a16:creationId xmlns:a16="http://schemas.microsoft.com/office/drawing/2014/main" id="{ADA7A310-8FC4-16B6-F41B-BC9368EE46A5}"/>
+              </a:ext>
+            </a:extLst>
+          </p:cNvPr>
+          <p:cNvSpPr txBox="1"/>
+          <p:nvPr/>
+        </p:nvSpPr>
+        <p:spPr>
+          <a:xfrm>
+            <a:off x="546100" y="1141194"/>
+            <a:ext cx="4635500" cy="369332"/>
+          </a:xfrm>
+          <a:prstGeom prst="rect">
+            <a:avLst/>
+          </a:prstGeom>
+          <a:noFill/>
+        </p:spPr>
+        <p:txBody>
+          <a:bodyPr wrap="square">
+            <a:spAutoFit/>
+          </a:bodyPr>
+          <a:lstStyle/>
+          <a:p>
+            <a:r>
+              <a:rPr lang="en-US" dirty="0">
+                <a:solidFill>
+                  <a:schemeClr val="bg1"/>
+                </a:solidFill>
+              </a:rPr>
+              <a:t>(</a:t>
+            </a:r>
+            <a:r>
+              <a:rPr lang="en-US" dirty="0" err="1">
+                <a:solidFill>
+                  <a:schemeClr val="bg1"/>
+                </a:solidFill>
+              </a:rPr>
+              <a:t>app.R</a:t>
+            </a:r>
+            <a:r>
+              <a:rPr lang="en-US" dirty="0">
+                <a:solidFill>
+                  <a:schemeClr val="bg1"/>
+                </a:solidFill>
+              </a:rPr>
+              <a:t> Server)</a:t>
+            </a:r>
+          </a:p>
+        </p:txBody>
+      </p:sp>
+      <p:sp>
+        <p:nvSpPr>
+          <p:cNvPr id="9" name="Rounded Rectangle 8">
+            <a:extLst>
+              <a:ext uri="{FF2B5EF4-FFF2-40B4-BE49-F238E27FC236}">
+                <a16:creationId xmlns:a16="http://schemas.microsoft.com/office/drawing/2014/main" id="{473904C0-D68B-2568-FE57-BC222EC74194}"/>
+              </a:ext>
+            </a:extLst>
+          </p:cNvPr>
+          <p:cNvSpPr/>
+          <p:nvPr/>
+        </p:nvSpPr>
+        <p:spPr>
+          <a:xfrm>
+            <a:off x="381000" y="2501900"/>
+            <a:ext cx="5626100" cy="2745780"/>
+          </a:xfrm>
+          <a:prstGeom prst="roundRect">
+            <a:avLst/>
+          </a:prstGeom>
+          <a:solidFill>
+            <a:srgbClr val="FF2600"/>
+          </a:solidFill>
+          <a:ln>
+            <a:noFill/>
+          </a:ln>
+        </p:spPr>
+        <p:style>
+          <a:lnRef idx="2">
+            <a:schemeClr val="accent1">
+              <a:shade val="50000"/>
+            </a:schemeClr>
+          </a:lnRef>
+          <a:fillRef idx="1">
+            <a:schemeClr val="accent1"/>
+          </a:fillRef>
+          <a:effectRef idx="0">
+            <a:schemeClr val="accent1"/>
+          </a:effectRef>
+          <a:fontRef idx="minor">
+            <a:schemeClr val="lt1"/>
+          </a:fontRef>
+        </p:style>
+        <p:txBody>
+          <a:bodyPr rtlCol="0" anchor="ctr"/>
+          <a:lstStyle/>
+          <a:p>
+            <a:pPr algn="ctr"/>
+            <a:endParaRPr lang="en-US"/>
+          </a:p>
+        </p:txBody>
+      </p:sp>
+      <p:sp>
+        <p:nvSpPr>
+          <p:cNvPr id="10" name="TextBox 9">
+            <a:extLst>
+              <a:ext uri="{FF2B5EF4-FFF2-40B4-BE49-F238E27FC236}">
+                <a16:creationId xmlns:a16="http://schemas.microsoft.com/office/drawing/2014/main" id="{A51CBCCB-7141-67F1-C272-AF669F9BC71C}"/>
+              </a:ext>
+            </a:extLst>
+          </p:cNvPr>
+          <p:cNvSpPr txBox="1"/>
+          <p:nvPr/>
+        </p:nvSpPr>
+        <p:spPr>
+          <a:xfrm>
+            <a:off x="469900" y="2678192"/>
+            <a:ext cx="5626100" cy="2308324"/>
+          </a:xfrm>
+          <a:prstGeom prst="rect">
+            <a:avLst/>
+          </a:prstGeom>
+          <a:noFill/>
+        </p:spPr>
+        <p:txBody>
+          <a:bodyPr wrap="square" rtlCol="0">
+            <a:spAutoFit/>
+          </a:bodyPr>
+          <a:lstStyle/>
+          <a:p>
+            <a:r>
+              <a:rPr lang="en-US" dirty="0">
+                <a:solidFill>
+                  <a:schemeClr val="bg1"/>
+                </a:solidFill>
+              </a:rPr>
+              <a:t>(module1.R)</a:t>
+            </a:r>
+          </a:p>
+          <a:p>
+            <a:endParaRPr lang="en-US" dirty="0">
+              <a:solidFill>
+                <a:schemeClr val="bg1"/>
+              </a:solidFill>
+            </a:endParaRPr>
+          </a:p>
+          <a:p>
+            <a:r>
+              <a:rPr lang="en-US" dirty="0" err="1">
+                <a:solidFill>
+                  <a:schemeClr val="bg1"/>
+                </a:solidFill>
+              </a:rPr>
+              <a:t>moduleDemoServer</a:t>
+            </a:r>
+            <a:r>
+              <a:rPr lang="en-US" dirty="0">
+                <a:solidFill>
+                  <a:schemeClr val="bg1"/>
+                </a:solidFill>
+              </a:rPr>
+              <a:t>&lt;- function(id, </a:t>
+            </a:r>
+            <a:r>
+              <a:rPr lang="en-US" dirty="0" err="1">
+                <a:solidFill>
+                  <a:schemeClr val="bg1"/>
+                </a:solidFill>
+              </a:rPr>
+              <a:t>dataset_summary</a:t>
+            </a:r>
+            <a:r>
+              <a:rPr lang="en-US" dirty="0">
+                <a:solidFill>
+                  <a:schemeClr val="bg1"/>
+                </a:solidFill>
+              </a:rPr>
+              <a:t>){</a:t>
+            </a:r>
+          </a:p>
+          <a:p>
+            <a:r>
+              <a:rPr lang="en-US" dirty="0">
+                <a:solidFill>
+                  <a:schemeClr val="bg1"/>
+                </a:solidFill>
+              </a:rPr>
+              <a:t>  </a:t>
+            </a:r>
+            <a:r>
+              <a:rPr lang="en-US" dirty="0" err="1">
+                <a:solidFill>
+                  <a:schemeClr val="bg1"/>
+                </a:solidFill>
+              </a:rPr>
+              <a:t>moduleServer</a:t>
+            </a:r>
+            <a:r>
+              <a:rPr lang="en-US" dirty="0">
+                <a:solidFill>
+                  <a:schemeClr val="bg1"/>
+                </a:solidFill>
+              </a:rPr>
+              <a:t>(</a:t>
+            </a:r>
+          </a:p>
+          <a:p>
+            <a:r>
+              <a:rPr lang="en-US" dirty="0">
+                <a:solidFill>
+                  <a:schemeClr val="bg1"/>
+                </a:solidFill>
+              </a:rPr>
+              <a:t>    id,</a:t>
+            </a:r>
+          </a:p>
+          <a:p>
+            <a:r>
+              <a:rPr lang="en-US" dirty="0">
+                <a:solidFill>
+                  <a:schemeClr val="bg1"/>
+                </a:solidFill>
+              </a:rPr>
+              <a:t>    function(input, output, session){</a:t>
+            </a:r>
+          </a:p>
+          <a:p>
+            <a:r>
+              <a:rPr lang="en-US" dirty="0">
+                <a:solidFill>
+                  <a:schemeClr val="bg1"/>
+                </a:solidFill>
+              </a:rPr>
+              <a:t>      # logic here</a:t>
+            </a:r>
+          </a:p>
+          <a:p>
+            <a:r>
+              <a:rPr lang="en-US" dirty="0">
+                <a:solidFill>
+                  <a:schemeClr val="bg1"/>
+                </a:solidFill>
+              </a:rPr>
+              <a:t>    }</a:t>
+            </a:r>
+          </a:p>
+        </p:txBody>
+      </p:sp>
+      <p:sp>
+        <p:nvSpPr>
+          <p:cNvPr id="11" name="Rounded Rectangle 10">
+            <a:extLst>
+              <a:ext uri="{FF2B5EF4-FFF2-40B4-BE49-F238E27FC236}">
+                <a16:creationId xmlns:a16="http://schemas.microsoft.com/office/drawing/2014/main" id="{8FCCC83D-4B11-7205-AA74-73C9DE0919E6}"/>
+              </a:ext>
+            </a:extLst>
+          </p:cNvPr>
+          <p:cNvSpPr/>
+          <p:nvPr/>
+        </p:nvSpPr>
+        <p:spPr>
+          <a:xfrm>
+            <a:off x="381000" y="5270500"/>
+            <a:ext cx="5626100" cy="1397000"/>
+          </a:xfrm>
+          <a:prstGeom prst="roundRect">
+            <a:avLst/>
+          </a:prstGeom>
+          <a:solidFill>
+            <a:srgbClr val="FF7E79"/>
+          </a:solidFill>
+          <a:ln>
+            <a:noFill/>
+          </a:ln>
+        </p:spPr>
+        <p:style>
+          <a:lnRef idx="2">
+            <a:schemeClr val="accent1">
+              <a:shade val="50000"/>
+            </a:schemeClr>
+          </a:lnRef>
+          <a:fillRef idx="1">
+            <a:schemeClr val="accent1"/>
+          </a:fillRef>
+          <a:effectRef idx="0">
+            <a:schemeClr val="accent1"/>
+          </a:effectRef>
+          <a:fontRef idx="minor">
+            <a:schemeClr val="lt1"/>
+          </a:fontRef>
+        </p:style>
+        <p:txBody>
+          <a:bodyPr rtlCol="0" anchor="ctr"/>
+          <a:lstStyle/>
+          <a:p>
+            <a:pPr algn="ctr"/>
+            <a:endParaRPr lang="en-US">
+              <a:solidFill>
+                <a:srgbClr val="FF7E79"/>
+              </a:solidFill>
+            </a:endParaRPr>
+          </a:p>
+        </p:txBody>
+      </p:sp>
+      <p:sp>
+        <p:nvSpPr>
+          <p:cNvPr id="13" name="TextBox 12">
+            <a:extLst>
+              <a:ext uri="{FF2B5EF4-FFF2-40B4-BE49-F238E27FC236}">
+                <a16:creationId xmlns:a16="http://schemas.microsoft.com/office/drawing/2014/main" id="{CB7B6733-4DEE-6918-217C-A09AC4339578}"/>
+              </a:ext>
+            </a:extLst>
+          </p:cNvPr>
+          <p:cNvSpPr txBox="1"/>
+          <p:nvPr/>
+        </p:nvSpPr>
+        <p:spPr>
+          <a:xfrm>
+            <a:off x="476250" y="5354935"/>
+            <a:ext cx="6096000" cy="1200329"/>
+          </a:xfrm>
+          <a:prstGeom prst="rect">
+            <a:avLst/>
+          </a:prstGeom>
+          <a:noFill/>
+        </p:spPr>
+        <p:txBody>
+          <a:bodyPr wrap="square">
+            <a:spAutoFit/>
+          </a:bodyPr>
+          <a:lstStyle/>
+          <a:p>
+            <a:r>
+              <a:rPr lang="en-US" dirty="0">
+                <a:solidFill>
+                  <a:schemeClr val="bg1"/>
+                </a:solidFill>
+              </a:rPr>
+              <a:t>(</a:t>
+            </a:r>
+            <a:r>
+              <a:rPr lang="en-US" dirty="0" err="1">
+                <a:solidFill>
+                  <a:schemeClr val="bg1"/>
+                </a:solidFill>
+              </a:rPr>
+              <a:t>app.R</a:t>
+            </a:r>
+            <a:r>
+              <a:rPr lang="en-US" dirty="0">
+                <a:solidFill>
+                  <a:schemeClr val="bg1"/>
+                </a:solidFill>
+              </a:rPr>
+              <a:t> Server)</a:t>
+            </a:r>
+          </a:p>
+          <a:p>
+            <a:endParaRPr lang="en-US" dirty="0">
+              <a:solidFill>
+                <a:schemeClr val="bg1"/>
+              </a:solidFill>
+            </a:endParaRPr>
+          </a:p>
+          <a:p>
+            <a:r>
+              <a:rPr lang="en-US" dirty="0" err="1">
+                <a:solidFill>
+                  <a:schemeClr val="bg1"/>
+                </a:solidFill>
+              </a:rPr>
+              <a:t>moduleDemoServer</a:t>
+            </a:r>
+            <a:r>
+              <a:rPr lang="en-US" dirty="0">
+                <a:solidFill>
+                  <a:schemeClr val="bg1"/>
+                </a:solidFill>
+              </a:rPr>
+              <a:t>(id = "</a:t>
+            </a:r>
+            <a:r>
+              <a:rPr lang="en-US" dirty="0" err="1">
+                <a:solidFill>
+                  <a:schemeClr val="bg1"/>
+                </a:solidFill>
+              </a:rPr>
+              <a:t>data_coverage_module</a:t>
+            </a:r>
+            <a:r>
+              <a:rPr lang="en-US" dirty="0">
+                <a:solidFill>
+                  <a:schemeClr val="bg1"/>
+                </a:solidFill>
+              </a:rPr>
+              <a:t>”,</a:t>
+            </a:r>
+          </a:p>
+          <a:p>
+            <a:r>
+              <a:rPr lang="en-US" dirty="0" err="1">
+                <a:solidFill>
+                  <a:schemeClr val="bg1"/>
+                </a:solidFill>
+              </a:rPr>
+              <a:t>dataset_summary</a:t>
+            </a:r>
+            <a:r>
+              <a:rPr lang="en-US" dirty="0">
+                <a:solidFill>
+                  <a:schemeClr val="bg1"/>
+                </a:solidFill>
+              </a:rPr>
+              <a:t>=</a:t>
+            </a:r>
+            <a:r>
+              <a:rPr lang="en-US" dirty="0" err="1">
+                <a:solidFill>
+                  <a:schemeClr val="bg1"/>
+                </a:solidFill>
+              </a:rPr>
+              <a:t>global_dataset_summary</a:t>
+            </a:r>
+            <a:r>
+              <a:rPr lang="en-US" dirty="0">
+                <a:solidFill>
+                  <a:schemeClr val="bg1"/>
+                </a:solidFill>
+              </a:rPr>
+              <a:t>)</a:t>
+            </a:r>
+          </a:p>
+        </p:txBody>
+      </p:sp>
+      <p:sp>
+        <p:nvSpPr>
+          <p:cNvPr id="14" name="TextBox 13">
+            <a:extLst>
+              <a:ext uri="{FF2B5EF4-FFF2-40B4-BE49-F238E27FC236}">
+                <a16:creationId xmlns:a16="http://schemas.microsoft.com/office/drawing/2014/main" id="{C3504550-54D5-9AC8-BB68-244AB7ECAD96}"/>
+              </a:ext>
+            </a:extLst>
+          </p:cNvPr>
+          <p:cNvSpPr txBox="1"/>
+          <p:nvPr/>
+        </p:nvSpPr>
+        <p:spPr>
+          <a:xfrm>
+            <a:off x="6191250" y="4986516"/>
+            <a:ext cx="4965700" cy="1200329"/>
+          </a:xfrm>
+          <a:prstGeom prst="rect">
+            <a:avLst/>
+          </a:prstGeom>
+          <a:noFill/>
+        </p:spPr>
+        <p:txBody>
+          <a:bodyPr wrap="square" rtlCol="0">
+            <a:spAutoFit/>
+          </a:bodyPr>
+          <a:lstStyle/>
+          <a:p>
+            <a:endParaRPr lang="en-GB" dirty="0">
+              <a:solidFill>
+                <a:srgbClr val="2B2B2B"/>
+              </a:solidFill>
+            </a:endParaRPr>
+          </a:p>
+          <a:p>
+            <a:r>
+              <a:rPr lang="en-GB" dirty="0">
+                <a:solidFill>
+                  <a:srgbClr val="2B2B2B"/>
+                </a:solidFill>
+              </a:rPr>
+              <a:t>For you to use these global variables you need to pass these as arguments into your module server.</a:t>
+            </a:r>
+            <a:endParaRPr lang="en-US" dirty="0"/>
+          </a:p>
+          <a:p>
+            <a:endParaRPr lang="en-US" dirty="0"/>
           </a:p>
         </p:txBody>
       </p:sp>

</xml_diff>

<commit_message>
reformated whole app - modularised summary
</commit_message>
<xml_diff>
--- a/BHF_Dashboards/BHF_DSC_TRE_External_Dashboard/Dev/Modules Example.pptx
+++ b/BHF_Dashboards/BHF_DSC_TRE_External_Dashboard/Dev/Modules Example.pptx
@@ -5,14 +5,15 @@
     <p:sldMasterId id="2147483648" r:id="rId1"/>
   </p:sldMasterIdLst>
   <p:notesMasterIdLst>
-    <p:notesMasterId r:id="rId7"/>
+    <p:notesMasterId r:id="rId8"/>
   </p:notesMasterIdLst>
   <p:sldIdLst>
     <p:sldId id="256" r:id="rId2"/>
     <p:sldId id="257" r:id="rId3"/>
     <p:sldId id="258" r:id="rId4"/>
-    <p:sldId id="260" r:id="rId5"/>
-    <p:sldId id="259" r:id="rId6"/>
+    <p:sldId id="259" r:id="rId5"/>
+    <p:sldId id="261" r:id="rId6"/>
+    <p:sldId id="260" r:id="rId7"/>
   </p:sldIdLst>
   <p:sldSz cx="12192000" cy="6858000"/>
   <p:notesSz cx="6858000" cy="9144000"/>
@@ -201,7 +202,7 @@
           <a:p>
             <a:fld id="{BE7BC243-463F-4F42-AD26-AB947A3A3B57}" type="datetimeFigureOut">
               <a:rPr lang="en-US" smtClean="0"/>
-              <a:t>10/27/22</a:t>
+              <a:t>11/9/22</a:t>
             </a:fld>
             <a:endParaRPr lang="en-US"/>
           </a:p>
@@ -618,6 +619,71 @@
             </a:r>
             <a:endParaRPr lang="en-US" dirty="0"/>
           </a:p>
+          <a:p>
+            <a:r>
+              <a:rPr lang="en-US" dirty="0"/>
+              <a:t>Basic Example with no nesting and no need for input external to the module to be passed in</a:t>
+            </a:r>
+          </a:p>
+          <a:p>
+            <a:r>
+              <a:rPr lang="en-US" dirty="0"/>
+              <a:t>Namespace </a:t>
+            </a:r>
+            <a:r>
+              <a:rPr lang="en-GB" b="0" i="0" u="none" strike="noStrike" dirty="0">
+                <a:effectLst/>
+                <a:latin typeface="b612 mono"/>
+              </a:rPr>
+              <a:t>helps organize IDs in the UI</a:t>
+            </a:r>
+            <a:endParaRPr lang="en-US" b="0" i="0" u="none" strike="noStrike" dirty="0">
+              <a:effectLst/>
+              <a:latin typeface="b612 mono"/>
+            </a:endParaRPr>
+          </a:p>
+          <a:p>
+            <a:r>
+              <a:rPr lang="en-US" dirty="0"/>
+              <a:t>https://</a:t>
+            </a:r>
+            <a:r>
+              <a:rPr lang="en-US" dirty="0" err="1"/>
+              <a:t>www.martinfrigaard.io</a:t>
+            </a:r>
+            <a:r>
+              <a:rPr lang="en-US" dirty="0"/>
+              <a:t>/post/shiny-namespaces/</a:t>
+            </a:r>
+            <a:endParaRPr lang="en-US" b="0" i="0" u="none" strike="noStrike" dirty="0">
+              <a:effectLst/>
+              <a:latin typeface="b612 mono"/>
+            </a:endParaRPr>
+          </a:p>
+          <a:p>
+            <a:r>
+              <a:rPr lang="en-US" b="0" i="0" u="none" strike="noStrike" dirty="0">
+                <a:effectLst/>
+                <a:latin typeface="b612 mono"/>
+              </a:rPr>
+              <a:t>If using </a:t>
+            </a:r>
+            <a:r>
+              <a:rPr lang="en-US" b="0" i="0" u="none" strike="noStrike" dirty="0" err="1">
+                <a:effectLst/>
+                <a:latin typeface="b612 mono"/>
+              </a:rPr>
+              <a:t>css</a:t>
+            </a:r>
+            <a:r>
+              <a:rPr lang="en-US" b="0" i="0" u="none" strike="noStrike" dirty="0">
+                <a:effectLst/>
+                <a:latin typeface="b612 mono"/>
+              </a:rPr>
+              <a:t> tag then you would refer to this tag and the module it exists in</a:t>
+            </a:r>
+            <a:endParaRPr lang="en-US" dirty="0"/>
+          </a:p>
         </p:txBody>
       </p:sp>
       <p:sp>
@@ -824,7 +890,7 @@
           <a:p>
             <a:fld id="{7760E8CB-6BBC-634D-955C-9E645AB2F1E9}" type="slidenum">
               <a:rPr lang="en-US" smtClean="0"/>
-              <a:t>5</a:t>
+              <a:t>4</a:t>
             </a:fld>
             <a:endParaRPr lang="en-US"/>
           </a:p>
@@ -834,6 +900,90 @@
     <p:extLst>
       <p:ext uri="{BB962C8B-B14F-4D97-AF65-F5344CB8AC3E}">
         <p14:creationId xmlns:p14="http://schemas.microsoft.com/office/powerpoint/2010/main" val="774181184"/>
+      </p:ext>
+    </p:extLst>
+  </p:cSld>
+  <p:clrMapOvr>
+    <a:masterClrMapping/>
+  </p:clrMapOvr>
+</p:notes>
+</file>
+
+<file path=ppt/notesSlides/notesSlide5.xml><?xml version="1.0" encoding="utf-8"?>
+<p:notes xmlns:a="http://schemas.openxmlformats.org/drawingml/2006/main" xmlns:r="http://schemas.openxmlformats.org/officeDocument/2006/relationships" xmlns:p="http://schemas.openxmlformats.org/presentationml/2006/main">
+  <p:cSld>
+    <p:spTree>
+      <p:nvGrpSpPr>
+        <p:cNvPr id="1" name=""/>
+        <p:cNvGrpSpPr/>
+        <p:nvPr/>
+      </p:nvGrpSpPr>
+      <p:grpSpPr>
+        <a:xfrm>
+          <a:off x="0" y="0"/>
+          <a:ext cx="0" cy="0"/>
+          <a:chOff x="0" y="0"/>
+          <a:chExt cx="0" cy="0"/>
+        </a:xfrm>
+      </p:grpSpPr>
+      <p:sp>
+        <p:nvSpPr>
+          <p:cNvPr id="2" name="Slide Image Placeholder 1"/>
+          <p:cNvSpPr>
+            <a:spLocks noGrp="1" noRot="1" noChangeAspect="1"/>
+          </p:cNvSpPr>
+          <p:nvPr>
+            <p:ph type="sldImg"/>
+          </p:nvPr>
+        </p:nvSpPr>
+        <p:spPr/>
+      </p:sp>
+      <p:sp>
+        <p:nvSpPr>
+          <p:cNvPr id="3" name="Notes Placeholder 2"/>
+          <p:cNvSpPr>
+            <a:spLocks noGrp="1"/>
+          </p:cNvSpPr>
+          <p:nvPr>
+            <p:ph type="body" idx="1"/>
+          </p:nvPr>
+        </p:nvSpPr>
+        <p:spPr/>
+        <p:txBody>
+          <a:bodyPr/>
+          <a:lstStyle/>
+          <a:p>
+            <a:endParaRPr lang="en-US" dirty="0"/>
+          </a:p>
+        </p:txBody>
+      </p:sp>
+      <p:sp>
+        <p:nvSpPr>
+          <p:cNvPr id="4" name="Slide Number Placeholder 3"/>
+          <p:cNvSpPr>
+            <a:spLocks noGrp="1"/>
+          </p:cNvSpPr>
+          <p:nvPr>
+            <p:ph type="sldNum" sz="quarter" idx="5"/>
+          </p:nvPr>
+        </p:nvSpPr>
+        <p:spPr/>
+        <p:txBody>
+          <a:bodyPr/>
+          <a:lstStyle/>
+          <a:p>
+            <a:fld id="{7760E8CB-6BBC-634D-955C-9E645AB2F1E9}" type="slidenum">
+              <a:rPr lang="en-US" smtClean="0"/>
+              <a:t>5</a:t>
+            </a:fld>
+            <a:endParaRPr lang="en-US"/>
+          </a:p>
+        </p:txBody>
+      </p:sp>
+    </p:spTree>
+    <p:extLst>
+      <p:ext uri="{BB962C8B-B14F-4D97-AF65-F5344CB8AC3E}">
+        <p14:creationId xmlns:p14="http://schemas.microsoft.com/office/powerpoint/2010/main" val="2319515239"/>
       </p:ext>
     </p:extLst>
   </p:cSld>
@@ -992,7 +1142,7 @@
           <a:p>
             <a:fld id="{FF5D30FB-034D-5246-8EB2-7100765C6A1C}" type="datetimeFigureOut">
               <a:rPr lang="en-US" smtClean="0"/>
-              <a:t>10/27/22</a:t>
+              <a:t>11/9/22</a:t>
             </a:fld>
             <a:endParaRPr lang="en-US"/>
           </a:p>
@@ -1192,7 +1342,7 @@
           <a:p>
             <a:fld id="{FF5D30FB-034D-5246-8EB2-7100765C6A1C}" type="datetimeFigureOut">
               <a:rPr lang="en-US" smtClean="0"/>
-              <a:t>10/27/22</a:t>
+              <a:t>11/9/22</a:t>
             </a:fld>
             <a:endParaRPr lang="en-US"/>
           </a:p>
@@ -1402,7 +1552,7 @@
           <a:p>
             <a:fld id="{FF5D30FB-034D-5246-8EB2-7100765C6A1C}" type="datetimeFigureOut">
               <a:rPr lang="en-US" smtClean="0"/>
-              <a:t>10/27/22</a:t>
+              <a:t>11/9/22</a:t>
             </a:fld>
             <a:endParaRPr lang="en-US"/>
           </a:p>
@@ -1602,7 +1752,7 @@
           <a:p>
             <a:fld id="{FF5D30FB-034D-5246-8EB2-7100765C6A1C}" type="datetimeFigureOut">
               <a:rPr lang="en-US" smtClean="0"/>
-              <a:t>10/27/22</a:t>
+              <a:t>11/9/22</a:t>
             </a:fld>
             <a:endParaRPr lang="en-US"/>
           </a:p>
@@ -1878,7 +2028,7 @@
           <a:p>
             <a:fld id="{FF5D30FB-034D-5246-8EB2-7100765C6A1C}" type="datetimeFigureOut">
               <a:rPr lang="en-US" smtClean="0"/>
-              <a:t>10/27/22</a:t>
+              <a:t>11/9/22</a:t>
             </a:fld>
             <a:endParaRPr lang="en-US"/>
           </a:p>
@@ -2146,7 +2296,7 @@
           <a:p>
             <a:fld id="{FF5D30FB-034D-5246-8EB2-7100765C6A1C}" type="datetimeFigureOut">
               <a:rPr lang="en-US" smtClean="0"/>
-              <a:t>10/27/22</a:t>
+              <a:t>11/9/22</a:t>
             </a:fld>
             <a:endParaRPr lang="en-US"/>
           </a:p>
@@ -2561,7 +2711,7 @@
           <a:p>
             <a:fld id="{FF5D30FB-034D-5246-8EB2-7100765C6A1C}" type="datetimeFigureOut">
               <a:rPr lang="en-US" smtClean="0"/>
-              <a:t>10/27/22</a:t>
+              <a:t>11/9/22</a:t>
             </a:fld>
             <a:endParaRPr lang="en-US"/>
           </a:p>
@@ -2703,7 +2853,7 @@
           <a:p>
             <a:fld id="{FF5D30FB-034D-5246-8EB2-7100765C6A1C}" type="datetimeFigureOut">
               <a:rPr lang="en-US" smtClean="0"/>
-              <a:t>10/27/22</a:t>
+              <a:t>11/9/22</a:t>
             </a:fld>
             <a:endParaRPr lang="en-US"/>
           </a:p>
@@ -2816,7 +2966,7 @@
           <a:p>
             <a:fld id="{FF5D30FB-034D-5246-8EB2-7100765C6A1C}" type="datetimeFigureOut">
               <a:rPr lang="en-US" smtClean="0"/>
-              <a:t>10/27/22</a:t>
+              <a:t>11/9/22</a:t>
             </a:fld>
             <a:endParaRPr lang="en-US"/>
           </a:p>
@@ -3129,7 +3279,7 @@
           <a:p>
             <a:fld id="{FF5D30FB-034D-5246-8EB2-7100765C6A1C}" type="datetimeFigureOut">
               <a:rPr lang="en-US" smtClean="0"/>
-              <a:t>10/27/22</a:t>
+              <a:t>11/9/22</a:t>
             </a:fld>
             <a:endParaRPr lang="en-US"/>
           </a:p>
@@ -3418,7 +3568,7 @@
           <a:p>
             <a:fld id="{FF5D30FB-034D-5246-8EB2-7100765C6A1C}" type="datetimeFigureOut">
               <a:rPr lang="en-US" smtClean="0"/>
-              <a:t>10/27/22</a:t>
+              <a:t>11/9/22</a:t>
             </a:fld>
             <a:endParaRPr lang="en-US"/>
           </a:p>
@@ -3661,7 +3811,7 @@
           <a:p>
             <a:fld id="{FF5D30FB-034D-5246-8EB2-7100765C6A1C}" type="datetimeFigureOut">
               <a:rPr lang="en-US" smtClean="0"/>
-              <a:t>10/27/22</a:t>
+              <a:t>11/9/22</a:t>
             </a:fld>
             <a:endParaRPr lang="en-US"/>
           </a:p>
@@ -4080,10 +4230,10 @@
       </p:grpSpPr>
       <p:sp>
         <p:nvSpPr>
-          <p:cNvPr id="4" name="Rounded Rectangle 3">
-            <a:extLst>
-              <a:ext uri="{FF2B5EF4-FFF2-40B4-BE49-F238E27FC236}">
-                <a16:creationId xmlns:a16="http://schemas.microsoft.com/office/drawing/2014/main" id="{CFD71940-7FEB-396C-655C-86EF253D825E}"/>
+          <p:cNvPr id="2" name="Rounded Rectangle 1">
+            <a:extLst>
+              <a:ext uri="{FF2B5EF4-FFF2-40B4-BE49-F238E27FC236}">
+                <a16:creationId xmlns:a16="http://schemas.microsoft.com/office/drawing/2014/main" id="{1ACB00E9-612B-F482-80A5-C71D26C5425C}"/>
               </a:ext>
             </a:extLst>
           </p:cNvPr>
@@ -4092,14 +4242,14 @@
         </p:nvSpPr>
         <p:spPr>
           <a:xfrm>
-            <a:off x="3720790" y="450574"/>
-            <a:ext cx="8027262" cy="5844209"/>
+            <a:off x="2821350" y="145459"/>
+            <a:ext cx="9210720" cy="6519074"/>
           </a:xfrm>
           <a:prstGeom prst="roundRect">
             <a:avLst/>
           </a:prstGeom>
           <a:solidFill>
-            <a:srgbClr val="FF7E79"/>
+            <a:srgbClr val="F5C5C4"/>
           </a:solidFill>
           <a:ln>
             <a:noFill/>
@@ -4132,71 +4282,19 @@
       </p:sp>
       <p:sp>
         <p:nvSpPr>
-          <p:cNvPr id="6" name="Rounded Rectangle 5">
-            <a:extLst>
-              <a:ext uri="{FF2B5EF4-FFF2-40B4-BE49-F238E27FC236}">
-                <a16:creationId xmlns:a16="http://schemas.microsoft.com/office/drawing/2014/main" id="{37E80B47-7E99-D401-6F58-3925E1249686}"/>
-              </a:ext>
-            </a:extLst>
-          </p:cNvPr>
-          <p:cNvSpPr/>
+          <p:cNvPr id="7" name="TextBox 6">
+            <a:extLst>
+              <a:ext uri="{FF2B5EF4-FFF2-40B4-BE49-F238E27FC236}">
+                <a16:creationId xmlns:a16="http://schemas.microsoft.com/office/drawing/2014/main" id="{65612610-07CC-18DD-D45C-F0E6B6A0CCB0}"/>
+              </a:ext>
+            </a:extLst>
+          </p:cNvPr>
+          <p:cNvSpPr txBox="1"/>
           <p:nvPr/>
         </p:nvSpPr>
         <p:spPr>
           <a:xfrm>
-            <a:off x="4144535" y="1360449"/>
-            <a:ext cx="7162801" cy="669073"/>
-          </a:xfrm>
-          <a:prstGeom prst="roundRect">
-            <a:avLst/>
-          </a:prstGeom>
-          <a:solidFill>
-            <a:srgbClr val="C00000"/>
-          </a:solidFill>
-          <a:ln>
-            <a:noFill/>
-          </a:ln>
-        </p:spPr>
-        <p:style>
-          <a:lnRef idx="2">
-            <a:schemeClr val="accent1">
-              <a:shade val="50000"/>
-            </a:schemeClr>
-          </a:lnRef>
-          <a:fillRef idx="1">
-            <a:schemeClr val="accent1"/>
-          </a:fillRef>
-          <a:effectRef idx="0">
-            <a:schemeClr val="accent1"/>
-          </a:effectRef>
-          <a:fontRef idx="minor">
-            <a:schemeClr val="lt1"/>
-          </a:fontRef>
-        </p:style>
-        <p:txBody>
-          <a:bodyPr rtlCol="0" anchor="ctr"/>
-          <a:lstStyle/>
-          <a:p>
-            <a:pPr algn="ctr"/>
-            <a:endParaRPr lang="en-US"/>
-          </a:p>
-        </p:txBody>
-      </p:sp>
-      <p:sp>
-        <p:nvSpPr>
-          <p:cNvPr id="5" name="TextBox 4">
-            <a:extLst>
-              <a:ext uri="{FF2B5EF4-FFF2-40B4-BE49-F238E27FC236}">
-                <a16:creationId xmlns:a16="http://schemas.microsoft.com/office/drawing/2014/main" id="{D5C9EEDE-B2B2-7831-C54A-19C5D2B7BEA7}"/>
-              </a:ext>
-            </a:extLst>
-          </p:cNvPr>
-          <p:cNvSpPr txBox="1"/>
-          <p:nvPr/>
-        </p:nvSpPr>
-        <p:spPr>
-          <a:xfrm>
-            <a:off x="4256048" y="1409960"/>
+            <a:off x="4140818" y="233623"/>
             <a:ext cx="2598235" cy="369332"/>
           </a:xfrm>
           <a:prstGeom prst="rect">
@@ -4213,348 +4311,36 @@
             <a:r>
               <a:rPr lang="en-US" dirty="0">
                 <a:solidFill>
-                  <a:schemeClr val="bg1"/>
-                </a:solidFill>
-              </a:rPr>
-              <a:t>Global Input Variables</a:t>
-            </a:r>
-          </a:p>
-        </p:txBody>
-      </p:sp>
-      <p:sp>
-        <p:nvSpPr>
-          <p:cNvPr id="7" name="TextBox 6">
-            <a:extLst>
-              <a:ext uri="{FF2B5EF4-FFF2-40B4-BE49-F238E27FC236}">
-                <a16:creationId xmlns:a16="http://schemas.microsoft.com/office/drawing/2014/main" id="{65612610-07CC-18DD-D45C-F0E6B6A0CCB0}"/>
-              </a:ext>
-            </a:extLst>
-          </p:cNvPr>
-          <p:cNvSpPr txBox="1"/>
-          <p:nvPr/>
-        </p:nvSpPr>
-        <p:spPr>
-          <a:xfrm>
-            <a:off x="4256048" y="827224"/>
-            <a:ext cx="2598235" cy="369332"/>
-          </a:xfrm>
-          <a:prstGeom prst="rect">
-            <a:avLst/>
-          </a:prstGeom>
-          <a:noFill/>
-        </p:spPr>
-        <p:txBody>
-          <a:bodyPr wrap="square" rtlCol="0">
-            <a:spAutoFit/>
-          </a:bodyPr>
-          <a:lstStyle/>
-          <a:p>
+                  <a:srgbClr val="C00000"/>
+                </a:solidFill>
+              </a:rPr>
+              <a:t>Main App (</a:t>
+            </a:r>
+            <a:r>
+              <a:rPr lang="en-US" dirty="0" err="1">
+                <a:solidFill>
+                  <a:srgbClr val="C00000"/>
+                </a:solidFill>
+              </a:rPr>
+              <a:t>app.R</a:t>
+            </a:r>
             <a:r>
               <a:rPr lang="en-US" dirty="0">
                 <a:solidFill>
-                  <a:schemeClr val="bg1"/>
-                </a:solidFill>
-              </a:rPr>
-              <a:t>Main App (</a:t>
-            </a:r>
-            <a:r>
-              <a:rPr lang="en-US" dirty="0" err="1">
-                <a:solidFill>
-                  <a:schemeClr val="bg1"/>
-                </a:solidFill>
-              </a:rPr>
-              <a:t>app.R</a:t>
-            </a:r>
-            <a:r>
-              <a:rPr lang="en-US" dirty="0">
-                <a:solidFill>
-                  <a:schemeClr val="bg1"/>
+                  <a:srgbClr val="C00000"/>
                 </a:solidFill>
               </a:rPr>
               <a:t>)</a:t>
-            </a:r>
-          </a:p>
-        </p:txBody>
-      </p:sp>
-      <p:sp>
-        <p:nvSpPr>
-          <p:cNvPr id="8" name="Rounded Rectangle 7">
-            <a:extLst>
-              <a:ext uri="{FF2B5EF4-FFF2-40B4-BE49-F238E27FC236}">
-                <a16:creationId xmlns:a16="http://schemas.microsoft.com/office/drawing/2014/main" id="{C37ADE09-1787-6785-8E2C-D65683FDF46E}"/>
-              </a:ext>
-            </a:extLst>
-          </p:cNvPr>
-          <p:cNvSpPr/>
-          <p:nvPr/>
-        </p:nvSpPr>
-        <p:spPr>
-          <a:xfrm>
-            <a:off x="4144535" y="2352908"/>
-            <a:ext cx="2858430" cy="1393902"/>
-          </a:xfrm>
-          <a:prstGeom prst="roundRect">
-            <a:avLst/>
-          </a:prstGeom>
-          <a:solidFill>
-            <a:srgbClr val="FF2600"/>
-          </a:solidFill>
-          <a:ln>
-            <a:noFill/>
-          </a:ln>
-        </p:spPr>
-        <p:style>
-          <a:lnRef idx="2">
-            <a:schemeClr val="accent1">
-              <a:shade val="50000"/>
-            </a:schemeClr>
-          </a:lnRef>
-          <a:fillRef idx="1">
-            <a:schemeClr val="accent1"/>
-          </a:fillRef>
-          <a:effectRef idx="0">
-            <a:schemeClr val="accent1"/>
-          </a:effectRef>
-          <a:fontRef idx="minor">
-            <a:schemeClr val="lt1"/>
-          </a:fontRef>
-        </p:style>
-        <p:txBody>
-          <a:bodyPr rtlCol="0" anchor="ctr"/>
-          <a:lstStyle/>
-          <a:p>
-            <a:pPr algn="ctr"/>
-            <a:endParaRPr lang="en-US"/>
-          </a:p>
-        </p:txBody>
-      </p:sp>
-      <p:sp>
-        <p:nvSpPr>
-          <p:cNvPr id="9" name="Rounded Rectangle 8">
-            <a:extLst>
-              <a:ext uri="{FF2B5EF4-FFF2-40B4-BE49-F238E27FC236}">
-                <a16:creationId xmlns:a16="http://schemas.microsoft.com/office/drawing/2014/main" id="{447B304A-47B5-A3FE-33BC-8EAF2F7D4EBE}"/>
-              </a:ext>
-            </a:extLst>
-          </p:cNvPr>
-          <p:cNvSpPr/>
-          <p:nvPr/>
-        </p:nvSpPr>
-        <p:spPr>
-          <a:xfrm>
-            <a:off x="4140818" y="4103649"/>
-            <a:ext cx="2858430" cy="1393902"/>
-          </a:xfrm>
-          <a:prstGeom prst="roundRect">
-            <a:avLst/>
-          </a:prstGeom>
-          <a:solidFill>
-            <a:srgbClr val="FF2600"/>
-          </a:solidFill>
-          <a:ln>
-            <a:noFill/>
-          </a:ln>
-        </p:spPr>
-        <p:style>
-          <a:lnRef idx="2">
-            <a:schemeClr val="accent1">
-              <a:shade val="50000"/>
-            </a:schemeClr>
-          </a:lnRef>
-          <a:fillRef idx="1">
-            <a:schemeClr val="accent1"/>
-          </a:fillRef>
-          <a:effectRef idx="0">
-            <a:schemeClr val="accent1"/>
-          </a:effectRef>
-          <a:fontRef idx="minor">
-            <a:schemeClr val="lt1"/>
-          </a:fontRef>
-        </p:style>
-        <p:txBody>
-          <a:bodyPr rtlCol="0" anchor="ctr"/>
-          <a:lstStyle/>
-          <a:p>
-            <a:pPr algn="ctr"/>
-            <a:endParaRPr lang="en-US"/>
-          </a:p>
-        </p:txBody>
-      </p:sp>
-      <p:sp>
-        <p:nvSpPr>
-          <p:cNvPr id="10" name="Rounded Rectangle 9">
-            <a:extLst>
-              <a:ext uri="{FF2B5EF4-FFF2-40B4-BE49-F238E27FC236}">
-                <a16:creationId xmlns:a16="http://schemas.microsoft.com/office/drawing/2014/main" id="{E98D7E90-33F3-C443-3BFA-7794C3CCD768}"/>
-              </a:ext>
-            </a:extLst>
-          </p:cNvPr>
-          <p:cNvSpPr/>
-          <p:nvPr/>
-        </p:nvSpPr>
-        <p:spPr>
-          <a:xfrm>
-            <a:off x="7426710" y="2352907"/>
-            <a:ext cx="3880626" cy="3144643"/>
-          </a:xfrm>
-          <a:prstGeom prst="roundRect">
-            <a:avLst/>
-          </a:prstGeom>
-          <a:solidFill>
-            <a:srgbClr val="FF2600"/>
-          </a:solidFill>
-          <a:ln>
-            <a:noFill/>
-          </a:ln>
-        </p:spPr>
-        <p:style>
-          <a:lnRef idx="2">
-            <a:schemeClr val="accent1">
-              <a:shade val="50000"/>
-            </a:schemeClr>
-          </a:lnRef>
-          <a:fillRef idx="1">
-            <a:schemeClr val="accent1"/>
-          </a:fillRef>
-          <a:effectRef idx="0">
-            <a:schemeClr val="accent1"/>
-          </a:effectRef>
-          <a:fontRef idx="minor">
-            <a:schemeClr val="lt1"/>
-          </a:fontRef>
-        </p:style>
-        <p:txBody>
-          <a:bodyPr rtlCol="0" anchor="ctr"/>
-          <a:lstStyle/>
-          <a:p>
-            <a:pPr algn="ctr"/>
-            <a:endParaRPr lang="en-US"/>
-          </a:p>
-        </p:txBody>
-      </p:sp>
-      <p:sp>
-        <p:nvSpPr>
-          <p:cNvPr id="12" name="TextBox 11">
-            <a:extLst>
-              <a:ext uri="{FF2B5EF4-FFF2-40B4-BE49-F238E27FC236}">
-                <a16:creationId xmlns:a16="http://schemas.microsoft.com/office/drawing/2014/main" id="{30DBFA55-4E03-11CA-CF70-6AAF015219A1}"/>
-              </a:ext>
-            </a:extLst>
-          </p:cNvPr>
-          <p:cNvSpPr txBox="1"/>
-          <p:nvPr/>
-        </p:nvSpPr>
-        <p:spPr>
-          <a:xfrm>
-            <a:off x="4256047" y="2499280"/>
-            <a:ext cx="2598235" cy="369332"/>
-          </a:xfrm>
-          <a:prstGeom prst="rect">
-            <a:avLst/>
-          </a:prstGeom>
-          <a:noFill/>
-        </p:spPr>
-        <p:txBody>
-          <a:bodyPr wrap="square" rtlCol="0">
-            <a:spAutoFit/>
-          </a:bodyPr>
-          <a:lstStyle/>
-          <a:p>
-            <a:r>
-              <a:rPr lang="en-US" dirty="0">
-                <a:solidFill>
-                  <a:schemeClr val="bg1"/>
-                </a:solidFill>
-              </a:rPr>
-              <a:t>Module 1 (module1.R)</a:t>
-            </a:r>
-          </a:p>
-        </p:txBody>
-      </p:sp>
-      <p:sp>
-        <p:nvSpPr>
-          <p:cNvPr id="13" name="TextBox 12">
-            <a:extLst>
-              <a:ext uri="{FF2B5EF4-FFF2-40B4-BE49-F238E27FC236}">
-                <a16:creationId xmlns:a16="http://schemas.microsoft.com/office/drawing/2014/main" id="{3A597969-B1D8-7662-2F07-B3A9D2416E3A}"/>
-              </a:ext>
-            </a:extLst>
-          </p:cNvPr>
-          <p:cNvSpPr txBox="1"/>
-          <p:nvPr/>
-        </p:nvSpPr>
-        <p:spPr>
-          <a:xfrm>
-            <a:off x="4256046" y="4246304"/>
-            <a:ext cx="2598235" cy="369332"/>
-          </a:xfrm>
-          <a:prstGeom prst="rect">
-            <a:avLst/>
-          </a:prstGeom>
-          <a:noFill/>
-        </p:spPr>
-        <p:txBody>
-          <a:bodyPr wrap="square" rtlCol="0">
-            <a:spAutoFit/>
-          </a:bodyPr>
-          <a:lstStyle/>
-          <a:p>
-            <a:r>
-              <a:rPr lang="en-US" dirty="0">
-                <a:solidFill>
-                  <a:schemeClr val="bg1"/>
-                </a:solidFill>
-              </a:rPr>
-              <a:t>Module 2</a:t>
-            </a:r>
-          </a:p>
-        </p:txBody>
-      </p:sp>
-      <p:sp>
-        <p:nvSpPr>
-          <p:cNvPr id="14" name="TextBox 13">
-            <a:extLst>
-              <a:ext uri="{FF2B5EF4-FFF2-40B4-BE49-F238E27FC236}">
-                <a16:creationId xmlns:a16="http://schemas.microsoft.com/office/drawing/2014/main" id="{F5BED687-C2D5-4C46-B218-EFABD309BBEF}"/>
-              </a:ext>
-            </a:extLst>
-          </p:cNvPr>
-          <p:cNvSpPr txBox="1"/>
-          <p:nvPr/>
-        </p:nvSpPr>
-        <p:spPr>
-          <a:xfrm>
-            <a:off x="7734421" y="2499280"/>
-            <a:ext cx="2598235" cy="369332"/>
-          </a:xfrm>
-          <a:prstGeom prst="rect">
-            <a:avLst/>
-          </a:prstGeom>
-          <a:noFill/>
-        </p:spPr>
-        <p:txBody>
-          <a:bodyPr wrap="square" rtlCol="0">
-            <a:spAutoFit/>
-          </a:bodyPr>
-          <a:lstStyle/>
-          <a:p>
-            <a:r>
-              <a:rPr lang="en-US" dirty="0">
-                <a:solidFill>
-                  <a:schemeClr val="bg1"/>
-                </a:solidFill>
-              </a:rPr>
-              <a:t>Module 3</a:t>
             </a:r>
           </a:p>
         </p:txBody>
       </p:sp>
       <p:grpSp>
         <p:nvGrpSpPr>
-          <p:cNvPr id="25" name="Group 24">
-            <a:extLst>
-              <a:ext uri="{FF2B5EF4-FFF2-40B4-BE49-F238E27FC236}">
-                <a16:creationId xmlns:a16="http://schemas.microsoft.com/office/drawing/2014/main" id="{5E66B628-20C1-AD66-F597-C1C7D3FC60D9}"/>
+          <p:cNvPr id="26" name="Group 25">
+            <a:extLst>
+              <a:ext uri="{FF2B5EF4-FFF2-40B4-BE49-F238E27FC236}">
+                <a16:creationId xmlns:a16="http://schemas.microsoft.com/office/drawing/2014/main" id="{A923645A-559F-68EC-885D-FE1AE2262703}"/>
               </a:ext>
             </a:extLst>
           </p:cNvPr>
@@ -4563,18 +4349,18 @@
         </p:nvGrpSpPr>
         <p:grpSpPr>
           <a:xfrm>
-            <a:off x="433846" y="1453958"/>
-            <a:ext cx="1616927" cy="3950084"/>
-            <a:chOff x="390293" y="984684"/>
-            <a:chExt cx="1616927" cy="3950084"/>
+            <a:off x="167306" y="602955"/>
+            <a:ext cx="2211778" cy="4852326"/>
+            <a:chOff x="172009" y="775129"/>
+            <a:chExt cx="2211778" cy="4852326"/>
           </a:xfrm>
         </p:grpSpPr>
         <p:sp>
           <p:nvSpPr>
-            <p:cNvPr id="15" name="Rounded Rectangle 14">
+            <p:cNvPr id="11" name="Rounded Rectangle 10">
               <a:extLst>
                 <a:ext uri="{FF2B5EF4-FFF2-40B4-BE49-F238E27FC236}">
-                  <a16:creationId xmlns:a16="http://schemas.microsoft.com/office/drawing/2014/main" id="{DDB134D3-C36D-B5C5-3AB1-7F78CEBC7102}"/>
+                  <a16:creationId xmlns:a16="http://schemas.microsoft.com/office/drawing/2014/main" id="{F6C6AB79-BD89-0A2F-EAE1-40E9CCCEDBB9}"/>
                 </a:ext>
               </a:extLst>
             </p:cNvPr>
@@ -4583,14 +4369,601 @@
           </p:nvSpPr>
           <p:spPr>
             <a:xfrm>
-              <a:off x="390293" y="984684"/>
-              <a:ext cx="1616927" cy="767402"/>
+              <a:off x="172009" y="775129"/>
+              <a:ext cx="2211778" cy="4852326"/>
             </a:xfrm>
             <a:prstGeom prst="roundRect">
               <a:avLst/>
             </a:prstGeom>
             <a:solidFill>
+              <a:srgbClr val="F7D2A3"/>
+            </a:solidFill>
+            <a:ln>
+              <a:noFill/>
+            </a:ln>
+          </p:spPr>
+          <p:style>
+            <a:lnRef idx="2">
+              <a:schemeClr val="accent1">
+                <a:shade val="50000"/>
+              </a:schemeClr>
+            </a:lnRef>
+            <a:fillRef idx="1">
+              <a:schemeClr val="accent1"/>
+            </a:fillRef>
+            <a:effectRef idx="0">
+              <a:schemeClr val="accent1"/>
+            </a:effectRef>
+            <a:fontRef idx="minor">
+              <a:schemeClr val="lt1"/>
+            </a:fontRef>
+          </p:style>
+          <p:txBody>
+            <a:bodyPr rtlCol="0" anchor="ctr"/>
+            <a:lstStyle/>
+            <a:p>
+              <a:pPr algn="ctr"/>
+              <a:endParaRPr lang="en-US"/>
+            </a:p>
+          </p:txBody>
+        </p:sp>
+        <p:grpSp>
+          <p:nvGrpSpPr>
+            <p:cNvPr id="25" name="Group 24">
+              <a:extLst>
+                <a:ext uri="{FF2B5EF4-FFF2-40B4-BE49-F238E27FC236}">
+                  <a16:creationId xmlns:a16="http://schemas.microsoft.com/office/drawing/2014/main" id="{5E66B628-20C1-AD66-F597-C1C7D3FC60D9}"/>
+                </a:ext>
+              </a:extLst>
+            </p:cNvPr>
+            <p:cNvGrpSpPr/>
+            <p:nvPr/>
+          </p:nvGrpSpPr>
+          <p:grpSpPr>
+            <a:xfrm>
+              <a:off x="433846" y="1453958"/>
+              <a:ext cx="1616927" cy="3950084"/>
+              <a:chOff x="390293" y="984684"/>
+              <a:chExt cx="1616927" cy="3950084"/>
+            </a:xfrm>
+          </p:grpSpPr>
+          <p:sp>
+            <p:nvSpPr>
+              <p:cNvPr id="15" name="Rounded Rectangle 14">
+                <a:extLst>
+                  <a:ext uri="{FF2B5EF4-FFF2-40B4-BE49-F238E27FC236}">
+                    <a16:creationId xmlns:a16="http://schemas.microsoft.com/office/drawing/2014/main" id="{DDB134D3-C36D-B5C5-3AB1-7F78CEBC7102}"/>
+                  </a:ext>
+                </a:extLst>
+              </p:cNvPr>
+              <p:cNvSpPr/>
+              <p:nvPr/>
+            </p:nvSpPr>
+            <p:spPr>
+              <a:xfrm>
+                <a:off x="390293" y="984684"/>
+                <a:ext cx="1616927" cy="767402"/>
+              </a:xfrm>
+              <a:prstGeom prst="roundRect">
+                <a:avLst/>
+              </a:prstGeom>
+              <a:solidFill>
+                <a:srgbClr val="FF9150"/>
+              </a:solidFill>
+              <a:ln>
+                <a:noFill/>
+              </a:ln>
+            </p:spPr>
+            <p:style>
+              <a:lnRef idx="2">
+                <a:schemeClr val="accent1">
+                  <a:shade val="50000"/>
+                </a:schemeClr>
+              </a:lnRef>
+              <a:fillRef idx="1">
+                <a:schemeClr val="accent1"/>
+              </a:fillRef>
+              <a:effectRef idx="0">
+                <a:schemeClr val="accent1"/>
+              </a:effectRef>
+              <a:fontRef idx="minor">
+                <a:schemeClr val="lt1"/>
+              </a:fontRef>
+            </p:style>
+            <p:txBody>
+              <a:bodyPr rtlCol="0" anchor="ctr"/>
+              <a:lstStyle/>
+              <a:p>
+                <a:pPr algn="ctr"/>
+                <a:endParaRPr lang="en-US"/>
+              </a:p>
+            </p:txBody>
+          </p:sp>
+          <p:sp>
+            <p:nvSpPr>
+              <p:cNvPr id="16" name="TextBox 15">
+                <a:extLst>
+                  <a:ext uri="{FF2B5EF4-FFF2-40B4-BE49-F238E27FC236}">
+                    <a16:creationId xmlns:a16="http://schemas.microsoft.com/office/drawing/2014/main" id="{FD7B3945-4869-C67E-C173-EA15A4B0C27C}"/>
+                  </a:ext>
+                </a:extLst>
+              </p:cNvPr>
+              <p:cNvSpPr txBox="1"/>
+              <p:nvPr/>
+            </p:nvSpPr>
+            <p:spPr>
+              <a:xfrm>
+                <a:off x="656870" y="1175783"/>
+                <a:ext cx="1083771" cy="369332"/>
+              </a:xfrm>
+              <a:prstGeom prst="rect">
+                <a:avLst/>
+              </a:prstGeom>
+              <a:noFill/>
+            </p:spPr>
+            <p:txBody>
+              <a:bodyPr wrap="square" rtlCol="0">
+                <a:spAutoFit/>
+              </a:bodyPr>
+              <a:lstStyle/>
+              <a:p>
+                <a:pPr algn="ctr"/>
+                <a:r>
+                  <a:rPr lang="en-US" dirty="0" err="1">
+                    <a:solidFill>
+                      <a:schemeClr val="bg1"/>
+                    </a:solidFill>
+                  </a:rPr>
+                  <a:t>data.R</a:t>
+                </a:r>
+                <a:endParaRPr lang="en-US" dirty="0">
+                  <a:solidFill>
+                    <a:schemeClr val="bg1"/>
+                  </a:solidFill>
+                </a:endParaRPr>
+              </a:p>
+            </p:txBody>
+          </p:sp>
+          <p:sp>
+            <p:nvSpPr>
+              <p:cNvPr id="17" name="Rounded Rectangle 16">
+                <a:extLst>
+                  <a:ext uri="{FF2B5EF4-FFF2-40B4-BE49-F238E27FC236}">
+                    <a16:creationId xmlns:a16="http://schemas.microsoft.com/office/drawing/2014/main" id="{F5000FFB-CA3A-C507-D465-AE42EAC4EEED}"/>
+                  </a:ext>
+                </a:extLst>
+              </p:cNvPr>
+              <p:cNvSpPr/>
+              <p:nvPr/>
+            </p:nvSpPr>
+            <p:spPr>
+              <a:xfrm>
+                <a:off x="390293" y="2045578"/>
+                <a:ext cx="1616927" cy="767402"/>
+              </a:xfrm>
+              <a:prstGeom prst="roundRect">
+                <a:avLst/>
+              </a:prstGeom>
+              <a:solidFill>
+                <a:srgbClr val="FF9150"/>
+              </a:solidFill>
+              <a:ln>
+                <a:noFill/>
+              </a:ln>
+            </p:spPr>
+            <p:style>
+              <a:lnRef idx="2">
+                <a:schemeClr val="accent1">
+                  <a:shade val="50000"/>
+                </a:schemeClr>
+              </a:lnRef>
+              <a:fillRef idx="1">
+                <a:schemeClr val="accent1"/>
+              </a:fillRef>
+              <a:effectRef idx="0">
+                <a:schemeClr val="accent1"/>
+              </a:effectRef>
+              <a:fontRef idx="minor">
+                <a:schemeClr val="lt1"/>
+              </a:fontRef>
+            </p:style>
+            <p:txBody>
+              <a:bodyPr rtlCol="0" anchor="ctr"/>
+              <a:lstStyle/>
+              <a:p>
+                <a:pPr algn="ctr"/>
+                <a:endParaRPr lang="en-US"/>
+              </a:p>
+            </p:txBody>
+          </p:sp>
+          <p:sp>
+            <p:nvSpPr>
+              <p:cNvPr id="18" name="TextBox 17">
+                <a:extLst>
+                  <a:ext uri="{FF2B5EF4-FFF2-40B4-BE49-F238E27FC236}">
+                    <a16:creationId xmlns:a16="http://schemas.microsoft.com/office/drawing/2014/main" id="{36521321-7355-2FDB-891E-A89D1E15407B}"/>
+                  </a:ext>
+                </a:extLst>
+              </p:cNvPr>
+              <p:cNvSpPr txBox="1"/>
+              <p:nvPr/>
+            </p:nvSpPr>
+            <p:spPr>
+              <a:xfrm>
+                <a:off x="656868" y="2244613"/>
+                <a:ext cx="1083771" cy="369332"/>
+              </a:xfrm>
+              <a:prstGeom prst="rect">
+                <a:avLst/>
+              </a:prstGeom>
+              <a:noFill/>
+            </p:spPr>
+            <p:txBody>
+              <a:bodyPr wrap="square" rtlCol="0">
+                <a:spAutoFit/>
+              </a:bodyPr>
+              <a:lstStyle/>
+              <a:p>
+                <a:pPr algn="ctr"/>
+                <a:r>
+                  <a:rPr lang="en-US" dirty="0" err="1">
+                    <a:solidFill>
+                      <a:schemeClr val="bg1"/>
+                    </a:solidFill>
+                  </a:rPr>
+                  <a:t>inputs.R</a:t>
+                </a:r>
+                <a:endParaRPr lang="en-US" dirty="0">
+                  <a:solidFill>
+                    <a:schemeClr val="bg1"/>
+                  </a:solidFill>
+                </a:endParaRPr>
+              </a:p>
+            </p:txBody>
+          </p:sp>
+          <p:sp>
+            <p:nvSpPr>
+              <p:cNvPr id="19" name="Rounded Rectangle 18">
+                <a:extLst>
+                  <a:ext uri="{FF2B5EF4-FFF2-40B4-BE49-F238E27FC236}">
+                    <a16:creationId xmlns:a16="http://schemas.microsoft.com/office/drawing/2014/main" id="{8110419D-28ED-D800-A1AB-DC30E0B38357}"/>
+                  </a:ext>
+                </a:extLst>
+              </p:cNvPr>
+              <p:cNvSpPr/>
+              <p:nvPr/>
+            </p:nvSpPr>
+            <p:spPr>
+              <a:xfrm>
+                <a:off x="390293" y="3106472"/>
+                <a:ext cx="1616927" cy="767402"/>
+              </a:xfrm>
+              <a:prstGeom prst="roundRect">
+                <a:avLst/>
+              </a:prstGeom>
+              <a:solidFill>
+                <a:srgbClr val="FF9150"/>
+              </a:solidFill>
+              <a:ln>
+                <a:noFill/>
+              </a:ln>
+            </p:spPr>
+            <p:style>
+              <a:lnRef idx="2">
+                <a:schemeClr val="accent1">
+                  <a:shade val="50000"/>
+                </a:schemeClr>
+              </a:lnRef>
+              <a:fillRef idx="1">
+                <a:schemeClr val="accent1"/>
+              </a:fillRef>
+              <a:effectRef idx="0">
+                <a:schemeClr val="accent1"/>
+              </a:effectRef>
+              <a:fontRef idx="minor">
+                <a:schemeClr val="lt1"/>
+              </a:fontRef>
+            </p:style>
+            <p:txBody>
+              <a:bodyPr rtlCol="0" anchor="ctr"/>
+              <a:lstStyle/>
+              <a:p>
+                <a:pPr algn="ctr"/>
+                <a:endParaRPr lang="en-US"/>
+              </a:p>
+            </p:txBody>
+          </p:sp>
+          <p:sp>
+            <p:nvSpPr>
+              <p:cNvPr id="20" name="TextBox 19">
+                <a:extLst>
+                  <a:ext uri="{FF2B5EF4-FFF2-40B4-BE49-F238E27FC236}">
+                    <a16:creationId xmlns:a16="http://schemas.microsoft.com/office/drawing/2014/main" id="{EEFF9D1A-D877-7105-A4BC-B083C698B53D}"/>
+                  </a:ext>
+                </a:extLst>
+              </p:cNvPr>
+              <p:cNvSpPr txBox="1"/>
+              <p:nvPr/>
+            </p:nvSpPr>
+            <p:spPr>
+              <a:xfrm>
+                <a:off x="490386" y="3167602"/>
+                <a:ext cx="1416733" cy="646331"/>
+              </a:xfrm>
+              <a:prstGeom prst="rect">
+                <a:avLst/>
+              </a:prstGeom>
+              <a:noFill/>
+            </p:spPr>
+            <p:txBody>
+              <a:bodyPr wrap="square" rtlCol="0">
+                <a:spAutoFit/>
+              </a:bodyPr>
+              <a:lstStyle/>
+              <a:p>
+                <a:pPr algn="ctr"/>
+                <a:r>
+                  <a:rPr lang="en-US" dirty="0">
+                    <a:solidFill>
+                      <a:schemeClr val="bg1"/>
+                    </a:solidFill>
+                  </a:rPr>
+                  <a:t>common_</a:t>
+                </a:r>
+              </a:p>
+              <a:p>
+                <a:pPr algn="ctr"/>
+                <a:r>
+                  <a:rPr lang="en-US" dirty="0" err="1">
+                    <a:solidFill>
+                      <a:schemeClr val="bg1"/>
+                    </a:solidFill>
+                  </a:rPr>
+                  <a:t>functions.R</a:t>
+                </a:r>
+                <a:endParaRPr lang="en-US" dirty="0">
+                  <a:solidFill>
+                    <a:schemeClr val="bg1"/>
+                  </a:solidFill>
+                </a:endParaRPr>
+              </a:p>
+            </p:txBody>
+          </p:sp>
+          <p:sp>
+            <p:nvSpPr>
+              <p:cNvPr id="21" name="Rounded Rectangle 20">
+                <a:extLst>
+                  <a:ext uri="{FF2B5EF4-FFF2-40B4-BE49-F238E27FC236}">
+                    <a16:creationId xmlns:a16="http://schemas.microsoft.com/office/drawing/2014/main" id="{547E7B67-2244-9ACF-AF19-38B1AFFB257C}"/>
+                  </a:ext>
+                </a:extLst>
+              </p:cNvPr>
+              <p:cNvSpPr/>
+              <p:nvPr/>
+            </p:nvSpPr>
+            <p:spPr>
+              <a:xfrm>
+                <a:off x="390293" y="4167366"/>
+                <a:ext cx="1616927" cy="767402"/>
+              </a:xfrm>
+              <a:prstGeom prst="roundRect">
+                <a:avLst/>
+              </a:prstGeom>
+              <a:solidFill>
+                <a:srgbClr val="FF9150"/>
+              </a:solidFill>
+              <a:ln>
+                <a:noFill/>
+              </a:ln>
+            </p:spPr>
+            <p:style>
+              <a:lnRef idx="2">
+                <a:schemeClr val="accent1">
+                  <a:shade val="50000"/>
+                </a:schemeClr>
+              </a:lnRef>
+              <a:fillRef idx="1">
+                <a:schemeClr val="accent1"/>
+              </a:fillRef>
+              <a:effectRef idx="0">
+                <a:schemeClr val="accent1"/>
+              </a:effectRef>
+              <a:fontRef idx="minor">
+                <a:schemeClr val="lt1"/>
+              </a:fontRef>
+            </p:style>
+            <p:txBody>
+              <a:bodyPr rtlCol="0" anchor="ctr"/>
+              <a:lstStyle/>
+              <a:p>
+                <a:pPr algn="ctr"/>
+                <a:endParaRPr lang="en-US"/>
+              </a:p>
+            </p:txBody>
+          </p:sp>
+          <p:sp>
+            <p:nvSpPr>
+              <p:cNvPr id="22" name="TextBox 21">
+                <a:extLst>
+                  <a:ext uri="{FF2B5EF4-FFF2-40B4-BE49-F238E27FC236}">
+                    <a16:creationId xmlns:a16="http://schemas.microsoft.com/office/drawing/2014/main" id="{F20E2AD3-C19A-E8BF-DC8B-E1A4FAF4BF92}"/>
+                  </a:ext>
+                </a:extLst>
+              </p:cNvPr>
+              <p:cNvSpPr txBox="1"/>
+              <p:nvPr/>
+            </p:nvSpPr>
+            <p:spPr>
+              <a:xfrm>
+                <a:off x="590487" y="4227901"/>
+                <a:ext cx="1216535" cy="646331"/>
+              </a:xfrm>
+              <a:prstGeom prst="rect">
+                <a:avLst/>
+              </a:prstGeom>
+              <a:noFill/>
+            </p:spPr>
+            <p:txBody>
+              <a:bodyPr wrap="square" rtlCol="0">
+                <a:spAutoFit/>
+              </a:bodyPr>
+              <a:lstStyle/>
+              <a:p>
+                <a:pPr algn="ctr"/>
+                <a:r>
+                  <a:rPr lang="en-US" dirty="0">
+                    <a:solidFill>
+                      <a:schemeClr val="bg1"/>
+                    </a:solidFill>
+                  </a:rPr>
+                  <a:t>design_</a:t>
+                </a:r>
+              </a:p>
+              <a:p>
+                <a:pPr algn="ctr"/>
+                <a:r>
+                  <a:rPr lang="en-US" dirty="0" err="1">
+                    <a:solidFill>
+                      <a:schemeClr val="bg1"/>
+                    </a:solidFill>
+                  </a:rPr>
+                  <a:t>kit.R</a:t>
+                </a:r>
+                <a:endParaRPr lang="en-US" dirty="0">
+                  <a:solidFill>
+                    <a:schemeClr val="bg1"/>
+                  </a:solidFill>
+                </a:endParaRPr>
+              </a:p>
+            </p:txBody>
+          </p:sp>
+        </p:grpSp>
+        <p:sp>
+          <p:nvSpPr>
+            <p:cNvPr id="28" name="TextBox 27">
+              <a:extLst>
+                <a:ext uri="{FF2B5EF4-FFF2-40B4-BE49-F238E27FC236}">
+                  <a16:creationId xmlns:a16="http://schemas.microsoft.com/office/drawing/2014/main" id="{41776C22-E5A8-A32D-CCE4-E466586E0D08}"/>
+                </a:ext>
+              </a:extLst>
+            </p:cNvPr>
+            <p:cNvSpPr txBox="1"/>
+            <p:nvPr/>
+          </p:nvSpPr>
+          <p:spPr>
+            <a:xfrm>
+              <a:off x="408881" y="827224"/>
+              <a:ext cx="1775520" cy="369332"/>
+            </a:xfrm>
+            <a:prstGeom prst="rect">
+              <a:avLst/>
+            </a:prstGeom>
+            <a:noFill/>
+          </p:spPr>
+          <p:txBody>
+            <a:bodyPr wrap="square" rtlCol="0">
+              <a:spAutoFit/>
+            </a:bodyPr>
+            <a:lstStyle/>
+            <a:p>
+              <a:r>
+                <a:rPr lang="en-US" dirty="0">
+                  <a:solidFill>
+                    <a:srgbClr val="FF9150"/>
+                  </a:solidFill>
+                </a:rPr>
+                <a:t>External Scripts</a:t>
+              </a:r>
+            </a:p>
+          </p:txBody>
+        </p:sp>
+      </p:grpSp>
+      <p:cxnSp>
+        <p:nvCxnSpPr>
+          <p:cNvPr id="49" name="Straight Arrow Connector 48">
+            <a:extLst>
+              <a:ext uri="{FF2B5EF4-FFF2-40B4-BE49-F238E27FC236}">
+                <a16:creationId xmlns:a16="http://schemas.microsoft.com/office/drawing/2014/main" id="{EDA18C19-BB39-737E-1078-4680760A4B09}"/>
+              </a:ext>
+            </a:extLst>
+          </p:cNvPr>
+          <p:cNvCxnSpPr>
+            <a:cxnSpLocks/>
+          </p:cNvCxnSpPr>
+          <p:nvPr/>
+        </p:nvCxnSpPr>
+        <p:spPr>
+          <a:xfrm>
+            <a:off x="466213" y="1024382"/>
+            <a:ext cx="3674605" cy="0"/>
+          </a:xfrm>
+          <a:prstGeom prst="straightConnector1">
+            <a:avLst/>
+          </a:prstGeom>
+          <a:ln w="28575">
+            <a:solidFill>
               <a:srgbClr val="FF9150"/>
+            </a:solidFill>
+            <a:tailEnd type="triangle"/>
+          </a:ln>
+        </p:spPr>
+        <p:style>
+          <a:lnRef idx="1">
+            <a:schemeClr val="accent1"/>
+          </a:lnRef>
+          <a:fillRef idx="0">
+            <a:schemeClr val="accent1"/>
+          </a:fillRef>
+          <a:effectRef idx="0">
+            <a:schemeClr val="accent1"/>
+          </a:effectRef>
+          <a:fontRef idx="minor">
+            <a:schemeClr val="tx1"/>
+          </a:fontRef>
+        </p:style>
+      </p:cxnSp>
+      <p:grpSp>
+        <p:nvGrpSpPr>
+          <p:cNvPr id="23" name="Group 22">
+            <a:extLst>
+              <a:ext uri="{FF2B5EF4-FFF2-40B4-BE49-F238E27FC236}">
+                <a16:creationId xmlns:a16="http://schemas.microsoft.com/office/drawing/2014/main" id="{16900F95-DDE5-F65E-33BE-5AC89A4B7F52}"/>
+              </a:ext>
+            </a:extLst>
+          </p:cNvPr>
+          <p:cNvGrpSpPr/>
+          <p:nvPr/>
+        </p:nvGrpSpPr>
+        <p:grpSpPr>
+          <a:xfrm>
+            <a:off x="3381606" y="1346218"/>
+            <a:ext cx="8027262" cy="5226458"/>
+            <a:chOff x="3413079" y="653642"/>
+            <a:chExt cx="8027262" cy="5226458"/>
+          </a:xfrm>
+        </p:grpSpPr>
+        <p:sp>
+          <p:nvSpPr>
+            <p:cNvPr id="4" name="Rounded Rectangle 3">
+              <a:extLst>
+                <a:ext uri="{FF2B5EF4-FFF2-40B4-BE49-F238E27FC236}">
+                  <a16:creationId xmlns:a16="http://schemas.microsoft.com/office/drawing/2014/main" id="{CFD71940-7FEB-396C-655C-86EF253D825E}"/>
+                </a:ext>
+              </a:extLst>
+            </p:cNvPr>
+            <p:cNvSpPr/>
+            <p:nvPr/>
+          </p:nvSpPr>
+          <p:spPr>
+            <a:xfrm>
+              <a:off x="3413079" y="653642"/>
+              <a:ext cx="8027262" cy="5226458"/>
+            </a:xfrm>
+            <a:prstGeom prst="roundRect">
+              <a:avLst/>
+            </a:prstGeom>
+            <a:solidFill>
+              <a:srgbClr val="FF7E79"/>
             </a:solidFill>
             <a:ln>
               <a:noFill/>
@@ -4623,50 +4996,10 @@
         </p:sp>
         <p:sp>
           <p:nvSpPr>
-            <p:cNvPr id="16" name="TextBox 15">
+            <p:cNvPr id="6" name="Rounded Rectangle 5">
               <a:extLst>
                 <a:ext uri="{FF2B5EF4-FFF2-40B4-BE49-F238E27FC236}">
-                  <a16:creationId xmlns:a16="http://schemas.microsoft.com/office/drawing/2014/main" id="{FD7B3945-4869-C67E-C173-EA15A4B0C27C}"/>
-                </a:ext>
-              </a:extLst>
-            </p:cNvPr>
-            <p:cNvSpPr txBox="1"/>
-            <p:nvPr/>
-          </p:nvSpPr>
-          <p:spPr>
-            <a:xfrm>
-              <a:off x="656870" y="1175783"/>
-              <a:ext cx="1083771" cy="369332"/>
-            </a:xfrm>
-            <a:prstGeom prst="rect">
-              <a:avLst/>
-            </a:prstGeom>
-            <a:noFill/>
-          </p:spPr>
-          <p:txBody>
-            <a:bodyPr wrap="square" rtlCol="0">
-              <a:spAutoFit/>
-            </a:bodyPr>
-            <a:lstStyle/>
-            <a:p>
-              <a:pPr algn="ctr"/>
-              <a:r>
-                <a:rPr lang="en-US" dirty="0">
-                  <a:solidFill>
-                    <a:schemeClr val="bg1"/>
-                  </a:solidFill>
-                </a:rPr>
-                <a:t>Data</a:t>
-              </a:r>
-            </a:p>
-          </p:txBody>
-        </p:sp>
-        <p:sp>
-          <p:nvSpPr>
-            <p:cNvPr id="17" name="Rounded Rectangle 16">
-              <a:extLst>
-                <a:ext uri="{FF2B5EF4-FFF2-40B4-BE49-F238E27FC236}">
-                  <a16:creationId xmlns:a16="http://schemas.microsoft.com/office/drawing/2014/main" id="{F5000FFB-CA3A-C507-D465-AE42EAC4EEED}"/>
+                  <a16:creationId xmlns:a16="http://schemas.microsoft.com/office/drawing/2014/main" id="{37E80B47-7E99-D401-6F58-3925E1249686}"/>
                 </a:ext>
               </a:extLst>
             </p:cNvPr>
@@ -4675,14 +5008,14 @@
           </p:nvSpPr>
           <p:spPr>
             <a:xfrm>
-              <a:off x="390293" y="2045578"/>
-              <a:ext cx="1616927" cy="767402"/>
+              <a:off x="4144536" y="1360449"/>
+              <a:ext cx="6637764" cy="669073"/>
             </a:xfrm>
             <a:prstGeom prst="roundRect">
               <a:avLst/>
             </a:prstGeom>
             <a:solidFill>
-              <a:srgbClr val="FF9150"/>
+              <a:srgbClr val="C00000"/>
             </a:solidFill>
             <a:ln>
               <a:noFill/>
@@ -4715,10 +5048,10 @@
         </p:sp>
         <p:sp>
           <p:nvSpPr>
-            <p:cNvPr id="18" name="TextBox 17">
+            <p:cNvPr id="5" name="TextBox 4">
               <a:extLst>
                 <a:ext uri="{FF2B5EF4-FFF2-40B4-BE49-F238E27FC236}">
-                  <a16:creationId xmlns:a16="http://schemas.microsoft.com/office/drawing/2014/main" id="{36521321-7355-2FDB-891E-A89D1E15407B}"/>
+                  <a16:creationId xmlns:a16="http://schemas.microsoft.com/office/drawing/2014/main" id="{D5C9EEDE-B2B2-7831-C54A-19C5D2B7BEA7}"/>
                 </a:ext>
               </a:extLst>
             </p:cNvPr>
@@ -4727,8 +5060,8 @@
           </p:nvSpPr>
           <p:spPr>
             <a:xfrm>
-              <a:off x="656868" y="2244613"/>
-              <a:ext cx="1083771" cy="369332"/>
+              <a:off x="4256048" y="1409960"/>
+              <a:ext cx="3478373" cy="369332"/>
             </a:xfrm>
             <a:prstGeom prst="rect">
               <a:avLst/>
@@ -4741,24 +5074,23 @@
             </a:bodyPr>
             <a:lstStyle/>
             <a:p>
-              <a:pPr algn="ctr"/>
               <a:r>
                 <a:rPr lang="en-US" dirty="0">
                   <a:solidFill>
                     <a:schemeClr val="bg1"/>
                   </a:solidFill>
                 </a:rPr>
-                <a:t>Inputs</a:t>
+                <a:t>Tab 1 Global Input Variables</a:t>
               </a:r>
             </a:p>
           </p:txBody>
         </p:sp>
         <p:sp>
           <p:nvSpPr>
-            <p:cNvPr id="19" name="Rounded Rectangle 18">
+            <p:cNvPr id="8" name="Rounded Rectangle 7">
               <a:extLst>
                 <a:ext uri="{FF2B5EF4-FFF2-40B4-BE49-F238E27FC236}">
-                  <a16:creationId xmlns:a16="http://schemas.microsoft.com/office/drawing/2014/main" id="{8110419D-28ED-D800-A1AB-DC30E0B38357}"/>
+                  <a16:creationId xmlns:a16="http://schemas.microsoft.com/office/drawing/2014/main" id="{C37ADE09-1787-6785-8E2C-D65683FDF46E}"/>
                 </a:ext>
               </a:extLst>
             </p:cNvPr>
@@ -4767,14 +5099,14 @@
           </p:nvSpPr>
           <p:spPr>
             <a:xfrm>
-              <a:off x="390293" y="3106472"/>
-              <a:ext cx="1616927" cy="767402"/>
+              <a:off x="4144535" y="2352908"/>
+              <a:ext cx="2858430" cy="1393902"/>
             </a:xfrm>
             <a:prstGeom prst="roundRect">
               <a:avLst/>
             </a:prstGeom>
             <a:solidFill>
-              <a:srgbClr val="FF9150"/>
+              <a:srgbClr val="FF2600"/>
             </a:solidFill>
             <a:ln>
               <a:noFill/>
@@ -4807,61 +5139,10 @@
         </p:sp>
         <p:sp>
           <p:nvSpPr>
-            <p:cNvPr id="20" name="TextBox 19">
+            <p:cNvPr id="9" name="Rounded Rectangle 8">
               <a:extLst>
                 <a:ext uri="{FF2B5EF4-FFF2-40B4-BE49-F238E27FC236}">
-                  <a16:creationId xmlns:a16="http://schemas.microsoft.com/office/drawing/2014/main" id="{EEFF9D1A-D877-7105-A4BC-B083C698B53D}"/>
-                </a:ext>
-              </a:extLst>
-            </p:cNvPr>
-            <p:cNvSpPr txBox="1"/>
-            <p:nvPr/>
-          </p:nvSpPr>
-          <p:spPr>
-            <a:xfrm>
-              <a:off x="590487" y="3167007"/>
-              <a:ext cx="1216535" cy="646331"/>
-            </a:xfrm>
-            <a:prstGeom prst="rect">
-              <a:avLst/>
-            </a:prstGeom>
-            <a:noFill/>
-          </p:spPr>
-          <p:txBody>
-            <a:bodyPr wrap="square" rtlCol="0">
-              <a:spAutoFit/>
-            </a:bodyPr>
-            <a:lstStyle/>
-            <a:p>
-              <a:pPr algn="ctr"/>
-              <a:r>
-                <a:rPr lang="en-US" dirty="0">
-                  <a:solidFill>
-                    <a:schemeClr val="bg1"/>
-                  </a:solidFill>
-                </a:rPr>
-                <a:t>Common</a:t>
-              </a:r>
-            </a:p>
-            <a:p>
-              <a:pPr algn="ctr"/>
-              <a:r>
-                <a:rPr lang="en-US" dirty="0">
-                  <a:solidFill>
-                    <a:schemeClr val="bg1"/>
-                  </a:solidFill>
-                </a:rPr>
-                <a:t>Functions</a:t>
-              </a:r>
-            </a:p>
-          </p:txBody>
-        </p:sp>
-        <p:sp>
-          <p:nvSpPr>
-            <p:cNvPr id="21" name="Rounded Rectangle 20">
-              <a:extLst>
-                <a:ext uri="{FF2B5EF4-FFF2-40B4-BE49-F238E27FC236}">
-                  <a16:creationId xmlns:a16="http://schemas.microsoft.com/office/drawing/2014/main" id="{547E7B67-2244-9ACF-AF19-38B1AFFB257C}"/>
+                  <a16:creationId xmlns:a16="http://schemas.microsoft.com/office/drawing/2014/main" id="{447B304A-47B5-A3FE-33BC-8EAF2F7D4EBE}"/>
                 </a:ext>
               </a:extLst>
             </p:cNvPr>
@@ -4870,14 +5151,14 @@
           </p:nvSpPr>
           <p:spPr>
             <a:xfrm>
-              <a:off x="390293" y="4167366"/>
-              <a:ext cx="1616927" cy="767402"/>
+              <a:off x="4140818" y="4103649"/>
+              <a:ext cx="2858430" cy="1393902"/>
             </a:xfrm>
             <a:prstGeom prst="roundRect">
               <a:avLst/>
             </a:prstGeom>
             <a:solidFill>
-              <a:srgbClr val="FF9150"/>
+              <a:srgbClr val="FF2600"/>
             </a:solidFill>
             <a:ln>
               <a:noFill/>
@@ -4910,10 +5191,62 @@
         </p:sp>
         <p:sp>
           <p:nvSpPr>
-            <p:cNvPr id="22" name="TextBox 21">
+            <p:cNvPr id="10" name="Rounded Rectangle 9">
               <a:extLst>
                 <a:ext uri="{FF2B5EF4-FFF2-40B4-BE49-F238E27FC236}">
-                  <a16:creationId xmlns:a16="http://schemas.microsoft.com/office/drawing/2014/main" id="{F20E2AD3-C19A-E8BF-DC8B-E1A4FAF4BF92}"/>
+                  <a16:creationId xmlns:a16="http://schemas.microsoft.com/office/drawing/2014/main" id="{E98D7E90-33F3-C443-3BFA-7794C3CCD768}"/>
+                </a:ext>
+              </a:extLst>
+            </p:cNvPr>
+            <p:cNvSpPr/>
+            <p:nvPr/>
+          </p:nvSpPr>
+          <p:spPr>
+            <a:xfrm>
+              <a:off x="7426710" y="2352907"/>
+              <a:ext cx="3355588" cy="3144643"/>
+            </a:xfrm>
+            <a:prstGeom prst="roundRect">
+              <a:avLst/>
+            </a:prstGeom>
+            <a:solidFill>
+              <a:srgbClr val="FF2600"/>
+            </a:solidFill>
+            <a:ln>
+              <a:noFill/>
+            </a:ln>
+          </p:spPr>
+          <p:style>
+            <a:lnRef idx="2">
+              <a:schemeClr val="accent1">
+                <a:shade val="50000"/>
+              </a:schemeClr>
+            </a:lnRef>
+            <a:fillRef idx="1">
+              <a:schemeClr val="accent1"/>
+            </a:fillRef>
+            <a:effectRef idx="0">
+              <a:schemeClr val="accent1"/>
+            </a:effectRef>
+            <a:fontRef idx="minor">
+              <a:schemeClr val="lt1"/>
+            </a:fontRef>
+          </p:style>
+          <p:txBody>
+            <a:bodyPr rtlCol="0" anchor="ctr"/>
+            <a:lstStyle/>
+            <a:p>
+              <a:pPr algn="ctr"/>
+              <a:endParaRPr lang="en-US"/>
+            </a:p>
+          </p:txBody>
+        </p:sp>
+        <p:sp>
+          <p:nvSpPr>
+            <p:cNvPr id="12" name="TextBox 11">
+              <a:extLst>
+                <a:ext uri="{FF2B5EF4-FFF2-40B4-BE49-F238E27FC236}">
+                  <a16:creationId xmlns:a16="http://schemas.microsoft.com/office/drawing/2014/main" id="{30DBFA55-4E03-11CA-CF70-6AAF015219A1}"/>
                 </a:ext>
               </a:extLst>
             </p:cNvPr>
@@ -4922,8 +5255,8 @@
           </p:nvSpPr>
           <p:spPr>
             <a:xfrm>
-              <a:off x="590487" y="4227901"/>
-              <a:ext cx="1216535" cy="646331"/>
+              <a:off x="4256047" y="2499280"/>
+              <a:ext cx="2598235" cy="369332"/>
             </a:xfrm>
             <a:prstGeom prst="rect">
               <a:avLst/>
@@ -4936,25 +5269,263 @@
             </a:bodyPr>
             <a:lstStyle/>
             <a:p>
-              <a:pPr algn="ctr"/>
               <a:r>
                 <a:rPr lang="en-US" dirty="0">
                   <a:solidFill>
                     <a:schemeClr val="bg1"/>
                   </a:solidFill>
                 </a:rPr>
-                <a:t>Design</a:t>
+                <a:t>Module 1 (Inner Module)</a:t>
               </a:r>
             </a:p>
+          </p:txBody>
+        </p:sp>
+        <p:sp>
+          <p:nvSpPr>
+            <p:cNvPr id="13" name="TextBox 12">
+              <a:extLst>
+                <a:ext uri="{FF2B5EF4-FFF2-40B4-BE49-F238E27FC236}">
+                  <a16:creationId xmlns:a16="http://schemas.microsoft.com/office/drawing/2014/main" id="{3A597969-B1D8-7662-2F07-B3A9D2416E3A}"/>
+                </a:ext>
+              </a:extLst>
+            </p:cNvPr>
+            <p:cNvSpPr txBox="1"/>
+            <p:nvPr/>
+          </p:nvSpPr>
+          <p:spPr>
+            <a:xfrm>
+              <a:off x="4256046" y="4246304"/>
+              <a:ext cx="2598235" cy="369332"/>
+            </a:xfrm>
+            <a:prstGeom prst="rect">
+              <a:avLst/>
+            </a:prstGeom>
+            <a:noFill/>
+          </p:spPr>
+          <p:txBody>
+            <a:bodyPr wrap="square" rtlCol="0">
+              <a:spAutoFit/>
+            </a:bodyPr>
+            <a:lstStyle/>
             <a:p>
-              <a:pPr algn="ctr"/>
               <a:r>
                 <a:rPr lang="en-US" dirty="0">
                   <a:solidFill>
                     <a:schemeClr val="bg1"/>
                   </a:solidFill>
                 </a:rPr>
-                <a:t>Kit</a:t>
+                <a:t>Module 2 (Inner Module)</a:t>
+              </a:r>
+            </a:p>
+          </p:txBody>
+        </p:sp>
+        <p:sp>
+          <p:nvSpPr>
+            <p:cNvPr id="14" name="TextBox 13">
+              <a:extLst>
+                <a:ext uri="{FF2B5EF4-FFF2-40B4-BE49-F238E27FC236}">
+                  <a16:creationId xmlns:a16="http://schemas.microsoft.com/office/drawing/2014/main" id="{F5BED687-C2D5-4C46-B218-EFABD309BBEF}"/>
+                </a:ext>
+              </a:extLst>
+            </p:cNvPr>
+            <p:cNvSpPr txBox="1"/>
+            <p:nvPr/>
+          </p:nvSpPr>
+          <p:spPr>
+            <a:xfrm>
+              <a:off x="7734421" y="2499280"/>
+              <a:ext cx="2598235" cy="369332"/>
+            </a:xfrm>
+            <a:prstGeom prst="rect">
+              <a:avLst/>
+            </a:prstGeom>
+            <a:noFill/>
+          </p:spPr>
+          <p:txBody>
+            <a:bodyPr wrap="square" rtlCol="0">
+              <a:spAutoFit/>
+            </a:bodyPr>
+            <a:lstStyle/>
+            <a:p>
+              <a:r>
+                <a:rPr lang="en-US" dirty="0">
+                  <a:solidFill>
+                    <a:schemeClr val="bg1"/>
+                  </a:solidFill>
+                </a:rPr>
+                <a:t>Module 3 (Inner Module)</a:t>
+              </a:r>
+            </a:p>
+          </p:txBody>
+        </p:sp>
+        <p:cxnSp>
+          <p:nvCxnSpPr>
+            <p:cNvPr id="36" name="Straight Arrow Connector 35">
+              <a:extLst>
+                <a:ext uri="{FF2B5EF4-FFF2-40B4-BE49-F238E27FC236}">
+                  <a16:creationId xmlns:a16="http://schemas.microsoft.com/office/drawing/2014/main" id="{D2F89F85-0181-E804-8D66-6D964A0005FF}"/>
+                </a:ext>
+              </a:extLst>
+            </p:cNvPr>
+            <p:cNvCxnSpPr/>
+            <p:nvPr/>
+          </p:nvCxnSpPr>
+          <p:spPr>
+            <a:xfrm>
+              <a:off x="5185317" y="2029521"/>
+              <a:ext cx="0" cy="323385"/>
+            </a:xfrm>
+            <a:prstGeom prst="straightConnector1">
+              <a:avLst/>
+            </a:prstGeom>
+            <a:ln w="12700">
+              <a:solidFill>
+                <a:srgbClr val="C00000"/>
+              </a:solidFill>
+              <a:prstDash val="sysDot"/>
+              <a:tailEnd type="triangle"/>
+            </a:ln>
+          </p:spPr>
+          <p:style>
+            <a:lnRef idx="1">
+              <a:schemeClr val="accent1"/>
+            </a:lnRef>
+            <a:fillRef idx="0">
+              <a:schemeClr val="accent1"/>
+            </a:fillRef>
+            <a:effectRef idx="0">
+              <a:schemeClr val="accent1"/>
+            </a:effectRef>
+            <a:fontRef idx="minor">
+              <a:schemeClr val="tx1"/>
+            </a:fontRef>
+          </p:style>
+        </p:cxnSp>
+        <p:cxnSp>
+          <p:nvCxnSpPr>
+            <p:cNvPr id="37" name="Straight Arrow Connector 36">
+              <a:extLst>
+                <a:ext uri="{FF2B5EF4-FFF2-40B4-BE49-F238E27FC236}">
+                  <a16:creationId xmlns:a16="http://schemas.microsoft.com/office/drawing/2014/main" id="{4ECD6E10-8A4F-59E5-E0D7-17A756E3933C}"/>
+                </a:ext>
+              </a:extLst>
+            </p:cNvPr>
+            <p:cNvCxnSpPr/>
+            <p:nvPr/>
+          </p:nvCxnSpPr>
+          <p:spPr>
+            <a:xfrm>
+              <a:off x="8671932" y="2029521"/>
+              <a:ext cx="0" cy="323385"/>
+            </a:xfrm>
+            <a:prstGeom prst="straightConnector1">
+              <a:avLst/>
+            </a:prstGeom>
+            <a:ln w="12700">
+              <a:solidFill>
+                <a:srgbClr val="C00000"/>
+              </a:solidFill>
+              <a:prstDash val="sysDot"/>
+              <a:tailEnd type="triangle"/>
+            </a:ln>
+          </p:spPr>
+          <p:style>
+            <a:lnRef idx="1">
+              <a:schemeClr val="accent1"/>
+            </a:lnRef>
+            <a:fillRef idx="0">
+              <a:schemeClr val="accent1"/>
+            </a:fillRef>
+            <a:effectRef idx="0">
+              <a:schemeClr val="accent1"/>
+            </a:effectRef>
+            <a:fontRef idx="minor">
+              <a:schemeClr val="tx1"/>
+            </a:fontRef>
+          </p:style>
+        </p:cxnSp>
+        <p:cxnSp>
+          <p:nvCxnSpPr>
+            <p:cNvPr id="39" name="Elbow Connector 38">
+              <a:extLst>
+                <a:ext uri="{FF2B5EF4-FFF2-40B4-BE49-F238E27FC236}">
+                  <a16:creationId xmlns:a16="http://schemas.microsoft.com/office/drawing/2014/main" id="{286E8A43-39BE-CFAF-C525-56CC5C1CCA57}"/>
+                </a:ext>
+              </a:extLst>
+            </p:cNvPr>
+            <p:cNvCxnSpPr>
+              <a:cxnSpLocks/>
+            </p:cNvCxnSpPr>
+            <p:nvPr/>
+          </p:nvCxnSpPr>
+          <p:spPr>
+            <a:xfrm rot="5400000">
+              <a:off x="5767039" y="2655843"/>
+              <a:ext cx="2074128" cy="821485"/>
+            </a:xfrm>
+            <a:prstGeom prst="bentConnector3">
+              <a:avLst>
+                <a:gd name="adj1" fmla="val 86559"/>
+              </a:avLst>
+            </a:prstGeom>
+            <a:ln w="12700">
+              <a:solidFill>
+                <a:srgbClr val="C00000"/>
+              </a:solidFill>
+              <a:prstDash val="sysDot"/>
+              <a:tailEnd type="triangle"/>
+            </a:ln>
+          </p:spPr>
+          <p:style>
+            <a:lnRef idx="1">
+              <a:schemeClr val="accent1"/>
+            </a:lnRef>
+            <a:fillRef idx="0">
+              <a:schemeClr val="accent1"/>
+            </a:fillRef>
+            <a:effectRef idx="0">
+              <a:schemeClr val="accent1"/>
+            </a:effectRef>
+            <a:fontRef idx="minor">
+              <a:schemeClr val="tx1"/>
+            </a:fontRef>
+          </p:style>
+        </p:cxnSp>
+        <p:sp>
+          <p:nvSpPr>
+            <p:cNvPr id="3" name="TextBox 2">
+              <a:extLst>
+                <a:ext uri="{FF2B5EF4-FFF2-40B4-BE49-F238E27FC236}">
+                  <a16:creationId xmlns:a16="http://schemas.microsoft.com/office/drawing/2014/main" id="{565596FA-32A7-5C80-B3BB-8191A2EC1EF0}"/>
+                </a:ext>
+              </a:extLst>
+            </p:cNvPr>
+            <p:cNvSpPr txBox="1"/>
+            <p:nvPr/>
+          </p:nvSpPr>
+          <p:spPr>
+            <a:xfrm>
+              <a:off x="4120467" y="775128"/>
+              <a:ext cx="2598235" cy="369332"/>
+            </a:xfrm>
+            <a:prstGeom prst="rect">
+              <a:avLst/>
+            </a:prstGeom>
+            <a:noFill/>
+          </p:spPr>
+          <p:txBody>
+            <a:bodyPr wrap="square" rtlCol="0">
+              <a:spAutoFit/>
+            </a:bodyPr>
+            <a:lstStyle/>
+            <a:p>
+              <a:r>
+                <a:rPr lang="en-US" dirty="0">
+                  <a:solidFill>
+                    <a:schemeClr val="bg1"/>
+                  </a:solidFill>
+                </a:rPr>
+                <a:t>Tab 1 (Outer Module)</a:t>
               </a:r>
             </a:p>
           </p:txBody>
@@ -4962,10 +5533,10 @@
       </p:grpSp>
       <p:sp>
         <p:nvSpPr>
-          <p:cNvPr id="28" name="TextBox 27">
-            <a:extLst>
-              <a:ext uri="{FF2B5EF4-FFF2-40B4-BE49-F238E27FC236}">
-                <a16:creationId xmlns:a16="http://schemas.microsoft.com/office/drawing/2014/main" id="{41776C22-E5A8-A32D-CCE4-E466586E0D08}"/>
+          <p:cNvPr id="29" name="TextBox 28">
+            <a:extLst>
+              <a:ext uri="{FF2B5EF4-FFF2-40B4-BE49-F238E27FC236}">
+                <a16:creationId xmlns:a16="http://schemas.microsoft.com/office/drawing/2014/main" id="{77D93DD7-B937-AFA6-52E6-6E0E5F16219C}"/>
               </a:ext>
             </a:extLst>
           </p:cNvPr>
@@ -4974,8 +5545,8 @@
         </p:nvSpPr>
         <p:spPr>
           <a:xfrm>
-            <a:off x="408880" y="827224"/>
-            <a:ext cx="2598235" cy="369332"/>
+            <a:off x="4152494" y="667873"/>
+            <a:ext cx="6526252" cy="369332"/>
           </a:xfrm>
           <a:prstGeom prst="rect">
             <a:avLst/>
@@ -4991,191 +5562,14 @@
             <a:r>
               <a:rPr lang="en-US" dirty="0">
                 <a:solidFill>
-                  <a:srgbClr val="FF9150"/>
-                </a:solidFill>
-              </a:rPr>
-              <a:t>Sources</a:t>
-            </a:r>
-          </a:p>
-        </p:txBody>
-      </p:sp>
-      <p:cxnSp>
-        <p:nvCxnSpPr>
-          <p:cNvPr id="36" name="Straight Arrow Connector 35">
-            <a:extLst>
-              <a:ext uri="{FF2B5EF4-FFF2-40B4-BE49-F238E27FC236}">
-                <a16:creationId xmlns:a16="http://schemas.microsoft.com/office/drawing/2014/main" id="{D2F89F85-0181-E804-8D66-6D964A0005FF}"/>
-              </a:ext>
-            </a:extLst>
-          </p:cNvPr>
-          <p:cNvCxnSpPr/>
-          <p:nvPr/>
-        </p:nvCxnSpPr>
-        <p:spPr>
-          <a:xfrm>
-            <a:off x="5185317" y="2029521"/>
-            <a:ext cx="0" cy="323385"/>
-          </a:xfrm>
-          <a:prstGeom prst="straightConnector1">
-            <a:avLst/>
-          </a:prstGeom>
-          <a:ln w="12700">
-            <a:solidFill>
-              <a:srgbClr val="C00000"/>
-            </a:solidFill>
-            <a:prstDash val="sysDot"/>
-            <a:tailEnd type="triangle"/>
-          </a:ln>
-        </p:spPr>
-        <p:style>
-          <a:lnRef idx="1">
-            <a:schemeClr val="accent1"/>
-          </a:lnRef>
-          <a:fillRef idx="0">
-            <a:schemeClr val="accent1"/>
-          </a:fillRef>
-          <a:effectRef idx="0">
-            <a:schemeClr val="accent1"/>
-          </a:effectRef>
-          <a:fontRef idx="minor">
-            <a:schemeClr val="tx1"/>
-          </a:fontRef>
-        </p:style>
-      </p:cxnSp>
-      <p:cxnSp>
-        <p:nvCxnSpPr>
-          <p:cNvPr id="37" name="Straight Arrow Connector 36">
-            <a:extLst>
-              <a:ext uri="{FF2B5EF4-FFF2-40B4-BE49-F238E27FC236}">
-                <a16:creationId xmlns:a16="http://schemas.microsoft.com/office/drawing/2014/main" id="{4ECD6E10-8A4F-59E5-E0D7-17A756E3933C}"/>
-              </a:ext>
-            </a:extLst>
-          </p:cNvPr>
-          <p:cNvCxnSpPr/>
-          <p:nvPr/>
-        </p:nvCxnSpPr>
-        <p:spPr>
-          <a:xfrm>
-            <a:off x="8671932" y="2029521"/>
-            <a:ext cx="0" cy="323385"/>
-          </a:xfrm>
-          <a:prstGeom prst="straightConnector1">
-            <a:avLst/>
-          </a:prstGeom>
-          <a:ln w="12700">
-            <a:solidFill>
-              <a:srgbClr val="C00000"/>
-            </a:solidFill>
-            <a:prstDash val="sysDot"/>
-            <a:tailEnd type="triangle"/>
-          </a:ln>
-        </p:spPr>
-        <p:style>
-          <a:lnRef idx="1">
-            <a:schemeClr val="accent1"/>
-          </a:lnRef>
-          <a:fillRef idx="0">
-            <a:schemeClr val="accent1"/>
-          </a:fillRef>
-          <a:effectRef idx="0">
-            <a:schemeClr val="accent1"/>
-          </a:effectRef>
-          <a:fontRef idx="minor">
-            <a:schemeClr val="tx1"/>
-          </a:fontRef>
-        </p:style>
-      </p:cxnSp>
-      <p:cxnSp>
-        <p:nvCxnSpPr>
-          <p:cNvPr id="39" name="Elbow Connector 38">
-            <a:extLst>
-              <a:ext uri="{FF2B5EF4-FFF2-40B4-BE49-F238E27FC236}">
-                <a16:creationId xmlns:a16="http://schemas.microsoft.com/office/drawing/2014/main" id="{286E8A43-39BE-CFAF-C525-56CC5C1CCA57}"/>
-              </a:ext>
-            </a:extLst>
-          </p:cNvPr>
-          <p:cNvCxnSpPr>
-            <a:cxnSpLocks/>
-          </p:cNvCxnSpPr>
-          <p:nvPr/>
-        </p:nvCxnSpPr>
-        <p:spPr>
-          <a:xfrm rot="5400000">
-            <a:off x="5767039" y="2655843"/>
-            <a:ext cx="2074128" cy="821485"/>
-          </a:xfrm>
-          <a:prstGeom prst="bentConnector3">
-            <a:avLst>
-              <a:gd name="adj1" fmla="val 86559"/>
-            </a:avLst>
-          </a:prstGeom>
-          <a:ln w="12700">
-            <a:solidFill>
-              <a:srgbClr val="C00000"/>
-            </a:solidFill>
-            <a:prstDash val="sysDot"/>
-            <a:tailEnd type="triangle"/>
-          </a:ln>
-        </p:spPr>
-        <p:style>
-          <a:lnRef idx="1">
-            <a:schemeClr val="accent1"/>
-          </a:lnRef>
-          <a:fillRef idx="0">
-            <a:schemeClr val="accent1"/>
-          </a:fillRef>
-          <a:effectRef idx="0">
-            <a:schemeClr val="accent1"/>
-          </a:effectRef>
-          <a:fontRef idx="minor">
-            <a:schemeClr val="tx1"/>
-          </a:fontRef>
-        </p:style>
-      </p:cxnSp>
-      <p:cxnSp>
-        <p:nvCxnSpPr>
-          <p:cNvPr id="49" name="Straight Arrow Connector 48">
-            <a:extLst>
-              <a:ext uri="{FF2B5EF4-FFF2-40B4-BE49-F238E27FC236}">
-                <a16:creationId xmlns:a16="http://schemas.microsoft.com/office/drawing/2014/main" id="{EDA18C19-BB39-737E-1078-4680760A4B09}"/>
-              </a:ext>
-            </a:extLst>
-          </p:cNvPr>
-          <p:cNvCxnSpPr>
-            <a:cxnSpLocks/>
-          </p:cNvCxnSpPr>
-          <p:nvPr/>
-        </p:nvCxnSpPr>
-        <p:spPr>
-          <a:xfrm>
-            <a:off x="1371600" y="1011890"/>
-            <a:ext cx="2349190" cy="0"/>
-          </a:xfrm>
-          <a:prstGeom prst="straightConnector1">
-            <a:avLst/>
-          </a:prstGeom>
-          <a:ln w="28575">
-            <a:solidFill>
-              <a:srgbClr val="FF9150"/>
-            </a:solidFill>
-            <a:tailEnd type="triangle"/>
-          </a:ln>
-        </p:spPr>
-        <p:style>
-          <a:lnRef idx="1">
-            <a:schemeClr val="accent1"/>
-          </a:lnRef>
-          <a:fillRef idx="0">
-            <a:schemeClr val="accent1"/>
-          </a:fillRef>
-          <a:effectRef idx="0">
-            <a:schemeClr val="accent1"/>
-          </a:effectRef>
-          <a:fontRef idx="minor">
-            <a:schemeClr val="tx1"/>
-          </a:fontRef>
-        </p:style>
-      </p:cxnSp>
+                  <a:srgbClr val="DE1400"/>
+                </a:solidFill>
+              </a:rPr>
+              <a:t>Setup, design, navigation bar, footer</a:t>
+            </a:r>
+          </a:p>
+        </p:txBody>
+      </p:sp>
     </p:spTree>
     <p:extLst>
       <p:ext uri="{BB962C8B-B14F-4D97-AF65-F5344CB8AC3E}">
@@ -5345,7 +5739,7 @@
                   <a:schemeClr val="bg1"/>
                 </a:solidFill>
               </a:rPr>
-              <a:t>(module1.R)</a:t>
+              <a:t>module1.R</a:t>
             </a:r>
           </a:p>
           <a:p>
@@ -5655,17 +6049,21 @@
               <a:buChar char="•"/>
             </a:pPr>
             <a:r>
-              <a:rPr lang="en-GB" b="0" i="0" u="none" strike="noStrike" dirty="0">
+              <a:rPr lang="en-GB" dirty="0">
                 <a:solidFill>
                   <a:srgbClr val="333333"/>
                 </a:solidFill>
-                <a:effectLst/>
-                <a:latin typeface="Lato" panose="020F0502020204030203" pitchFamily="34" charset="0"/>
+                <a:latin typeface="Lato" panose="020F0502020204030204" pitchFamily="34" charset="0"/>
               </a:rPr>
               <a:t>The results are wrapped in </a:t>
             </a:r>
             <a:r>
-              <a:rPr lang="en-GB" dirty="0" err="1"/>
+              <a:rPr lang="en-GB" dirty="0" err="1">
+                <a:solidFill>
+                  <a:srgbClr val="333333"/>
+                </a:solidFill>
+                <a:latin typeface="Lato" panose="020F0502020204030204" pitchFamily="34" charset="0"/>
+              </a:rPr>
               <a:t>tagList</a:t>
             </a:r>
             <a:r>
@@ -5673,29 +6071,34 @@
                 <a:solidFill>
                   <a:srgbClr val="333333"/>
                 </a:solidFill>
-                <a:latin typeface="Lato" panose="020F0502020204030203" pitchFamily="34" charset="0"/>
-              </a:rPr>
-              <a:t> </a:t>
-            </a:r>
-            <a:r>
-              <a:rPr lang="en-GB" b="0" i="0" u="none" strike="noStrike" dirty="0">
+                <a:latin typeface="Lato" panose="020F0502020204030204" pitchFamily="34" charset="0"/>
+              </a:rPr>
+              <a:t> instead of </a:t>
+            </a:r>
+            <a:r>
+              <a:rPr lang="en-GB" dirty="0" err="1">
                 <a:solidFill>
                   <a:srgbClr val="333333"/>
                 </a:solidFill>
-                <a:effectLst/>
-                <a:latin typeface="Lato" panose="020F0502020204030203" pitchFamily="34" charset="0"/>
-              </a:rPr>
-              <a:t>instead of </a:t>
-            </a:r>
-            <a:r>
-              <a:rPr lang="en-GB" dirty="0" err="1"/>
+                <a:latin typeface="Lato" panose="020F0502020204030204" pitchFamily="34" charset="0"/>
+              </a:rPr>
               <a:t>fluidPage</a:t>
             </a:r>
             <a:r>
-              <a:rPr lang="en-GB" dirty="0"/>
+              <a:rPr lang="en-GB" dirty="0">
+                <a:solidFill>
+                  <a:srgbClr val="333333"/>
+                </a:solidFill>
+                <a:latin typeface="Lato" panose="020F0502020204030204" pitchFamily="34" charset="0"/>
+              </a:rPr>
               <a:t> for example</a:t>
             </a:r>
-            <a:endParaRPr lang="en-US" dirty="0"/>
+            <a:endParaRPr lang="en-US" dirty="0">
+              <a:solidFill>
+                <a:srgbClr val="333333"/>
+              </a:solidFill>
+              <a:latin typeface="Lato" panose="020F0502020204030204" pitchFamily="34" charset="0"/>
+            </a:endParaRPr>
           </a:p>
         </p:txBody>
       </p:sp>
@@ -5789,7 +6192,7 @@
             <a:avLst/>
           </a:prstGeom>
           <a:solidFill>
-            <a:srgbClr val="FF7E79"/>
+            <a:srgbClr val="F5C5C4"/>
           </a:solidFill>
           <a:ln>
             <a:noFill/>
@@ -6107,7 +6510,7 @@
         </p:nvSpPr>
         <p:spPr>
           <a:xfrm>
-            <a:off x="6502400" y="1354088"/>
+            <a:off x="6489700" y="1228288"/>
             <a:ext cx="5219700" cy="5632311"/>
           </a:xfrm>
           <a:prstGeom prst="rect">
@@ -6121,16 +6524,6 @@
           </a:bodyPr>
           <a:lstStyle/>
           <a:p>
-            <a:r>
-              <a:rPr lang="en-GB" b="1" dirty="0">
-                <a:solidFill>
-                  <a:srgbClr val="2B2B2B"/>
-                </a:solidFill>
-              </a:rPr>
-              <a:t>Working together</a:t>
-            </a:r>
-          </a:p>
-          <a:p>
             <a:endParaRPr lang="en-GB" dirty="0">
               <a:solidFill>
                 <a:srgbClr val="2B2B2B"/>
@@ -6215,7 +6608,7 @@
           <a:p>
             <a:r>
               <a:rPr lang="en-US" dirty="0"/>
-              <a:t>Remember to source your module script!</a:t>
+              <a:t>Remember to source your module script (unless in the R folder)!</a:t>
             </a:r>
           </a:p>
           <a:p>
@@ -6267,7 +6660,7 @@
           <p:cNvPr id="4" name="TextBox 3">
             <a:extLst>
               <a:ext uri="{FF2B5EF4-FFF2-40B4-BE49-F238E27FC236}">
-                <a16:creationId xmlns:a16="http://schemas.microsoft.com/office/drawing/2014/main" id="{A93241D4-7963-235F-057F-6414464A6727}"/>
+                <a16:creationId xmlns:a16="http://schemas.microsoft.com/office/drawing/2014/main" id="{2BD53A6E-4389-E126-13E6-A0ADACEE40F4}"/>
               </a:ext>
             </a:extLst>
           </p:cNvPr>
@@ -6277,7 +6670,7 @@
         <p:spPr>
           <a:xfrm>
             <a:off x="381000" y="444500"/>
-            <a:ext cx="4889500" cy="369332"/>
+            <a:ext cx="6096000" cy="369332"/>
           </a:xfrm>
           <a:prstGeom prst="rect">
             <a:avLst/>
@@ -6296,372 +6689,26 @@
                   <a:srgbClr val="C00000"/>
                 </a:solidFill>
               </a:rPr>
-              <a:t>Naming Conventions</a:t>
-            </a:r>
-          </a:p>
-        </p:txBody>
-      </p:sp>
-      <p:sp>
-        <p:nvSpPr>
-          <p:cNvPr id="5" name="TextBox 4">
-            <a:extLst>
-              <a:ext uri="{FF2B5EF4-FFF2-40B4-BE49-F238E27FC236}">
-                <a16:creationId xmlns:a16="http://schemas.microsoft.com/office/drawing/2014/main" id="{EFA94A6A-DFAA-642B-5B41-F5D89C00EDF3}"/>
-              </a:ext>
-            </a:extLst>
-          </p:cNvPr>
-          <p:cNvSpPr txBox="1"/>
+              <a:t>Global Input – passing (external) input into your module</a:t>
+            </a:r>
+          </a:p>
+        </p:txBody>
+      </p:sp>
+      <p:sp>
+        <p:nvSpPr>
+          <p:cNvPr id="7" name="Rounded Rectangle 6">
+            <a:extLst>
+              <a:ext uri="{FF2B5EF4-FFF2-40B4-BE49-F238E27FC236}">
+                <a16:creationId xmlns:a16="http://schemas.microsoft.com/office/drawing/2014/main" id="{F47E7ED0-CC89-2A48-0769-A43A317A8E55}"/>
+              </a:ext>
+            </a:extLst>
+          </p:cNvPr>
+          <p:cNvSpPr/>
           <p:nvPr/>
         </p:nvSpPr>
         <p:spPr>
           <a:xfrm>
-            <a:off x="381000" y="1003300"/>
-            <a:ext cx="11290300" cy="5909310"/>
-          </a:xfrm>
-          <a:prstGeom prst="rect">
-            <a:avLst/>
-          </a:prstGeom>
-          <a:noFill/>
-        </p:spPr>
-        <p:txBody>
-          <a:bodyPr wrap="square" rtlCol="0">
-            <a:spAutoFit/>
-          </a:bodyPr>
-          <a:lstStyle/>
-          <a:p>
-            <a:r>
-              <a:rPr lang="en-US" b="1" dirty="0"/>
-              <a:t>Source</a:t>
-            </a:r>
-          </a:p>
-          <a:p>
-            <a:endParaRPr lang="en-US" b="1" dirty="0"/>
-          </a:p>
-          <a:p>
-            <a:r>
-              <a:rPr lang="en-US" dirty="0"/>
-              <a:t>Modules should be saved as independent R scripts and sourced in the main </a:t>
-            </a:r>
-            <a:r>
-              <a:rPr lang="en-US" dirty="0" err="1"/>
-              <a:t>app.R</a:t>
-            </a:r>
-            <a:r>
-              <a:rPr lang="en-US" dirty="0"/>
-              <a:t>. The naming convention for these module scripts should be </a:t>
-            </a:r>
-            <a:r>
-              <a:rPr lang="en-US" dirty="0" err="1"/>
-              <a:t>module_navbartab_section</a:t>
-            </a:r>
-            <a:r>
-              <a:rPr lang="en-US" dirty="0"/>
-              <a:t> e.g. for the module with reference to the Data Coverage section under the Summary tab, </a:t>
-            </a:r>
-            <a:r>
-              <a:rPr lang="en-US" dirty="0" err="1"/>
-              <a:t>module_summary_data_coverage</a:t>
-            </a:r>
-            <a:r>
-              <a:rPr lang="en-US" dirty="0"/>
-              <a:t>.</a:t>
-            </a:r>
-          </a:p>
-          <a:p>
-            <a:endParaRPr lang="en-US" dirty="0"/>
-          </a:p>
-          <a:p>
-            <a:r>
-              <a:rPr lang="en-US" b="1" dirty="0"/>
-              <a:t>Module Components</a:t>
-            </a:r>
-          </a:p>
-          <a:p>
-            <a:endParaRPr lang="en-US" dirty="0"/>
-          </a:p>
-          <a:p>
-            <a:r>
-              <a:rPr lang="en-US" dirty="0"/>
-              <a:t>Using the above example:</a:t>
-            </a:r>
-          </a:p>
-          <a:p>
-            <a:endParaRPr lang="en-US" dirty="0"/>
-          </a:p>
-          <a:p>
-            <a:pPr algn="l">
-              <a:buFont typeface="Arial" panose="020B0604020202020204" pitchFamily="34" charset="0"/>
-              <a:buChar char="•"/>
-            </a:pPr>
-            <a:r>
-              <a:rPr lang="en-GB" dirty="0">
-                <a:solidFill>
-                  <a:srgbClr val="212529"/>
-                </a:solidFill>
-              </a:rPr>
-              <a:t> If the module UI contains input and output: name the module UI such as </a:t>
-            </a:r>
-            <a:r>
-              <a:rPr lang="en-GB" b="0" i="0" u="none" strike="noStrike" dirty="0" err="1">
-                <a:solidFill>
-                  <a:srgbClr val="212529"/>
-                </a:solidFill>
-                <a:effectLst/>
-              </a:rPr>
-              <a:t>dataCoverageUI</a:t>
-            </a:r>
-            <a:r>
-              <a:rPr lang="en-GB" b="0" i="0" u="none" strike="noStrike" dirty="0">
-                <a:solidFill>
-                  <a:srgbClr val="212529"/>
-                </a:solidFill>
-                <a:effectLst/>
-              </a:rPr>
-              <a:t>() </a:t>
-            </a:r>
-          </a:p>
-          <a:p>
-            <a:pPr algn="l">
-              <a:buFont typeface="Arial" panose="020B0604020202020204" pitchFamily="34" charset="0"/>
-              <a:buChar char="•"/>
-            </a:pPr>
-            <a:r>
-              <a:rPr lang="en-GB" dirty="0">
-                <a:solidFill>
-                  <a:srgbClr val="212529"/>
-                </a:solidFill>
-              </a:rPr>
-              <a:t> </a:t>
-            </a:r>
-            <a:r>
-              <a:rPr lang="en-GB" b="0" i="0" u="none" strike="noStrike" dirty="0">
-                <a:solidFill>
-                  <a:srgbClr val="212529"/>
-                </a:solidFill>
-                <a:effectLst/>
-              </a:rPr>
-              <a:t>If the module is primarily for input or output then use </a:t>
-            </a:r>
-            <a:r>
-              <a:rPr lang="en-GB" b="0" i="0" u="none" strike="noStrike" dirty="0" err="1">
-                <a:solidFill>
-                  <a:srgbClr val="212529"/>
-                </a:solidFill>
-                <a:effectLst/>
-              </a:rPr>
-              <a:t>dataCoverageInput</a:t>
-            </a:r>
-            <a:r>
-              <a:rPr lang="en-GB" b="0" i="0" u="none" strike="noStrike" dirty="0">
-                <a:solidFill>
-                  <a:srgbClr val="212529"/>
-                </a:solidFill>
-                <a:effectLst/>
-              </a:rPr>
-              <a:t>() or </a:t>
-            </a:r>
-            <a:r>
-              <a:rPr lang="en-GB" b="0" i="0" u="none" strike="noStrike" dirty="0" err="1">
-                <a:solidFill>
-                  <a:srgbClr val="212529"/>
-                </a:solidFill>
-                <a:effectLst/>
-              </a:rPr>
-              <a:t>dataCoverageOuput</a:t>
-            </a:r>
-            <a:r>
-              <a:rPr lang="en-GB" b="0" i="0" u="none" strike="noStrike" dirty="0">
-                <a:solidFill>
-                  <a:srgbClr val="212529"/>
-                </a:solidFill>
-                <a:effectLst/>
-              </a:rPr>
-              <a:t>() instead</a:t>
-            </a:r>
-          </a:p>
-          <a:p>
-            <a:pPr algn="l">
-              <a:buFont typeface="Arial" panose="020B0604020202020204" pitchFamily="34" charset="0"/>
-              <a:buChar char="•"/>
-            </a:pPr>
-            <a:r>
-              <a:rPr lang="en-GB" b="0" i="0" u="none" strike="noStrike" dirty="0">
-                <a:solidFill>
-                  <a:srgbClr val="212529"/>
-                </a:solidFill>
-                <a:effectLst/>
-              </a:rPr>
-              <a:t> </a:t>
-            </a:r>
-            <a:r>
-              <a:rPr lang="en-GB" b="0" i="0" u="none" strike="noStrike" dirty="0" err="1">
-                <a:solidFill>
-                  <a:srgbClr val="212529"/>
-                </a:solidFill>
-                <a:effectLst/>
-              </a:rPr>
-              <a:t>dataCoverageServer</a:t>
-            </a:r>
-            <a:r>
-              <a:rPr lang="en-GB" b="0" i="0" u="none" strike="noStrike" dirty="0">
-                <a:solidFill>
-                  <a:srgbClr val="212529"/>
-                </a:solidFill>
-                <a:effectLst/>
-              </a:rPr>
-              <a:t>() is the module server</a:t>
-            </a:r>
-          </a:p>
-          <a:p>
-            <a:pPr algn="l">
-              <a:buFont typeface="Arial" panose="020B0604020202020204" pitchFamily="34" charset="0"/>
-              <a:buChar char="•"/>
-            </a:pPr>
-            <a:endParaRPr lang="en-GB" dirty="0">
-              <a:solidFill>
-                <a:srgbClr val="212529"/>
-              </a:solidFill>
-            </a:endParaRPr>
-          </a:p>
-          <a:p>
-            <a:pPr algn="l"/>
-            <a:r>
-              <a:rPr lang="en-GB" b="1" dirty="0">
-                <a:solidFill>
-                  <a:srgbClr val="212529"/>
-                </a:solidFill>
-              </a:rPr>
-              <a:t>Module IDs</a:t>
-            </a:r>
-          </a:p>
-          <a:p>
-            <a:pPr algn="l"/>
-            <a:endParaRPr lang="en-GB" b="1" dirty="0">
-              <a:solidFill>
-                <a:srgbClr val="212529"/>
-              </a:solidFill>
-            </a:endParaRPr>
-          </a:p>
-          <a:p>
-            <a:pPr algn="l"/>
-            <a:r>
-              <a:rPr lang="en-GB" dirty="0">
-                <a:solidFill>
-                  <a:srgbClr val="212529"/>
-                </a:solidFill>
-              </a:rPr>
-              <a:t>No need for a naming convention to be established for IDs to date. If reusing a module then try to keep the IDs between each instance similar.</a:t>
-            </a:r>
-          </a:p>
-          <a:p>
-            <a:pPr algn="l"/>
-            <a:endParaRPr lang="en-GB" b="0" i="0" u="none" strike="noStrike" dirty="0">
-              <a:solidFill>
-                <a:srgbClr val="212529"/>
-              </a:solidFill>
-              <a:effectLst/>
-              <a:latin typeface="-apple-system"/>
-            </a:endParaRPr>
-          </a:p>
-          <a:p>
-            <a:pPr algn="l"/>
-            <a:endParaRPr lang="en-GB" b="0" i="0" u="none" strike="noStrike" dirty="0">
-              <a:solidFill>
-                <a:srgbClr val="212529"/>
-              </a:solidFill>
-              <a:effectLst/>
-              <a:latin typeface="-apple-system"/>
-            </a:endParaRPr>
-          </a:p>
-          <a:p>
-            <a:endParaRPr lang="en-US" dirty="0"/>
-          </a:p>
-        </p:txBody>
-      </p:sp>
-    </p:spTree>
-    <p:extLst>
-      <p:ext uri="{BB962C8B-B14F-4D97-AF65-F5344CB8AC3E}">
-        <p14:creationId xmlns:p14="http://schemas.microsoft.com/office/powerpoint/2010/main" val="373535562"/>
-      </p:ext>
-    </p:extLst>
-  </p:cSld>
-  <p:clrMapOvr>
-    <a:masterClrMapping/>
-  </p:clrMapOvr>
-</p:sld>
-</file>
-
-<file path=ppt/slides/slide5.xml><?xml version="1.0" encoding="utf-8"?>
-<p:sld xmlns:a="http://schemas.openxmlformats.org/drawingml/2006/main" xmlns:r="http://schemas.openxmlformats.org/officeDocument/2006/relationships" xmlns:p="http://schemas.openxmlformats.org/presentationml/2006/main">
-  <p:cSld>
-    <p:spTree>
-      <p:nvGrpSpPr>
-        <p:cNvPr id="1" name=""/>
-        <p:cNvGrpSpPr/>
-        <p:nvPr/>
-      </p:nvGrpSpPr>
-      <p:grpSpPr>
-        <a:xfrm>
-          <a:off x="0" y="0"/>
-          <a:ext cx="0" cy="0"/>
-          <a:chOff x="0" y="0"/>
-          <a:chExt cx="0" cy="0"/>
-        </a:xfrm>
-      </p:grpSpPr>
-      <p:sp>
-        <p:nvSpPr>
-          <p:cNvPr id="4" name="TextBox 3">
-            <a:extLst>
-              <a:ext uri="{FF2B5EF4-FFF2-40B4-BE49-F238E27FC236}">
-                <a16:creationId xmlns:a16="http://schemas.microsoft.com/office/drawing/2014/main" id="{2BD53A6E-4389-E126-13E6-A0ADACEE40F4}"/>
-              </a:ext>
-            </a:extLst>
-          </p:cNvPr>
-          <p:cNvSpPr txBox="1"/>
-          <p:nvPr/>
-        </p:nvSpPr>
-        <p:spPr>
-          <a:xfrm>
-            <a:off x="381000" y="444500"/>
-            <a:ext cx="4889500" cy="369332"/>
-          </a:xfrm>
-          <a:prstGeom prst="rect">
-            <a:avLst/>
-          </a:prstGeom>
-          <a:noFill/>
-        </p:spPr>
-        <p:txBody>
-          <a:bodyPr wrap="square" rtlCol="0">
-            <a:spAutoFit/>
-          </a:bodyPr>
-          <a:lstStyle/>
-          <a:p>
-            <a:r>
-              <a:rPr lang="en-US" b="1" dirty="0">
-                <a:solidFill>
-                  <a:srgbClr val="C00000"/>
-                </a:solidFill>
-              </a:rPr>
-              <a:t>Using External input in Modules – Global Input</a:t>
-            </a:r>
-          </a:p>
-        </p:txBody>
-      </p:sp>
-      <p:sp>
-        <p:nvSpPr>
-          <p:cNvPr id="7" name="Rounded Rectangle 6">
-            <a:extLst>
-              <a:ext uri="{FF2B5EF4-FFF2-40B4-BE49-F238E27FC236}">
-                <a16:creationId xmlns:a16="http://schemas.microsoft.com/office/drawing/2014/main" id="{F47E7ED0-CC89-2A48-0769-A43A317A8E55}"/>
-              </a:ext>
-            </a:extLst>
-          </p:cNvPr>
-          <p:cNvSpPr/>
-          <p:nvPr/>
-        </p:nvSpPr>
-        <p:spPr>
-          <a:xfrm>
-            <a:off x="381000" y="1041400"/>
+            <a:off x="381000" y="1241258"/>
             <a:ext cx="5626100" cy="1447800"/>
           </a:xfrm>
           <a:prstGeom prst="roundRect">
@@ -6717,8 +6764,8 @@
         </p:nvSpPr>
         <p:spPr>
           <a:xfrm>
-            <a:off x="6134100" y="1070054"/>
-            <a:ext cx="5219700" cy="1754326"/>
+            <a:off x="6238875" y="469306"/>
+            <a:ext cx="5219700" cy="2862322"/>
           </a:xfrm>
           <a:prstGeom prst="rect">
             <a:avLst/>
@@ -6732,12 +6779,29 @@
           <a:lstStyle/>
           <a:p>
             <a:r>
+              <a:rPr lang="en-GB" b="1" dirty="0">
+                <a:solidFill>
+                  <a:srgbClr val="C00000"/>
+                </a:solidFill>
+              </a:rPr>
+              <a:t>Example: you have a module that exists in your main app and wish to use an input that is defined in the main app (referred to as a global variable)</a:t>
+            </a:r>
+          </a:p>
+          <a:p>
+            <a:endParaRPr lang="en-GB" dirty="0">
+              <a:solidFill>
+                <a:srgbClr val="2B2B2B"/>
+              </a:solidFill>
+            </a:endParaRPr>
+          </a:p>
+          <a:p>
+            <a:r>
               <a:rPr lang="en-GB" dirty="0">
                 <a:solidFill>
                   <a:srgbClr val="2B2B2B"/>
                 </a:solidFill>
               </a:rPr>
-              <a:t>The global input has been passed (as a reactive) to the server in the main app.</a:t>
+              <a:t>The global input should be passed (as a reactive) to the server in the main app.</a:t>
             </a:r>
           </a:p>
           <a:p>
@@ -6768,7 +6832,7 @@
         </p:nvSpPr>
         <p:spPr>
           <a:xfrm>
-            <a:off x="6223000" y="2331470"/>
+            <a:off x="6238875" y="2495104"/>
             <a:ext cx="4965700" cy="2585323"/>
           </a:xfrm>
           <a:prstGeom prst="rect">
@@ -6807,7 +6871,7 @@
           </a:p>
           <a:p>
             <a:r>
-              <a:rPr lang="en-GB" dirty="0">
+              <a:rPr lang="en-GB" b="1" dirty="0">
                 <a:solidFill>
                   <a:srgbClr val="2B2B2B"/>
                 </a:solidFill>
@@ -6815,7 +6879,7 @@
               <a:t>To use this global input in your logic section call </a:t>
             </a:r>
             <a:r>
-              <a:rPr lang="en-GB" dirty="0" err="1">
+              <a:rPr lang="en-GB" b="1" dirty="0" err="1">
                 <a:solidFill>
                   <a:srgbClr val="2B2B2B"/>
                 </a:solidFill>
@@ -6823,7 +6887,7 @@
               <a:t>dataset_summary</a:t>
             </a:r>
             <a:r>
-              <a:rPr lang="en-GB" dirty="0">
+              <a:rPr lang="en-GB" b="1" dirty="0">
                 <a:solidFill>
                   <a:srgbClr val="2B2B2B"/>
                 </a:solidFill>
@@ -6831,14 +6895,14 @@
               <a:t>() – noting that you are calling a reactive and not calling the input in the usual way e.g. </a:t>
             </a:r>
             <a:r>
-              <a:rPr lang="en-GB" dirty="0" err="1">
+              <a:rPr lang="en-GB" b="1" dirty="0" err="1">
                 <a:solidFill>
                   <a:srgbClr val="2B2B2B"/>
                 </a:solidFill>
               </a:rPr>
               <a:t>input$global_summary</a:t>
             </a:r>
-            <a:endParaRPr lang="en-US" dirty="0"/>
+            <a:endParaRPr lang="en-US" b="1" dirty="0"/>
           </a:p>
           <a:p>
             <a:endParaRPr lang="en-US" dirty="0"/>
@@ -6859,7 +6923,7 @@
         </p:nvSpPr>
         <p:spPr>
           <a:xfrm>
-            <a:off x="933450" y="1610320"/>
+            <a:off x="838200" y="1707883"/>
             <a:ext cx="3784600" cy="646331"/>
           </a:xfrm>
           <a:prstGeom prst="rect">
@@ -6923,7 +6987,7 @@
         </p:nvSpPr>
         <p:spPr>
           <a:xfrm>
-            <a:off x="546100" y="1141194"/>
+            <a:off x="596900" y="1250636"/>
             <a:ext cx="4635500" cy="369332"/>
           </a:xfrm>
           <a:prstGeom prst="rect">
@@ -6943,7 +7007,7 @@
                   <a:schemeClr val="bg1"/>
                 </a:solidFill>
               </a:rPr>
-              <a:t>(</a:t>
+              <a:t>(Global Input that exists in </a:t>
             </a:r>
             <a:r>
               <a:rPr lang="en-US" dirty="0" err="1">
@@ -6959,7 +7023,7 @@
                   <a:schemeClr val="bg1"/>
                 </a:solidFill>
               </a:rPr>
-              <a:t> Server)</a:t>
+              <a:t> server)</a:t>
             </a:r>
           </a:p>
         </p:txBody>
@@ -6978,8 +7042,8 @@
         </p:nvSpPr>
         <p:spPr>
           <a:xfrm>
-            <a:off x="381000" y="2501900"/>
-            <a:ext cx="5626100" cy="2745780"/>
+            <a:off x="381000" y="2824380"/>
+            <a:ext cx="5626100" cy="2423300"/>
           </a:xfrm>
           <a:prstGeom prst="roundRect">
             <a:avLst/>
@@ -7030,7 +7094,7 @@
         </p:nvSpPr>
         <p:spPr>
           <a:xfrm>
-            <a:off x="469900" y="2678192"/>
+            <a:off x="596900" y="2908549"/>
             <a:ext cx="5626100" cy="2308324"/>
           </a:xfrm>
           <a:prstGeom prst="rect">
@@ -7176,8 +7240,313 @@
         </p:nvSpPr>
         <p:spPr>
           <a:xfrm>
-            <a:off x="381000" y="5270500"/>
-            <a:ext cx="5626100" cy="1397000"/>
+            <a:off x="381000" y="5436364"/>
+            <a:ext cx="5626100" cy="1231136"/>
+          </a:xfrm>
+          <a:prstGeom prst="roundRect">
+            <a:avLst/>
+          </a:prstGeom>
+          <a:solidFill>
+            <a:srgbClr val="F5C5C4"/>
+          </a:solidFill>
+          <a:ln>
+            <a:noFill/>
+          </a:ln>
+        </p:spPr>
+        <p:style>
+          <a:lnRef idx="2">
+            <a:schemeClr val="accent1">
+              <a:shade val="50000"/>
+            </a:schemeClr>
+          </a:lnRef>
+          <a:fillRef idx="1">
+            <a:schemeClr val="accent1"/>
+          </a:fillRef>
+          <a:effectRef idx="0">
+            <a:schemeClr val="accent1"/>
+          </a:effectRef>
+          <a:fontRef idx="minor">
+            <a:schemeClr val="lt1"/>
+          </a:fontRef>
+        </p:style>
+        <p:txBody>
+          <a:bodyPr rtlCol="0" anchor="ctr"/>
+          <a:lstStyle/>
+          <a:p>
+            <a:pPr algn="ctr"/>
+            <a:endParaRPr lang="en-US">
+              <a:solidFill>
+                <a:srgbClr val="FF7E79"/>
+              </a:solidFill>
+            </a:endParaRPr>
+          </a:p>
+        </p:txBody>
+      </p:sp>
+      <p:sp>
+        <p:nvSpPr>
+          <p:cNvPr id="13" name="TextBox 12">
+            <a:extLst>
+              <a:ext uri="{FF2B5EF4-FFF2-40B4-BE49-F238E27FC236}">
+                <a16:creationId xmlns:a16="http://schemas.microsoft.com/office/drawing/2014/main" id="{CB7B6733-4DEE-6918-217C-A09AC4339578}"/>
+              </a:ext>
+            </a:extLst>
+          </p:cNvPr>
+          <p:cNvSpPr txBox="1"/>
+          <p:nvPr/>
+        </p:nvSpPr>
+        <p:spPr>
+          <a:xfrm>
+            <a:off x="546100" y="5467171"/>
+            <a:ext cx="6096000" cy="1200329"/>
+          </a:xfrm>
+          <a:prstGeom prst="rect">
+            <a:avLst/>
+          </a:prstGeom>
+          <a:noFill/>
+        </p:spPr>
+        <p:txBody>
+          <a:bodyPr wrap="square">
+            <a:spAutoFit/>
+          </a:bodyPr>
+          <a:lstStyle/>
+          <a:p>
+            <a:r>
+              <a:rPr lang="en-US" dirty="0">
+                <a:solidFill>
+                  <a:schemeClr val="bg1"/>
+                </a:solidFill>
+              </a:rPr>
+              <a:t>(</a:t>
+            </a:r>
+            <a:r>
+              <a:rPr lang="en-US" dirty="0" err="1">
+                <a:solidFill>
+                  <a:schemeClr val="bg1"/>
+                </a:solidFill>
+              </a:rPr>
+              <a:t>app.R</a:t>
+            </a:r>
+            <a:r>
+              <a:rPr lang="en-US" dirty="0">
+                <a:solidFill>
+                  <a:schemeClr val="bg1"/>
+                </a:solidFill>
+              </a:rPr>
+              <a:t> Server)</a:t>
+            </a:r>
+          </a:p>
+          <a:p>
+            <a:endParaRPr lang="en-US" dirty="0">
+              <a:solidFill>
+                <a:schemeClr val="bg1"/>
+              </a:solidFill>
+            </a:endParaRPr>
+          </a:p>
+          <a:p>
+            <a:r>
+              <a:rPr lang="en-US" dirty="0" err="1">
+                <a:solidFill>
+                  <a:schemeClr val="bg1"/>
+                </a:solidFill>
+              </a:rPr>
+              <a:t>moduleDemoServer</a:t>
+            </a:r>
+            <a:r>
+              <a:rPr lang="en-US" dirty="0">
+                <a:solidFill>
+                  <a:schemeClr val="bg1"/>
+                </a:solidFill>
+              </a:rPr>
+              <a:t>(id = "</a:t>
+            </a:r>
+            <a:r>
+              <a:rPr lang="en-US" dirty="0" err="1">
+                <a:solidFill>
+                  <a:schemeClr val="bg1"/>
+                </a:solidFill>
+              </a:rPr>
+              <a:t>data_coverage_module</a:t>
+            </a:r>
+            <a:r>
+              <a:rPr lang="en-US" dirty="0">
+                <a:solidFill>
+                  <a:schemeClr val="bg1"/>
+                </a:solidFill>
+              </a:rPr>
+              <a:t>”,</a:t>
+            </a:r>
+          </a:p>
+          <a:p>
+            <a:r>
+              <a:rPr lang="en-US" dirty="0" err="1">
+                <a:solidFill>
+                  <a:schemeClr val="bg1"/>
+                </a:solidFill>
+              </a:rPr>
+              <a:t>dataset_summary</a:t>
+            </a:r>
+            <a:r>
+              <a:rPr lang="en-US" dirty="0">
+                <a:solidFill>
+                  <a:schemeClr val="bg1"/>
+                </a:solidFill>
+              </a:rPr>
+              <a:t>=</a:t>
+            </a:r>
+            <a:r>
+              <a:rPr lang="en-US" dirty="0" err="1">
+                <a:solidFill>
+                  <a:schemeClr val="bg1"/>
+                </a:solidFill>
+              </a:rPr>
+              <a:t>global_dataset_summary</a:t>
+            </a:r>
+            <a:r>
+              <a:rPr lang="en-US" dirty="0">
+                <a:solidFill>
+                  <a:schemeClr val="bg1"/>
+                </a:solidFill>
+              </a:rPr>
+              <a:t>)</a:t>
+            </a:r>
+          </a:p>
+        </p:txBody>
+      </p:sp>
+      <p:sp>
+        <p:nvSpPr>
+          <p:cNvPr id="14" name="TextBox 13">
+            <a:extLst>
+              <a:ext uri="{FF2B5EF4-FFF2-40B4-BE49-F238E27FC236}">
+                <a16:creationId xmlns:a16="http://schemas.microsoft.com/office/drawing/2014/main" id="{C3504550-54D5-9AC8-BB68-244AB7ECAD96}"/>
+              </a:ext>
+            </a:extLst>
+          </p:cNvPr>
+          <p:cNvSpPr txBox="1"/>
+          <p:nvPr/>
+        </p:nvSpPr>
+        <p:spPr>
+          <a:xfrm>
+            <a:off x="6223000" y="5411883"/>
+            <a:ext cx="4965700" cy="1477328"/>
+          </a:xfrm>
+          <a:prstGeom prst="rect">
+            <a:avLst/>
+          </a:prstGeom>
+          <a:noFill/>
+        </p:spPr>
+        <p:txBody>
+          <a:bodyPr wrap="square" rtlCol="0">
+            <a:spAutoFit/>
+          </a:bodyPr>
+          <a:lstStyle/>
+          <a:p>
+            <a:endParaRPr lang="en-GB" dirty="0">
+              <a:solidFill>
+                <a:srgbClr val="2B2B2B"/>
+              </a:solidFill>
+            </a:endParaRPr>
+          </a:p>
+          <a:p>
+            <a:r>
+              <a:rPr lang="en-GB" dirty="0">
+                <a:solidFill>
+                  <a:srgbClr val="2B2B2B"/>
+                </a:solidFill>
+              </a:rPr>
+              <a:t>For you to use these global variables you need to pass these as arguments into your module server in the main app.</a:t>
+            </a:r>
+            <a:endParaRPr lang="en-US" dirty="0"/>
+          </a:p>
+          <a:p>
+            <a:endParaRPr lang="en-US" dirty="0"/>
+          </a:p>
+        </p:txBody>
+      </p:sp>
+    </p:spTree>
+    <p:extLst>
+      <p:ext uri="{BB962C8B-B14F-4D97-AF65-F5344CB8AC3E}">
+        <p14:creationId xmlns:p14="http://schemas.microsoft.com/office/powerpoint/2010/main" val="1027512068"/>
+      </p:ext>
+    </p:extLst>
+  </p:cSld>
+  <p:clrMapOvr>
+    <a:masterClrMapping/>
+  </p:clrMapOvr>
+</p:sld>
+</file>
+
+<file path=ppt/slides/slide5.xml><?xml version="1.0" encoding="utf-8"?>
+<p:sld xmlns:a="http://schemas.openxmlformats.org/drawingml/2006/main" xmlns:r="http://schemas.openxmlformats.org/officeDocument/2006/relationships" xmlns:p="http://schemas.openxmlformats.org/presentationml/2006/main">
+  <p:cSld>
+    <p:spTree>
+      <p:nvGrpSpPr>
+        <p:cNvPr id="1" name=""/>
+        <p:cNvGrpSpPr/>
+        <p:nvPr/>
+      </p:nvGrpSpPr>
+      <p:grpSpPr>
+        <a:xfrm>
+          <a:off x="0" y="0"/>
+          <a:ext cx="0" cy="0"/>
+          <a:chOff x="0" y="0"/>
+          <a:chExt cx="0" cy="0"/>
+        </a:xfrm>
+      </p:grpSpPr>
+      <p:sp>
+        <p:nvSpPr>
+          <p:cNvPr id="4" name="TextBox 3">
+            <a:extLst>
+              <a:ext uri="{FF2B5EF4-FFF2-40B4-BE49-F238E27FC236}">
+                <a16:creationId xmlns:a16="http://schemas.microsoft.com/office/drawing/2014/main" id="{2BD53A6E-4389-E126-13E6-A0ADACEE40F4}"/>
+              </a:ext>
+            </a:extLst>
+          </p:cNvPr>
+          <p:cNvSpPr txBox="1"/>
+          <p:nvPr/>
+        </p:nvSpPr>
+        <p:spPr>
+          <a:xfrm>
+            <a:off x="381000" y="444500"/>
+            <a:ext cx="4889500" cy="369332"/>
+          </a:xfrm>
+          <a:prstGeom prst="rect">
+            <a:avLst/>
+          </a:prstGeom>
+          <a:noFill/>
+        </p:spPr>
+        <p:txBody>
+          <a:bodyPr wrap="square" rtlCol="0">
+            <a:spAutoFit/>
+          </a:bodyPr>
+          <a:lstStyle/>
+          <a:p>
+            <a:r>
+              <a:rPr lang="en-US" b="1" dirty="0">
+                <a:solidFill>
+                  <a:srgbClr val="C00000"/>
+                </a:solidFill>
+              </a:rPr>
+              <a:t>Nesting Modules</a:t>
+            </a:r>
+          </a:p>
+        </p:txBody>
+      </p:sp>
+      <p:sp>
+        <p:nvSpPr>
+          <p:cNvPr id="7" name="Rounded Rectangle 6">
+            <a:extLst>
+              <a:ext uri="{FF2B5EF4-FFF2-40B4-BE49-F238E27FC236}">
+                <a16:creationId xmlns:a16="http://schemas.microsoft.com/office/drawing/2014/main" id="{F47E7ED0-CC89-2A48-0769-A43A317A8E55}"/>
+              </a:ext>
+            </a:extLst>
+          </p:cNvPr>
+          <p:cNvSpPr/>
+          <p:nvPr/>
+        </p:nvSpPr>
+        <p:spPr>
+          <a:xfrm>
+            <a:off x="381000" y="965200"/>
+            <a:ext cx="6921500" cy="5544721"/>
           </a:xfrm>
           <a:prstGeom prst="roundRect">
             <a:avLst/>
@@ -7209,21 +7578,386 @@
           <a:bodyPr rtlCol="0" anchor="ctr"/>
           <a:lstStyle/>
           <a:p>
-            <a:pPr algn="ctr"/>
-            <a:endParaRPr lang="en-US">
+            <a:r>
+              <a:rPr lang="en-US" dirty="0" err="1">
+                <a:solidFill>
+                  <a:schemeClr val="bg1"/>
+                </a:solidFill>
+              </a:rPr>
+              <a:t>outerModuleUI</a:t>
+            </a:r>
+            <a:r>
+              <a:rPr lang="en-US" dirty="0">
+                <a:solidFill>
+                  <a:schemeClr val="bg1"/>
+                </a:solidFill>
+              </a:rPr>
+              <a:t> &lt;- function(id){</a:t>
+            </a:r>
+          </a:p>
+          <a:p>
+            <a:r>
+              <a:rPr lang="en-US" dirty="0">
+                <a:solidFill>
+                  <a:schemeClr val="bg1"/>
+                </a:solidFill>
+              </a:rPr>
+              <a:t>  ns &lt;- NS(id)</a:t>
+            </a:r>
+          </a:p>
+          <a:p>
+            <a:r>
+              <a:rPr lang="en-US" dirty="0">
+                <a:solidFill>
+                  <a:schemeClr val="bg1"/>
+                </a:solidFill>
+              </a:rPr>
+              <a:t>  </a:t>
+            </a:r>
+            <a:r>
+              <a:rPr lang="en-US" dirty="0" err="1">
+                <a:solidFill>
+                  <a:schemeClr val="bg1"/>
+                </a:solidFill>
+              </a:rPr>
+              <a:t>tagList</a:t>
+            </a:r>
+            <a:r>
+              <a:rPr lang="en-US" dirty="0">
+                <a:solidFill>
+                  <a:schemeClr val="bg1"/>
+                </a:solidFill>
+              </a:rPr>
+              <a:t>(</a:t>
+            </a:r>
+          </a:p>
+          <a:p>
+            <a:r>
+              <a:rPr lang="en-US" dirty="0">
+                <a:solidFill>
+                  <a:schemeClr val="bg1"/>
+                </a:solidFill>
+              </a:rPr>
+              <a:t>               </a:t>
+            </a:r>
+            <a:r>
+              <a:rPr lang="en-US" dirty="0" err="1">
+                <a:solidFill>
+                  <a:schemeClr val="bg1"/>
+                </a:solidFill>
+              </a:rPr>
+              <a:t>selectInput</a:t>
+            </a:r>
+            <a:r>
+              <a:rPr lang="en-US" dirty="0">
+                <a:solidFill>
+                  <a:schemeClr val="bg1"/>
+                </a:solidFill>
+              </a:rPr>
+              <a:t>(</a:t>
+            </a:r>
+            <a:r>
+              <a:rPr lang="en-US" dirty="0" err="1">
+                <a:solidFill>
+                  <a:schemeClr val="bg1"/>
+                </a:solidFill>
+              </a:rPr>
+              <a:t>inputId</a:t>
+            </a:r>
+            <a:r>
+              <a:rPr lang="en-US" dirty="0">
+                <a:solidFill>
+                  <a:schemeClr val="bg1"/>
+                </a:solidFill>
+              </a:rPr>
+              <a:t> = ns("</a:t>
+            </a:r>
+            <a:r>
+              <a:rPr lang="en-US" dirty="0" err="1">
+                <a:solidFill>
+                  <a:schemeClr val="bg1"/>
+                </a:solidFill>
+              </a:rPr>
+              <a:t>example_input_a</a:t>
+            </a:r>
+            <a:r>
+              <a:rPr lang="en-US" dirty="0">
+                <a:solidFill>
+                  <a:schemeClr val="bg1"/>
+                </a:solidFill>
+              </a:rPr>
+              <a:t>"))</a:t>
+            </a:r>
+          </a:p>
+          <a:p>
+            <a:r>
+              <a:rPr lang="en-US" dirty="0">
+                <a:solidFill>
+                  <a:schemeClr val="bg1"/>
+                </a:solidFill>
+              </a:rPr>
+              <a:t>               </a:t>
+            </a:r>
+            <a:r>
+              <a:rPr lang="en-US" dirty="0" err="1">
+                <a:solidFill>
+                  <a:schemeClr val="bg1"/>
+                </a:solidFill>
+              </a:rPr>
+              <a:t>innerModuleUI</a:t>
+            </a:r>
+            <a:r>
+              <a:rPr lang="en-US" dirty="0">
+                <a:solidFill>
+                  <a:schemeClr val="bg1"/>
+                </a:solidFill>
+              </a:rPr>
+              <a:t>(id = ns("example") ))</a:t>
+            </a:r>
+          </a:p>
+          <a:p>
+            <a:r>
+              <a:rPr lang="en-US" dirty="0">
+                <a:solidFill>
+                  <a:schemeClr val="bg1"/>
+                </a:solidFill>
+              </a:rPr>
+              <a:t>}</a:t>
+            </a:r>
+          </a:p>
+          <a:p>
+            <a:endParaRPr lang="en-US" dirty="0">
               <a:solidFill>
-                <a:srgbClr val="FF7E79"/>
+                <a:schemeClr val="bg1"/>
               </a:solidFill>
             </a:endParaRPr>
           </a:p>
-        </p:txBody>
-      </p:sp>
-      <p:sp>
-        <p:nvSpPr>
-          <p:cNvPr id="13" name="TextBox 12">
-            <a:extLst>
-              <a:ext uri="{FF2B5EF4-FFF2-40B4-BE49-F238E27FC236}">
-                <a16:creationId xmlns:a16="http://schemas.microsoft.com/office/drawing/2014/main" id="{CB7B6733-4DEE-6918-217C-A09AC4339578}"/>
+          <a:p>
+            <a:endParaRPr lang="en-US" dirty="0">
+              <a:solidFill>
+                <a:schemeClr val="bg1"/>
+              </a:solidFill>
+            </a:endParaRPr>
+          </a:p>
+          <a:p>
+            <a:r>
+              <a:rPr lang="en-US" dirty="0" err="1">
+                <a:solidFill>
+                  <a:schemeClr val="bg1"/>
+                </a:solidFill>
+              </a:rPr>
+              <a:t>outerModuleServer</a:t>
+            </a:r>
+            <a:r>
+              <a:rPr lang="en-US" dirty="0">
+                <a:solidFill>
+                  <a:schemeClr val="bg1"/>
+                </a:solidFill>
+              </a:rPr>
+              <a:t>&lt;- function(id){</a:t>
+            </a:r>
+          </a:p>
+          <a:p>
+            <a:r>
+              <a:rPr lang="en-US" dirty="0">
+                <a:solidFill>
+                  <a:schemeClr val="bg1"/>
+                </a:solidFill>
+              </a:rPr>
+              <a:t>  </a:t>
+            </a:r>
+            <a:r>
+              <a:rPr lang="en-US" dirty="0" err="1">
+                <a:solidFill>
+                  <a:schemeClr val="bg1"/>
+                </a:solidFill>
+              </a:rPr>
+              <a:t>moduleServer</a:t>
+            </a:r>
+            <a:r>
+              <a:rPr lang="en-US" dirty="0">
+                <a:solidFill>
+                  <a:schemeClr val="bg1"/>
+                </a:solidFill>
+              </a:rPr>
+              <a:t>(</a:t>
+            </a:r>
+          </a:p>
+          <a:p>
+            <a:r>
+              <a:rPr lang="en-US" dirty="0">
+                <a:solidFill>
+                  <a:schemeClr val="bg1"/>
+                </a:solidFill>
+              </a:rPr>
+              <a:t>    id,</a:t>
+            </a:r>
+          </a:p>
+          <a:p>
+            <a:r>
+              <a:rPr lang="en-US" dirty="0">
+                <a:solidFill>
+                  <a:schemeClr val="bg1"/>
+                </a:solidFill>
+              </a:rPr>
+              <a:t>    function(input, output, session){</a:t>
+            </a:r>
+          </a:p>
+          <a:p>
+            <a:r>
+              <a:rPr lang="en-US" dirty="0">
+                <a:solidFill>
+                  <a:schemeClr val="bg1"/>
+                </a:solidFill>
+              </a:rPr>
+              <a:t>                   </a:t>
+            </a:r>
+            <a:r>
+              <a:rPr lang="en-US" dirty="0" err="1">
+                <a:solidFill>
+                  <a:schemeClr val="bg1"/>
+                </a:solidFill>
+              </a:rPr>
+              <a:t>global_outer_input</a:t>
+            </a:r>
+            <a:r>
+              <a:rPr lang="en-US" dirty="0">
+                <a:solidFill>
+                  <a:schemeClr val="bg1"/>
+                </a:solidFill>
+              </a:rPr>
+              <a:t> &lt;- reactive(</a:t>
+            </a:r>
+            <a:r>
+              <a:rPr lang="en-US" dirty="0" err="1">
+                <a:solidFill>
+                  <a:schemeClr val="bg1"/>
+                </a:solidFill>
+              </a:rPr>
+              <a:t>input$example_input_a</a:t>
+            </a:r>
+            <a:r>
+              <a:rPr lang="en-US" dirty="0">
+                <a:solidFill>
+                  <a:schemeClr val="bg1"/>
+                </a:solidFill>
+              </a:rPr>
+              <a:t>)</a:t>
+            </a:r>
+          </a:p>
+          <a:p>
+            <a:endParaRPr lang="en-US" dirty="0">
+              <a:solidFill>
+                <a:schemeClr val="bg1"/>
+              </a:solidFill>
+            </a:endParaRPr>
+          </a:p>
+          <a:p>
+            <a:r>
+              <a:rPr lang="en-US" dirty="0">
+                <a:solidFill>
+                  <a:schemeClr val="bg1"/>
+                </a:solidFill>
+              </a:rPr>
+              <a:t>                   </a:t>
+            </a:r>
+            <a:r>
+              <a:rPr lang="en-US" dirty="0" err="1">
+                <a:solidFill>
+                  <a:schemeClr val="bg1"/>
+                </a:solidFill>
+              </a:rPr>
+              <a:t>innerModuleServer</a:t>
+            </a:r>
+            <a:r>
+              <a:rPr lang="en-US" dirty="0">
+                <a:solidFill>
+                  <a:schemeClr val="bg1"/>
+                </a:solidFill>
+              </a:rPr>
+              <a:t>(id = "example",</a:t>
+            </a:r>
+          </a:p>
+          <a:p>
+            <a:r>
+              <a:rPr lang="en-US" dirty="0">
+                <a:solidFill>
+                  <a:schemeClr val="bg1"/>
+                </a:solidFill>
+              </a:rPr>
+              <a:t>                         </a:t>
+            </a:r>
+            <a:r>
+              <a:rPr lang="en-US" dirty="0" err="1">
+                <a:solidFill>
+                  <a:schemeClr val="bg1"/>
+                </a:solidFill>
+              </a:rPr>
+              <a:t>outer_input</a:t>
+            </a:r>
+            <a:r>
+              <a:rPr lang="en-US" dirty="0">
+                <a:solidFill>
+                  <a:schemeClr val="bg1"/>
+                </a:solidFill>
+              </a:rPr>
+              <a:t>=</a:t>
+            </a:r>
+            <a:r>
+              <a:rPr lang="en-US" dirty="0" err="1">
+                <a:solidFill>
+                  <a:schemeClr val="bg1"/>
+                </a:solidFill>
+              </a:rPr>
+              <a:t>global_outer_input</a:t>
+            </a:r>
+            <a:r>
+              <a:rPr lang="en-US" dirty="0">
+                <a:solidFill>
+                  <a:schemeClr val="bg1"/>
+                </a:solidFill>
+              </a:rPr>
+              <a:t>)</a:t>
+            </a:r>
+          </a:p>
+          <a:p>
+            <a:r>
+              <a:rPr lang="en-US" dirty="0">
+                <a:solidFill>
+                  <a:schemeClr val="bg1"/>
+                </a:solidFill>
+              </a:rPr>
+              <a:t>}</a:t>
+            </a:r>
+          </a:p>
+          <a:p>
+            <a:r>
+              <a:rPr lang="en-US" dirty="0">
+                <a:solidFill>
+                  <a:schemeClr val="bg1"/>
+                </a:solidFill>
+              </a:rPr>
+              <a:t>  )</a:t>
+            </a:r>
+          </a:p>
+          <a:p>
+            <a:r>
+              <a:rPr lang="en-US" dirty="0">
+                <a:solidFill>
+                  <a:schemeClr val="bg1"/>
+                </a:solidFill>
+              </a:rPr>
+              <a:t>} </a:t>
+            </a:r>
+          </a:p>
+        </p:txBody>
+      </p:sp>
+      <p:sp>
+        <p:nvSpPr>
+          <p:cNvPr id="5" name="TextBox 4">
+            <a:extLst>
+              <a:ext uri="{FF2B5EF4-FFF2-40B4-BE49-F238E27FC236}">
+                <a16:creationId xmlns:a16="http://schemas.microsoft.com/office/drawing/2014/main" id="{A6A4F38D-3C03-89F3-F044-B6E1D84B57E9}"/>
               </a:ext>
             </a:extLst>
           </p:cNvPr>
@@ -7232,8 +7966,8 @@
         </p:nvSpPr>
         <p:spPr>
           <a:xfrm>
-            <a:off x="476250" y="5354935"/>
-            <a:ext cx="6096000" cy="1200329"/>
+            <a:off x="787400" y="743089"/>
+            <a:ext cx="4140200" cy="646331"/>
           </a:xfrm>
           <a:prstGeom prst="rect">
             <a:avLst/>
@@ -7241,36 +7975,10 @@
           <a:noFill/>
         </p:spPr>
         <p:txBody>
-          <a:bodyPr wrap="square">
+          <a:bodyPr wrap="square" rtlCol="0">
             <a:spAutoFit/>
           </a:bodyPr>
           <a:lstStyle/>
-          <a:p>
-            <a:r>
-              <a:rPr lang="en-US" dirty="0">
-                <a:solidFill>
-                  <a:schemeClr val="bg1"/>
-                </a:solidFill>
-              </a:rPr>
-              <a:t>(</a:t>
-            </a:r>
-            <a:r>
-              <a:rPr lang="en-US" dirty="0" err="1">
-                <a:solidFill>
-                  <a:schemeClr val="bg1"/>
-                </a:solidFill>
-              </a:rPr>
-              <a:t>app.R</a:t>
-            </a:r>
-            <a:r>
-              <a:rPr lang="en-US" dirty="0">
-                <a:solidFill>
-                  <a:schemeClr val="bg1"/>
-                </a:solidFill>
-              </a:rPr>
-              <a:t> Server)</a:t>
-            </a:r>
-          </a:p>
           <a:p>
             <a:endParaRPr lang="en-US" dirty="0">
               <a:solidFill>
@@ -7279,81 +7987,20 @@
             </a:endParaRPr>
           </a:p>
           <a:p>
-            <a:r>
-              <a:rPr lang="en-US" dirty="0" err="1">
-                <a:solidFill>
-                  <a:schemeClr val="bg1"/>
-                </a:solidFill>
-              </a:rPr>
-              <a:t>moduleDemoServer</a:t>
-            </a:r>
-            <a:r>
-              <a:rPr lang="en-US" dirty="0">
-                <a:solidFill>
-                  <a:schemeClr val="bg1"/>
-                </a:solidFill>
-              </a:rPr>
-              <a:t>(id = "</a:t>
-            </a:r>
-            <a:r>
-              <a:rPr lang="en-US" dirty="0" err="1">
-                <a:solidFill>
-                  <a:schemeClr val="bg1"/>
-                </a:solidFill>
-              </a:rPr>
-              <a:t>data_coverage_module</a:t>
-            </a:r>
-            <a:r>
-              <a:rPr lang="en-US" dirty="0">
-                <a:solidFill>
-                  <a:schemeClr val="bg1"/>
-                </a:solidFill>
-              </a:rPr>
-              <a:t>”,</a:t>
-            </a:r>
-          </a:p>
-          <a:p>
-            <a:r>
-              <a:rPr lang="en-US" dirty="0" err="1">
-                <a:solidFill>
-                  <a:schemeClr val="bg1"/>
-                </a:solidFill>
-              </a:rPr>
-              <a:t>dataset_summary</a:t>
-            </a:r>
-            <a:r>
-              <a:rPr lang="en-US" dirty="0">
-                <a:solidFill>
-                  <a:schemeClr val="bg1"/>
-                </a:solidFill>
-              </a:rPr>
-              <a:t>=</a:t>
-            </a:r>
-            <a:r>
-              <a:rPr lang="en-US" dirty="0" err="1">
-                <a:solidFill>
-                  <a:schemeClr val="bg1"/>
-                </a:solidFill>
-              </a:rPr>
-              <a:t>global_dataset_summary</a:t>
-            </a:r>
-            <a:r>
-              <a:rPr lang="en-US" dirty="0">
-                <a:solidFill>
-                  <a:schemeClr val="bg1"/>
-                </a:solidFill>
-              </a:rPr>
-              <a:t>)</a:t>
-            </a:r>
-          </a:p>
-        </p:txBody>
-      </p:sp>
-      <p:sp>
-        <p:nvSpPr>
-          <p:cNvPr id="14" name="TextBox 13">
-            <a:extLst>
-              <a:ext uri="{FF2B5EF4-FFF2-40B4-BE49-F238E27FC236}">
-                <a16:creationId xmlns:a16="http://schemas.microsoft.com/office/drawing/2014/main" id="{C3504550-54D5-9AC8-BB68-244AB7ECAD96}"/>
+            <a:endParaRPr lang="en-US" dirty="0">
+              <a:solidFill>
+                <a:schemeClr val="bg1"/>
+              </a:solidFill>
+            </a:endParaRPr>
+          </a:p>
+        </p:txBody>
+      </p:sp>
+      <p:sp>
+        <p:nvSpPr>
+          <p:cNvPr id="8" name="TextBox 7">
+            <a:extLst>
+              <a:ext uri="{FF2B5EF4-FFF2-40B4-BE49-F238E27FC236}">
+                <a16:creationId xmlns:a16="http://schemas.microsoft.com/office/drawing/2014/main" id="{FF9E81C9-4BCF-6C45-EABC-5E324137EBD6}"/>
               </a:ext>
             </a:extLst>
           </p:cNvPr>
@@ -7362,8 +8009,8 @@
         </p:nvSpPr>
         <p:spPr>
           <a:xfrm>
-            <a:off x="6191250" y="4986516"/>
-            <a:ext cx="4965700" cy="1200329"/>
+            <a:off x="7454900" y="1389420"/>
+            <a:ext cx="4737100" cy="4247317"/>
           </a:xfrm>
           <a:prstGeom prst="rect">
             <a:avLst/>
@@ -7376,32 +8023,541 @@
           </a:bodyPr>
           <a:lstStyle/>
           <a:p>
-            <a:endParaRPr lang="en-GB" dirty="0">
-              <a:solidFill>
-                <a:srgbClr val="2B2B2B"/>
-              </a:solidFill>
-            </a:endParaRPr>
-          </a:p>
-          <a:p>
-            <a:r>
-              <a:rPr lang="en-GB" dirty="0">
-                <a:solidFill>
-                  <a:srgbClr val="2B2B2B"/>
-                </a:solidFill>
-              </a:rPr>
-              <a:t>For you to use these global variables you need to pass these as arguments into your module server.</a:t>
-            </a:r>
-            <a:endParaRPr lang="en-US" dirty="0"/>
-          </a:p>
-          <a:p>
-            <a:endParaRPr lang="en-US" dirty="0"/>
+            <a:r>
+              <a:rPr lang="en-GB" dirty="0"/>
+              <a:t>It is easy to nest modules within other modules.</a:t>
+            </a:r>
+          </a:p>
+          <a:p>
+            <a:endParaRPr lang="en-GB" dirty="0"/>
+          </a:p>
+          <a:p>
+            <a:r>
+              <a:rPr lang="en-GB" dirty="0"/>
+              <a:t>When the outer module’s UI function calls the inner module’s UI function, ensure that the id is wrapped in ns() e.g. </a:t>
+            </a:r>
+            <a:r>
+              <a:rPr lang="en-US" dirty="0" err="1"/>
+              <a:t>innerModuleUI</a:t>
+            </a:r>
+            <a:r>
+              <a:rPr lang="en-US" dirty="0"/>
+              <a:t>(id = ns("example") )).</a:t>
+            </a:r>
+          </a:p>
+          <a:p>
+            <a:endParaRPr lang="en-GB" dirty="0"/>
+          </a:p>
+          <a:p>
+            <a:endParaRPr lang="en-GB" dirty="0"/>
+          </a:p>
+          <a:p>
+            <a:r>
+              <a:rPr lang="en-GB" dirty="0"/>
+              <a:t>Any global input variables that exist in the outer module can be passed to the inner modules as described in the previous example. Here, to access </a:t>
+            </a:r>
+            <a:r>
+              <a:rPr lang="en-GB" dirty="0" err="1"/>
+              <a:t>example_input_a</a:t>
+            </a:r>
+            <a:r>
+              <a:rPr lang="en-GB" dirty="0"/>
+              <a:t> inside of </a:t>
+            </a:r>
+            <a:r>
+              <a:rPr lang="en-GB" dirty="0" err="1"/>
+              <a:t>innerModuleServer</a:t>
+            </a:r>
+            <a:r>
+              <a:rPr lang="en-GB" dirty="0"/>
+              <a:t> you would use </a:t>
+            </a:r>
+            <a:r>
+              <a:rPr lang="en-GB" dirty="0" err="1"/>
+              <a:t>example_input_a</a:t>
+            </a:r>
+            <a:r>
+              <a:rPr lang="en-GB" dirty="0"/>
+              <a:t>().</a:t>
+            </a:r>
+          </a:p>
+          <a:p>
+            <a:endParaRPr lang="en-GB" dirty="0"/>
           </a:p>
         </p:txBody>
       </p:sp>
     </p:spTree>
     <p:extLst>
       <p:ext uri="{BB962C8B-B14F-4D97-AF65-F5344CB8AC3E}">
-        <p14:creationId xmlns:p14="http://schemas.microsoft.com/office/powerpoint/2010/main" val="1027512068"/>
+        <p14:creationId xmlns:p14="http://schemas.microsoft.com/office/powerpoint/2010/main" val="235455746"/>
+      </p:ext>
+    </p:extLst>
+  </p:cSld>
+  <p:clrMapOvr>
+    <a:masterClrMapping/>
+  </p:clrMapOvr>
+</p:sld>
+</file>
+
+<file path=ppt/slides/slide6.xml><?xml version="1.0" encoding="utf-8"?>
+<p:sld xmlns:a="http://schemas.openxmlformats.org/drawingml/2006/main" xmlns:r="http://schemas.openxmlformats.org/officeDocument/2006/relationships" xmlns:p="http://schemas.openxmlformats.org/presentationml/2006/main">
+  <p:cSld>
+    <p:spTree>
+      <p:nvGrpSpPr>
+        <p:cNvPr id="1" name=""/>
+        <p:cNvGrpSpPr/>
+        <p:nvPr/>
+      </p:nvGrpSpPr>
+      <p:grpSpPr>
+        <a:xfrm>
+          <a:off x="0" y="0"/>
+          <a:ext cx="0" cy="0"/>
+          <a:chOff x="0" y="0"/>
+          <a:chExt cx="0" cy="0"/>
+        </a:xfrm>
+      </p:grpSpPr>
+      <p:sp>
+        <p:nvSpPr>
+          <p:cNvPr id="4" name="TextBox 3">
+            <a:extLst>
+              <a:ext uri="{FF2B5EF4-FFF2-40B4-BE49-F238E27FC236}">
+                <a16:creationId xmlns:a16="http://schemas.microsoft.com/office/drawing/2014/main" id="{A93241D4-7963-235F-057F-6414464A6727}"/>
+              </a:ext>
+            </a:extLst>
+          </p:cNvPr>
+          <p:cNvSpPr txBox="1"/>
+          <p:nvPr/>
+        </p:nvSpPr>
+        <p:spPr>
+          <a:xfrm>
+            <a:off x="381000" y="444500"/>
+            <a:ext cx="4889500" cy="369332"/>
+          </a:xfrm>
+          <a:prstGeom prst="rect">
+            <a:avLst/>
+          </a:prstGeom>
+          <a:noFill/>
+        </p:spPr>
+        <p:txBody>
+          <a:bodyPr wrap="square" rtlCol="0">
+            <a:spAutoFit/>
+          </a:bodyPr>
+          <a:lstStyle/>
+          <a:p>
+            <a:r>
+              <a:rPr lang="en-US" b="1" dirty="0">
+                <a:solidFill>
+                  <a:srgbClr val="C00000"/>
+                </a:solidFill>
+              </a:rPr>
+              <a:t>Naming Conventions</a:t>
+            </a:r>
+          </a:p>
+        </p:txBody>
+      </p:sp>
+      <p:sp>
+        <p:nvSpPr>
+          <p:cNvPr id="5" name="TextBox 4">
+            <a:extLst>
+              <a:ext uri="{FF2B5EF4-FFF2-40B4-BE49-F238E27FC236}">
+                <a16:creationId xmlns:a16="http://schemas.microsoft.com/office/drawing/2014/main" id="{EFA94A6A-DFAA-642B-5B41-F5D89C00EDF3}"/>
+              </a:ext>
+            </a:extLst>
+          </p:cNvPr>
+          <p:cNvSpPr txBox="1"/>
+          <p:nvPr/>
+        </p:nvSpPr>
+        <p:spPr>
+          <a:xfrm>
+            <a:off x="381000" y="840264"/>
+            <a:ext cx="11290300" cy="7386638"/>
+          </a:xfrm>
+          <a:prstGeom prst="rect">
+            <a:avLst/>
+          </a:prstGeom>
+          <a:noFill/>
+        </p:spPr>
+        <p:txBody>
+          <a:bodyPr wrap="square" rtlCol="0">
+            <a:spAutoFit/>
+          </a:bodyPr>
+          <a:lstStyle/>
+          <a:p>
+            <a:r>
+              <a:rPr lang="en-US" sz="1600" b="1" dirty="0"/>
+              <a:t>Module (Inner) Components</a:t>
+            </a:r>
+          </a:p>
+          <a:p>
+            <a:endParaRPr lang="en-US" sz="1600" b="1" dirty="0"/>
+          </a:p>
+          <a:p>
+            <a:r>
+              <a:rPr lang="en-US" sz="1600" dirty="0"/>
+              <a:t>Modules should be saved as independent R scripts and sourced in the main </a:t>
+            </a:r>
+            <a:r>
+              <a:rPr lang="en-US" sz="1600" dirty="0" err="1"/>
+              <a:t>app.R</a:t>
+            </a:r>
+            <a:r>
+              <a:rPr lang="en-US" sz="1600" dirty="0"/>
+              <a:t>. The naming convention for these module scripts should be </a:t>
+            </a:r>
+            <a:r>
+              <a:rPr lang="en-US" sz="1600" dirty="0" err="1"/>
+              <a:t>module_navbartab_section</a:t>
+            </a:r>
+            <a:r>
+              <a:rPr lang="en-US" sz="1600" dirty="0"/>
+              <a:t> e.g. for the module with reference to the Data Coverage section under the Summary tab, </a:t>
+            </a:r>
+            <a:r>
+              <a:rPr lang="en-US" sz="1600" dirty="0" err="1"/>
+              <a:t>module_summary_data_coverage</a:t>
+            </a:r>
+            <a:r>
+              <a:rPr lang="en-US" sz="1600" dirty="0"/>
+              <a:t>.</a:t>
+            </a:r>
+          </a:p>
+          <a:p>
+            <a:endParaRPr lang="en-US" sz="1600" dirty="0"/>
+          </a:p>
+          <a:p>
+            <a:r>
+              <a:rPr lang="en-US" sz="1600" dirty="0"/>
+              <a:t>UI and Server Functions:</a:t>
+            </a:r>
+          </a:p>
+          <a:p>
+            <a:r>
+              <a:rPr lang="en-US" sz="1600" dirty="0"/>
+              <a:t>Using the above example:</a:t>
+            </a:r>
+          </a:p>
+          <a:p>
+            <a:pPr algn="l">
+              <a:buFont typeface="Arial" panose="020B0604020202020204" pitchFamily="34" charset="0"/>
+              <a:buChar char="•"/>
+            </a:pPr>
+            <a:r>
+              <a:rPr lang="en-GB" sz="1600" dirty="0">
+                <a:solidFill>
+                  <a:srgbClr val="212529"/>
+                </a:solidFill>
+              </a:rPr>
+              <a:t> If the module UI contains input and output: name the module UI such as </a:t>
+            </a:r>
+            <a:r>
+              <a:rPr lang="en-GB" sz="1600" b="0" i="0" u="none" strike="noStrike" dirty="0" err="1">
+                <a:solidFill>
+                  <a:srgbClr val="212529"/>
+                </a:solidFill>
+                <a:effectLst/>
+              </a:rPr>
+              <a:t>dataCoverageUI</a:t>
+            </a:r>
+            <a:r>
+              <a:rPr lang="en-GB" sz="1600" b="0" i="0" u="none" strike="noStrike" dirty="0">
+                <a:solidFill>
+                  <a:srgbClr val="212529"/>
+                </a:solidFill>
+                <a:effectLst/>
+              </a:rPr>
+              <a:t>() </a:t>
+            </a:r>
+          </a:p>
+          <a:p>
+            <a:pPr algn="l">
+              <a:buFont typeface="Arial" panose="020B0604020202020204" pitchFamily="34" charset="0"/>
+              <a:buChar char="•"/>
+            </a:pPr>
+            <a:r>
+              <a:rPr lang="en-GB" sz="1600" dirty="0">
+                <a:solidFill>
+                  <a:srgbClr val="212529"/>
+                </a:solidFill>
+              </a:rPr>
+              <a:t> </a:t>
+            </a:r>
+            <a:r>
+              <a:rPr lang="en-GB" sz="1600" b="0" i="0" u="none" strike="noStrike" dirty="0">
+                <a:solidFill>
+                  <a:srgbClr val="212529"/>
+                </a:solidFill>
+                <a:effectLst/>
+              </a:rPr>
+              <a:t>If the module is primarily for input or output then use </a:t>
+            </a:r>
+            <a:r>
+              <a:rPr lang="en-GB" sz="1600" b="0" i="0" u="none" strike="noStrike" dirty="0" err="1">
+                <a:solidFill>
+                  <a:srgbClr val="212529"/>
+                </a:solidFill>
+                <a:effectLst/>
+              </a:rPr>
+              <a:t>dataCoverageInput</a:t>
+            </a:r>
+            <a:r>
+              <a:rPr lang="en-GB" sz="1600" b="0" i="0" u="none" strike="noStrike" dirty="0">
+                <a:solidFill>
+                  <a:srgbClr val="212529"/>
+                </a:solidFill>
+                <a:effectLst/>
+              </a:rPr>
+              <a:t>() or </a:t>
+            </a:r>
+            <a:r>
+              <a:rPr lang="en-GB" sz="1600" b="0" i="0" u="none" strike="noStrike" dirty="0" err="1">
+                <a:solidFill>
+                  <a:srgbClr val="212529"/>
+                </a:solidFill>
+                <a:effectLst/>
+              </a:rPr>
+              <a:t>dataCoverageOuput</a:t>
+            </a:r>
+            <a:r>
+              <a:rPr lang="en-GB" sz="1600" b="0" i="0" u="none" strike="noStrike" dirty="0">
+                <a:solidFill>
+                  <a:srgbClr val="212529"/>
+                </a:solidFill>
+                <a:effectLst/>
+              </a:rPr>
+              <a:t>() instead</a:t>
+            </a:r>
+          </a:p>
+          <a:p>
+            <a:pPr algn="l">
+              <a:buFont typeface="Arial" panose="020B0604020202020204" pitchFamily="34" charset="0"/>
+              <a:buChar char="•"/>
+            </a:pPr>
+            <a:r>
+              <a:rPr lang="en-GB" sz="1600" b="0" i="0" u="none" strike="noStrike" dirty="0">
+                <a:solidFill>
+                  <a:srgbClr val="212529"/>
+                </a:solidFill>
+                <a:effectLst/>
+              </a:rPr>
+              <a:t> </a:t>
+            </a:r>
+            <a:r>
+              <a:rPr lang="en-GB" sz="1600" b="0" i="0" u="none" strike="noStrike" dirty="0" err="1">
+                <a:solidFill>
+                  <a:srgbClr val="212529"/>
+                </a:solidFill>
+                <a:effectLst/>
+              </a:rPr>
+              <a:t>dataCoverageServer</a:t>
+            </a:r>
+            <a:r>
+              <a:rPr lang="en-GB" sz="1600" b="0" i="0" u="none" strike="noStrike" dirty="0">
+                <a:solidFill>
+                  <a:srgbClr val="212529"/>
+                </a:solidFill>
+                <a:effectLst/>
+              </a:rPr>
+              <a:t>() is the module server</a:t>
+            </a:r>
+          </a:p>
+          <a:p>
+            <a:pPr algn="l"/>
+            <a:endParaRPr lang="en-GB" sz="1600" dirty="0">
+              <a:solidFill>
+                <a:srgbClr val="212529"/>
+              </a:solidFill>
+            </a:endParaRPr>
+          </a:p>
+          <a:p>
+            <a:pPr algn="l"/>
+            <a:r>
+              <a:rPr lang="en-GB" sz="1600" b="1" dirty="0">
+                <a:solidFill>
+                  <a:srgbClr val="212529"/>
+                </a:solidFill>
+              </a:rPr>
+              <a:t>Module (Outer) Components</a:t>
+            </a:r>
+          </a:p>
+          <a:p>
+            <a:pPr algn="l"/>
+            <a:endParaRPr lang="en-GB" sz="1600" b="1" dirty="0">
+              <a:solidFill>
+                <a:srgbClr val="212529"/>
+              </a:solidFill>
+            </a:endParaRPr>
+          </a:p>
+          <a:p>
+            <a:r>
+              <a:rPr lang="en-US" sz="1600" dirty="0"/>
+              <a:t>Modules should be saved as independent R scripts and sourced in the main </a:t>
+            </a:r>
+            <a:r>
+              <a:rPr lang="en-US" sz="1600" dirty="0" err="1"/>
+              <a:t>app.R</a:t>
+            </a:r>
+            <a:r>
+              <a:rPr lang="en-US" sz="1600" dirty="0"/>
+              <a:t>. The naming convention for these module scripts should be </a:t>
+            </a:r>
+            <a:r>
+              <a:rPr lang="en-US" sz="1600" dirty="0" err="1"/>
+              <a:t>module_navbartab</a:t>
+            </a:r>
+            <a:r>
+              <a:rPr lang="en-US" sz="1600" dirty="0"/>
+              <a:t> e.g. for the outer module used for the Summary tab, </a:t>
+            </a:r>
+            <a:r>
+              <a:rPr lang="en-US" sz="1600" dirty="0" err="1"/>
+              <a:t>module_summary</a:t>
+            </a:r>
+            <a:r>
+              <a:rPr lang="en-US" sz="1600" dirty="0"/>
+              <a:t>.</a:t>
+            </a:r>
+          </a:p>
+          <a:p>
+            <a:endParaRPr lang="en-US" sz="1600" dirty="0"/>
+          </a:p>
+          <a:p>
+            <a:r>
+              <a:rPr lang="en-US" sz="1600" dirty="0"/>
+              <a:t>Using the above example:</a:t>
+            </a:r>
+          </a:p>
+          <a:p>
+            <a:pPr algn="l"/>
+            <a:r>
+              <a:rPr lang="en-GB" sz="1600" dirty="0">
+                <a:solidFill>
+                  <a:srgbClr val="212529"/>
+                </a:solidFill>
+              </a:rPr>
+              <a:t>The module functions should be named </a:t>
+            </a:r>
+            <a:r>
+              <a:rPr lang="en-GB" sz="1600" dirty="0" err="1">
+                <a:solidFill>
+                  <a:srgbClr val="212529"/>
+                </a:solidFill>
+              </a:rPr>
+              <a:t>summaryUI</a:t>
+            </a:r>
+            <a:r>
+              <a:rPr lang="en-GB" sz="1600" dirty="0">
+                <a:solidFill>
+                  <a:srgbClr val="212529"/>
+                </a:solidFill>
+              </a:rPr>
+              <a:t>() and </a:t>
+            </a:r>
+            <a:r>
+              <a:rPr lang="en-GB" sz="1600" dirty="0" err="1">
+                <a:solidFill>
+                  <a:srgbClr val="212529"/>
+                </a:solidFill>
+              </a:rPr>
+              <a:t>summaryServer</a:t>
+            </a:r>
+            <a:r>
+              <a:rPr lang="en-GB" sz="1600" dirty="0">
+                <a:solidFill>
+                  <a:srgbClr val="212529"/>
+                </a:solidFill>
+              </a:rPr>
+              <a:t>()</a:t>
+            </a:r>
+            <a:endParaRPr lang="en-GB" sz="1600" b="0" i="0" u="none" strike="noStrike" dirty="0">
+              <a:solidFill>
+                <a:srgbClr val="212529"/>
+              </a:solidFill>
+              <a:effectLst/>
+            </a:endParaRPr>
+          </a:p>
+          <a:p>
+            <a:pPr algn="l"/>
+            <a:endParaRPr lang="en-GB" sz="1600" dirty="0">
+              <a:solidFill>
+                <a:srgbClr val="212529"/>
+              </a:solidFill>
+            </a:endParaRPr>
+          </a:p>
+          <a:p>
+            <a:pPr algn="l"/>
+            <a:r>
+              <a:rPr lang="en-GB" sz="1600" b="1" dirty="0">
+                <a:solidFill>
+                  <a:srgbClr val="212529"/>
+                </a:solidFill>
+              </a:rPr>
+              <a:t>Module IDs</a:t>
+            </a:r>
+          </a:p>
+          <a:p>
+            <a:pPr algn="l"/>
+            <a:endParaRPr lang="en-GB" sz="1600" b="1" dirty="0">
+              <a:solidFill>
+                <a:srgbClr val="212529"/>
+              </a:solidFill>
+            </a:endParaRPr>
+          </a:p>
+          <a:p>
+            <a:pPr algn="l"/>
+            <a:r>
+              <a:rPr lang="en-GB" sz="1600" dirty="0">
+                <a:solidFill>
+                  <a:srgbClr val="212529"/>
+                </a:solidFill>
+              </a:rPr>
+              <a:t>No need for a naming convention to be established for IDs to date. If reusing a module then try to keep the IDs between each instance similar.</a:t>
+            </a:r>
+          </a:p>
+          <a:p>
+            <a:pPr algn="l"/>
+            <a:endParaRPr lang="en-GB" dirty="0">
+              <a:solidFill>
+                <a:srgbClr val="212529"/>
+              </a:solidFill>
+            </a:endParaRPr>
+          </a:p>
+          <a:p>
+            <a:pPr algn="l"/>
+            <a:endParaRPr lang="en-GB" dirty="0">
+              <a:solidFill>
+                <a:srgbClr val="212529"/>
+              </a:solidFill>
+            </a:endParaRPr>
+          </a:p>
+          <a:p>
+            <a:pPr algn="l"/>
+            <a:endParaRPr lang="en-GB" b="0" i="0" u="none" strike="noStrike" dirty="0">
+              <a:solidFill>
+                <a:srgbClr val="212529"/>
+              </a:solidFill>
+              <a:effectLst/>
+              <a:latin typeface="-apple-system"/>
+            </a:endParaRPr>
+          </a:p>
+          <a:p>
+            <a:pPr algn="l"/>
+            <a:endParaRPr lang="en-GB" b="0" i="0" u="none" strike="noStrike" dirty="0">
+              <a:solidFill>
+                <a:srgbClr val="212529"/>
+              </a:solidFill>
+              <a:effectLst/>
+              <a:latin typeface="-apple-system"/>
+            </a:endParaRPr>
+          </a:p>
+          <a:p>
+            <a:endParaRPr lang="en-US" dirty="0"/>
+          </a:p>
+        </p:txBody>
+      </p:sp>
+    </p:spTree>
+    <p:extLst>
+      <p:ext uri="{BB962C8B-B14F-4D97-AF65-F5344CB8AC3E}">
+        <p14:creationId xmlns:p14="http://schemas.microsoft.com/office/powerpoint/2010/main" val="373535562"/>
       </p:ext>
     </p:extLst>
   </p:cSld>

</xml_diff>